<commit_message>
Begin Working On Chapter 1
</commit_message>
<xml_diff>
--- a/The Clean Coder.pptx
+++ b/The Clean Coder.pptx
@@ -7,6 +7,8 @@
   <p:sldIdLst>
     <p:sldId id="256" r:id="rId2"/>
     <p:sldId id="257" r:id="rId3"/>
+    <p:sldId id="258" r:id="rId4"/>
+    <p:sldId id="259" r:id="rId5"/>
   </p:sldIdLst>
   <p:sldSz cx="12192000" cy="6858000"/>
   <p:notesSz cx="6858000" cy="9144000"/>
@@ -105,6 +107,11 @@
       </a:defRPr>
     </a:lvl9pPr>
   </p:defaultTextStyle>
+  <p:extLst>
+    <p:ext uri="{EFAFB233-063F-42B5-8137-9DF3F51BA10A}">
+      <p15:sldGuideLst xmlns:p15="http://schemas.microsoft.com/office/powerpoint/2012/main"/>
+    </p:ext>
+  </p:extLst>
 </p:presentation>
 </file>
 
@@ -203,7 +210,7 @@
           <a:effectLst/>
           <a:extLst>
             <a:ext uri="{91240B29-F687-4f45-9708-019B960494DF}">
-              <a14:hiddenLine xmlns:a14="http://schemas.microsoft.com/office/drawing/2010/main" xmlns="" w="9525">
+              <a14:hiddenLine xmlns="" xmlns:a14="http://schemas.microsoft.com/office/drawing/2010/main" w="9525">
                 <a:solidFill>
                   <a:srgbClr val="000000"/>
                 </a:solidFill>
@@ -396,7 +403,7 @@
             <a:fld id="{B61BEF0D-F0BB-DE4B-95CE-6DB70DBA9567}" type="datetimeFigureOut">
               <a:rPr lang="en-US" smtClean="0"/>
               <a:pPr/>
-              <a:t>7/1/2019</a:t>
+              <a:t>7/8/2019</a:t>
             </a:fld>
             <a:endParaRPr lang="en-US" dirty="0"/>
           </a:p>
@@ -716,7 +723,7 @@
             <a:fld id="{B61BEF0D-F0BB-DE4B-95CE-6DB70DBA9567}" type="datetimeFigureOut">
               <a:rPr lang="en-US" smtClean="0"/>
               <a:pPr/>
-              <a:t>7/1/2019</a:t>
+              <a:t>7/8/2019</a:t>
             </a:fld>
             <a:endParaRPr lang="en-US" dirty="0"/>
           </a:p>
@@ -1206,7 +1213,7 @@
             <a:fld id="{B61BEF0D-F0BB-DE4B-95CE-6DB70DBA9567}" type="datetimeFigureOut">
               <a:rPr lang="en-US" smtClean="0"/>
               <a:pPr/>
-              <a:t>7/1/2019</a:t>
+              <a:t>7/8/2019</a:t>
             </a:fld>
             <a:endParaRPr lang="en-US" dirty="0"/>
           </a:p>
@@ -1577,7 +1584,7 @@
             <a:fld id="{B61BEF0D-F0BB-DE4B-95CE-6DB70DBA9567}" type="datetimeFigureOut">
               <a:rPr lang="en-US" smtClean="0"/>
               <a:pPr/>
-              <a:t>7/1/2019</a:t>
+              <a:t>7/8/2019</a:t>
             </a:fld>
             <a:endParaRPr lang="en-US" dirty="0"/>
           </a:p>
@@ -1733,7 +1740,7 @@
           <a:ln/>
           <a:extLst>
             <a:ext uri="{91240B29-F687-4f45-9708-019B960494DF}">
-              <a14:hiddenLine xmlns:a14="http://schemas.microsoft.com/office/drawing/2010/main" xmlns="" w="9525">
+              <a14:hiddenLine xmlns="" xmlns:a14="http://schemas.microsoft.com/office/drawing/2010/main" w="9525">
                 <a:solidFill>
                   <a:srgbClr val="000000"/>
                 </a:solidFill>
@@ -1852,7 +1859,7 @@
             <a:fld id="{B61BEF0D-F0BB-DE4B-95CE-6DB70DBA9567}" type="datetimeFigureOut">
               <a:rPr lang="en-US" smtClean="0"/>
               <a:pPr/>
-              <a:t>7/1/2019</a:t>
+              <a:t>7/8/2019</a:t>
             </a:fld>
             <a:endParaRPr lang="en-US" dirty="0"/>
           </a:p>
@@ -2010,7 +2017,7 @@
           <a:ln/>
           <a:extLst>
             <a:ext uri="{91240B29-F687-4f45-9708-019B960494DF}">
-              <a14:hiddenLine xmlns:a14="http://schemas.microsoft.com/office/drawing/2010/main" xmlns="" w="9525">
+              <a14:hiddenLine xmlns="" xmlns:a14="http://schemas.microsoft.com/office/drawing/2010/main" w="9525">
                 <a:solidFill>
                   <a:srgbClr val="000000"/>
                 </a:solidFill>
@@ -2139,7 +2146,7 @@
             <a:fld id="{B61BEF0D-F0BB-DE4B-95CE-6DB70DBA9567}" type="datetimeFigureOut">
               <a:rPr lang="en-US" smtClean="0"/>
               <a:pPr/>
-              <a:t>7/1/2019</a:t>
+              <a:t>7/8/2019</a:t>
             </a:fld>
             <a:endParaRPr lang="en-US" dirty="0"/>
           </a:p>
@@ -2295,7 +2302,7 @@
           <a:ln/>
           <a:extLst>
             <a:ext uri="{91240B29-F687-4f45-9708-019B960494DF}">
-              <a14:hiddenLine xmlns:a14="http://schemas.microsoft.com/office/drawing/2010/main" xmlns="" w="9525">
+              <a14:hiddenLine xmlns="" xmlns:a14="http://schemas.microsoft.com/office/drawing/2010/main" w="9525">
                 <a:solidFill>
                   <a:srgbClr val="000000"/>
                 </a:solidFill>
@@ -2424,7 +2431,7 @@
             <a:fld id="{B61BEF0D-F0BB-DE4B-95CE-6DB70DBA9567}" type="datetimeFigureOut">
               <a:rPr lang="en-US" smtClean="0"/>
               <a:pPr/>
-              <a:t>7/1/2019</a:t>
+              <a:t>7/8/2019</a:t>
             </a:fld>
             <a:endParaRPr lang="en-US" dirty="0"/>
           </a:p>
@@ -2769,7 +2776,7 @@
             <a:fld id="{B61BEF0D-F0BB-DE4B-95CE-6DB70DBA9567}" type="datetimeFigureOut">
               <a:rPr lang="en-US" smtClean="0"/>
               <a:pPr/>
-              <a:t>7/1/2019</a:t>
+              <a:t>7/8/2019</a:t>
             </a:fld>
             <a:endParaRPr lang="en-US" dirty="0"/>
           </a:p>
@@ -2925,7 +2932,7 @@
           <a:ln/>
           <a:extLst>
             <a:ext uri="{91240B29-F687-4f45-9708-019B960494DF}">
-              <a14:hiddenLine xmlns:a14="http://schemas.microsoft.com/office/drawing/2010/main" xmlns="" w="9525">
+              <a14:hiddenLine xmlns="" xmlns:a14="http://schemas.microsoft.com/office/drawing/2010/main" w="9525">
                 <a:solidFill>
                   <a:srgbClr val="000000"/>
                 </a:solidFill>
@@ -3110,7 +3117,7 @@
             <a:fld id="{B61BEF0D-F0BB-DE4B-95CE-6DB70DBA9567}" type="datetimeFigureOut">
               <a:rPr lang="en-US" smtClean="0"/>
               <a:pPr/>
-              <a:t>7/1/2019</a:t>
+              <a:t>7/8/2019</a:t>
             </a:fld>
             <a:endParaRPr lang="en-US" dirty="0"/>
           </a:p>
@@ -3266,7 +3273,7 @@
           <a:ln/>
           <a:extLst>
             <a:ext uri="{91240B29-F687-4f45-9708-019B960494DF}">
-              <a14:hiddenLine xmlns:a14="http://schemas.microsoft.com/office/drawing/2010/main" xmlns="" w="9525">
+              <a14:hiddenLine xmlns="" xmlns:a14="http://schemas.microsoft.com/office/drawing/2010/main" w="9525">
                 <a:solidFill>
                   <a:srgbClr val="000000"/>
                 </a:solidFill>
@@ -3589,7 +3596,7 @@
             <a:fld id="{B61BEF0D-F0BB-DE4B-95CE-6DB70DBA9567}" type="datetimeFigureOut">
               <a:rPr lang="en-US" smtClean="0"/>
               <a:pPr/>
-              <a:t>7/1/2019</a:t>
+              <a:t>7/8/2019</a:t>
             </a:fld>
             <a:endParaRPr lang="en-US" dirty="0"/>
           </a:p>
@@ -3745,7 +3752,7 @@
           <a:ln/>
           <a:extLst>
             <a:ext uri="{91240B29-F687-4f45-9708-019B960494DF}">
-              <a14:hiddenLine xmlns:a14="http://schemas.microsoft.com/office/drawing/2010/main" xmlns="" w="9525">
+              <a14:hiddenLine xmlns="" xmlns:a14="http://schemas.microsoft.com/office/drawing/2010/main" w="9525">
                 <a:solidFill>
                   <a:srgbClr val="000000"/>
                 </a:solidFill>
@@ -3812,7 +3819,7 @@
             <a:fld id="{B61BEF0D-F0BB-DE4B-95CE-6DB70DBA9567}" type="datetimeFigureOut">
               <a:rPr lang="en-US" smtClean="0"/>
               <a:pPr/>
-              <a:t>7/1/2019</a:t>
+              <a:t>7/8/2019</a:t>
             </a:fld>
             <a:endParaRPr lang="en-US" dirty="0"/>
           </a:p>
@@ -3909,7 +3916,7 @@
             <a:fld id="{B61BEF0D-F0BB-DE4B-95CE-6DB70DBA9567}" type="datetimeFigureOut">
               <a:rPr lang="en-US" smtClean="0"/>
               <a:pPr/>
-              <a:t>7/1/2019</a:t>
+              <a:t>7/8/2019</a:t>
             </a:fld>
             <a:endParaRPr lang="en-US" dirty="0"/>
           </a:p>
@@ -4178,7 +4185,7 @@
           <a:ln/>
           <a:extLst>
             <a:ext uri="{91240B29-F687-4f45-9708-019B960494DF}">
-              <a14:hiddenLine xmlns:a14="http://schemas.microsoft.com/office/drawing/2010/main" xmlns="" w="9525">
+              <a14:hiddenLine xmlns="" xmlns:a14="http://schemas.microsoft.com/office/drawing/2010/main" w="9525">
                 <a:solidFill>
                   <a:srgbClr val="000000"/>
                 </a:solidFill>
@@ -4378,7 +4385,7 @@
             <a:fld id="{B61BEF0D-F0BB-DE4B-95CE-6DB70DBA9567}" type="datetimeFigureOut">
               <a:rPr lang="en-US" smtClean="0"/>
               <a:pPr/>
-              <a:t>7/1/2019</a:t>
+              <a:t>7/8/2019</a:t>
             </a:fld>
             <a:endParaRPr lang="en-US" dirty="0"/>
           </a:p>
@@ -4693,7 +4700,7 @@
             <a:fld id="{B61BEF0D-F0BB-DE4B-95CE-6DB70DBA9567}" type="datetimeFigureOut">
               <a:rPr lang="en-US" smtClean="0"/>
               <a:pPr/>
-              <a:t>7/1/2019</a:t>
+              <a:t>7/8/2019</a:t>
             </a:fld>
             <a:endParaRPr lang="en-US" dirty="0"/>
           </a:p>
@@ -4965,7 +4972,7 @@
             <a:fld id="{B61BEF0D-F0BB-DE4B-95CE-6DB70DBA9567}" type="datetimeFigureOut">
               <a:rPr lang="en-US" smtClean="0"/>
               <a:pPr/>
-              <a:t>7/1/2019</a:t>
+              <a:t>7/8/2019</a:t>
             </a:fld>
             <a:endParaRPr lang="en-US" dirty="0"/>
           </a:p>
@@ -6105,6 +6112,801 @@
 </p:sld>
 </file>
 
+<file path=ppt/slides/slide3.xml><?xml version="1.0" encoding="utf-8"?>
+<p:sld xmlns:a="http://schemas.openxmlformats.org/drawingml/2006/main" xmlns:r="http://schemas.openxmlformats.org/officeDocument/2006/relationships" xmlns:p="http://schemas.openxmlformats.org/presentationml/2006/main">
+  <p:cSld>
+    <p:spTree>
+      <p:nvGrpSpPr>
+        <p:cNvPr id="1" name=""/>
+        <p:cNvGrpSpPr/>
+        <p:nvPr/>
+      </p:nvGrpSpPr>
+      <p:grpSpPr>
+        <a:xfrm>
+          <a:off x="0" y="0"/>
+          <a:ext cx="0" cy="0"/>
+          <a:chOff x="0" y="0"/>
+          <a:chExt cx="0" cy="0"/>
+        </a:xfrm>
+      </p:grpSpPr>
+      <p:sp>
+        <p:nvSpPr>
+          <p:cNvPr id="2" name="Title 1"/>
+          <p:cNvSpPr>
+            <a:spLocks noGrp="1"/>
+          </p:cNvSpPr>
+          <p:nvPr>
+            <p:ph type="title"/>
+          </p:nvPr>
+        </p:nvSpPr>
+        <p:spPr>
+          <a:xfrm>
+            <a:off x="444500" y="266700"/>
+            <a:ext cx="11341100" cy="685800"/>
+          </a:xfrm>
+        </p:spPr>
+        <p:txBody>
+          <a:bodyPr/>
+          <a:lstStyle/>
+          <a:p>
+            <a:pPr algn="r" rtl="1"/>
+            <a:r>
+              <a:rPr lang="fa-IR" sz="4400" dirty="0" smtClean="0">
+                <a:effectLst>
+                  <a:outerShdw blurRad="38100" dist="38100" dir="2700000" algn="tl">
+                    <a:srgbClr val="000000">
+                      <a:alpha val="43137"/>
+                    </a:srgbClr>
+                  </a:outerShdw>
+                </a:effectLst>
+                <a:latin typeface="Adobe Arabic" panose="02040503050201020203" pitchFamily="18" charset="-78"/>
+                <a:cs typeface="Adobe Arabic" panose="02040503050201020203" pitchFamily="18" charset="-78"/>
+              </a:rPr>
+              <a:t>فصل اول : حرفه ای گری </a:t>
+            </a:r>
+            <a:endParaRPr lang="en-US" sz="4400" dirty="0">
+              <a:effectLst>
+                <a:outerShdw blurRad="38100" dist="38100" dir="2700000" algn="tl">
+                  <a:srgbClr val="000000">
+                    <a:alpha val="43137"/>
+                  </a:srgbClr>
+                </a:outerShdw>
+              </a:effectLst>
+              <a:latin typeface="Adobe Arabic" panose="02040503050201020203" pitchFamily="18" charset="-78"/>
+              <a:cs typeface="Adobe Arabic" panose="02040503050201020203" pitchFamily="18" charset="-78"/>
+            </a:endParaRPr>
+          </a:p>
+        </p:txBody>
+      </p:sp>
+      <p:sp>
+        <p:nvSpPr>
+          <p:cNvPr id="3" name="Content Placeholder 2"/>
+          <p:cNvSpPr>
+            <a:spLocks noGrp="1"/>
+          </p:cNvSpPr>
+          <p:nvPr>
+            <p:ph idx="1"/>
+          </p:nvPr>
+        </p:nvSpPr>
+        <p:spPr>
+          <a:xfrm>
+            <a:off x="739556" y="1041400"/>
+            <a:ext cx="10750988" cy="533400"/>
+          </a:xfrm>
+        </p:spPr>
+        <p:txBody>
+          <a:bodyPr anchor="t">
+            <a:noAutofit/>
+          </a:bodyPr>
+          <a:lstStyle/>
+          <a:p>
+            <a:pPr marL="0" indent="0" algn="r" rtl="1">
+              <a:buNone/>
+            </a:pPr>
+            <a:r>
+              <a:rPr lang="fa-IR" sz="3200" dirty="0" smtClean="0">
+                <a:effectLst>
+                  <a:outerShdw blurRad="38100" dist="38100" dir="2700000" algn="tl">
+                    <a:srgbClr val="000000">
+                      <a:alpha val="43137"/>
+                    </a:srgbClr>
+                  </a:outerShdw>
+                </a:effectLst>
+                <a:latin typeface="Adobe Arabic" panose="02040503050201020203" pitchFamily="18" charset="-78"/>
+                <a:cs typeface="Adobe Arabic" panose="02040503050201020203" pitchFamily="18" charset="-78"/>
+              </a:rPr>
+              <a:t>حرفه ای گری در مورد مسئولیت پذیری است .</a:t>
+            </a:r>
+          </a:p>
+        </p:txBody>
+      </p:sp>
+      <p:sp>
+        <p:nvSpPr>
+          <p:cNvPr id="6" name="TextBox 5"/>
+          <p:cNvSpPr txBox="1"/>
+          <p:nvPr/>
+        </p:nvSpPr>
+        <p:spPr>
+          <a:xfrm>
+            <a:off x="4140200" y="2235200"/>
+            <a:ext cx="6616700" cy="3970318"/>
+          </a:xfrm>
+          <a:prstGeom prst="rect">
+            <a:avLst/>
+          </a:prstGeom>
+          <a:noFill/>
+        </p:spPr>
+        <p:txBody>
+          <a:bodyPr wrap="square" rtlCol="0">
+            <a:spAutoFit/>
+          </a:bodyPr>
+          <a:lstStyle/>
+          <a:p>
+            <a:pPr marL="457200" indent="-457200" algn="r" rtl="1">
+              <a:buFont typeface="Arial" panose="020B0604020202020204" pitchFamily="34" charset="0"/>
+              <a:buChar char="•"/>
+            </a:pPr>
+            <a:r>
+              <a:rPr lang="fa-IR" sz="2800" dirty="0">
+                <a:latin typeface="Adobe Arabic" panose="02040503050201020203" pitchFamily="18" charset="-78"/>
+                <a:cs typeface="Adobe Arabic" panose="02040503050201020203" pitchFamily="18" charset="-78"/>
+              </a:rPr>
+              <a:t>ضرر </a:t>
+            </a:r>
+            <a:r>
+              <a:rPr lang="fa-IR" sz="2800" dirty="0" smtClean="0">
+                <a:latin typeface="Adobe Arabic" panose="02040503050201020203" pitchFamily="18" charset="-78"/>
+                <a:cs typeface="Adobe Arabic" panose="02040503050201020203" pitchFamily="18" charset="-78"/>
+              </a:rPr>
+              <a:t>نزنید.</a:t>
+            </a:r>
+            <a:endParaRPr lang="fa-IR" sz="2800" dirty="0">
+              <a:latin typeface="Adobe Arabic" panose="02040503050201020203" pitchFamily="18" charset="-78"/>
+              <a:cs typeface="Adobe Arabic" panose="02040503050201020203" pitchFamily="18" charset="-78"/>
+            </a:endParaRPr>
+          </a:p>
+          <a:p>
+            <a:pPr marL="457200" indent="-457200" algn="r" rtl="1">
+              <a:buFont typeface="Arial" panose="020B0604020202020204" pitchFamily="34" charset="0"/>
+              <a:buChar char="•"/>
+            </a:pPr>
+            <a:r>
+              <a:rPr lang="fa-IR" sz="2800" dirty="0">
+                <a:latin typeface="Adobe Arabic" panose="02040503050201020203" pitchFamily="18" charset="-78"/>
+                <a:cs typeface="Adobe Arabic" panose="02040503050201020203" pitchFamily="18" charset="-78"/>
+              </a:rPr>
+              <a:t>وجدان کاری داشته </a:t>
+            </a:r>
+            <a:r>
+              <a:rPr lang="fa-IR" sz="2800" dirty="0" smtClean="0">
+                <a:latin typeface="Adobe Arabic" panose="02040503050201020203" pitchFamily="18" charset="-78"/>
+                <a:cs typeface="Adobe Arabic" panose="02040503050201020203" pitchFamily="18" charset="-78"/>
+              </a:rPr>
+              <a:t>باشید. </a:t>
+            </a:r>
+            <a:endParaRPr lang="fa-IR" sz="2800" dirty="0">
+              <a:latin typeface="Adobe Arabic" panose="02040503050201020203" pitchFamily="18" charset="-78"/>
+              <a:cs typeface="Adobe Arabic" panose="02040503050201020203" pitchFamily="18" charset="-78"/>
+            </a:endParaRPr>
+          </a:p>
+          <a:p>
+            <a:pPr marL="457200" indent="-457200" algn="r" rtl="1">
+              <a:buFont typeface="Arial" panose="020B0604020202020204" pitchFamily="34" charset="0"/>
+              <a:buChar char="•"/>
+            </a:pPr>
+            <a:r>
+              <a:rPr lang="fa-IR" sz="2800" dirty="0">
+                <a:latin typeface="Adobe Arabic" panose="02040503050201020203" pitchFamily="18" charset="-78"/>
+                <a:cs typeface="Adobe Arabic" panose="02040503050201020203" pitchFamily="18" charset="-78"/>
+              </a:rPr>
+              <a:t>در زمینه ی فنی ، اطلاعات کافی داشته </a:t>
+            </a:r>
+            <a:r>
+              <a:rPr lang="fa-IR" sz="2800" dirty="0" smtClean="0">
+                <a:latin typeface="Adobe Arabic" panose="02040503050201020203" pitchFamily="18" charset="-78"/>
+                <a:cs typeface="Adobe Arabic" panose="02040503050201020203" pitchFamily="18" charset="-78"/>
+              </a:rPr>
+              <a:t>باشید. </a:t>
+            </a:r>
+            <a:endParaRPr lang="fa-IR" sz="2800" dirty="0">
+              <a:latin typeface="Adobe Arabic" panose="02040503050201020203" pitchFamily="18" charset="-78"/>
+              <a:cs typeface="Adobe Arabic" panose="02040503050201020203" pitchFamily="18" charset="-78"/>
+            </a:endParaRPr>
+          </a:p>
+          <a:p>
+            <a:pPr marL="457200" indent="-457200" algn="r" rtl="1">
+              <a:buFont typeface="Arial" panose="020B0604020202020204" pitchFamily="34" charset="0"/>
+              <a:buChar char="•"/>
+            </a:pPr>
+            <a:r>
+              <a:rPr lang="fa-IR" sz="2800" dirty="0" smtClean="0">
+                <a:latin typeface="Adobe Arabic" panose="02040503050201020203" pitchFamily="18" charset="-78"/>
+                <a:cs typeface="Adobe Arabic" panose="02040503050201020203" pitchFamily="18" charset="-78"/>
+              </a:rPr>
+              <a:t>به صورت پیوسته </a:t>
+            </a:r>
+            <a:r>
+              <a:rPr lang="fa-IR" sz="2800" dirty="0">
+                <a:latin typeface="Adobe Arabic" panose="02040503050201020203" pitchFamily="18" charset="-78"/>
+                <a:cs typeface="Adobe Arabic" panose="02040503050201020203" pitchFamily="18" charset="-78"/>
+              </a:rPr>
+              <a:t>در حال یادگیری باشید </a:t>
+            </a:r>
+            <a:r>
+              <a:rPr lang="fa-IR" sz="2800" dirty="0" smtClean="0">
+                <a:latin typeface="Adobe Arabic" panose="02040503050201020203" pitchFamily="18" charset="-78"/>
+                <a:cs typeface="Adobe Arabic" panose="02040503050201020203" pitchFamily="18" charset="-78"/>
+              </a:rPr>
+              <a:t>.</a:t>
+            </a:r>
+            <a:endParaRPr lang="fa-IR" sz="2800" dirty="0">
+              <a:latin typeface="Adobe Arabic" panose="02040503050201020203" pitchFamily="18" charset="-78"/>
+              <a:cs typeface="Adobe Arabic" panose="02040503050201020203" pitchFamily="18" charset="-78"/>
+            </a:endParaRPr>
+          </a:p>
+          <a:p>
+            <a:pPr marL="457200" indent="-457200" algn="r" rtl="1">
+              <a:buFont typeface="Arial" panose="020B0604020202020204" pitchFamily="34" charset="0"/>
+              <a:buChar char="•"/>
+            </a:pPr>
+            <a:r>
+              <a:rPr lang="fa-IR" sz="2800" dirty="0">
+                <a:latin typeface="Adobe Arabic" panose="02040503050201020203" pitchFamily="18" charset="-78"/>
+                <a:cs typeface="Adobe Arabic" panose="02040503050201020203" pitchFamily="18" charset="-78"/>
+              </a:rPr>
+              <a:t>تمرین کنید .</a:t>
+            </a:r>
+          </a:p>
+          <a:p>
+            <a:pPr marL="457200" indent="-457200" algn="r" rtl="1">
+              <a:buFont typeface="Arial" panose="020B0604020202020204" pitchFamily="34" charset="0"/>
+              <a:buChar char="•"/>
+            </a:pPr>
+            <a:r>
+              <a:rPr lang="fa-IR" sz="2800" dirty="0">
+                <a:latin typeface="Adobe Arabic" panose="02040503050201020203" pitchFamily="18" charset="-78"/>
+                <a:cs typeface="Adobe Arabic" panose="02040503050201020203" pitchFamily="18" charset="-78"/>
+              </a:rPr>
+              <a:t>همکاری کنید.</a:t>
+            </a:r>
+          </a:p>
+          <a:p>
+            <a:pPr marL="457200" indent="-457200" algn="r" rtl="1">
+              <a:buFont typeface="Arial" panose="020B0604020202020204" pitchFamily="34" charset="0"/>
+              <a:buChar char="•"/>
+            </a:pPr>
+            <a:r>
+              <a:rPr lang="fa-IR" sz="2800" dirty="0" smtClean="0">
+                <a:latin typeface="Adobe Arabic" panose="02040503050201020203" pitchFamily="18" charset="-78"/>
+                <a:cs typeface="Adobe Arabic" panose="02040503050201020203" pitchFamily="18" charset="-78"/>
+              </a:rPr>
+              <a:t>برای تازه کارها مثل آموزگار باشید . </a:t>
+            </a:r>
+            <a:endParaRPr lang="fa-IR" sz="2800" dirty="0">
+              <a:latin typeface="Adobe Arabic" panose="02040503050201020203" pitchFamily="18" charset="-78"/>
+              <a:cs typeface="Adobe Arabic" panose="02040503050201020203" pitchFamily="18" charset="-78"/>
+            </a:endParaRPr>
+          </a:p>
+          <a:p>
+            <a:pPr marL="457200" indent="-457200" algn="r" rtl="1">
+              <a:buFont typeface="Arial" panose="020B0604020202020204" pitchFamily="34" charset="0"/>
+              <a:buChar char="•"/>
+            </a:pPr>
+            <a:r>
+              <a:rPr lang="fa-IR" sz="2800" dirty="0">
+                <a:latin typeface="Adobe Arabic" panose="02040503050201020203" pitchFamily="18" charset="-78"/>
+                <a:cs typeface="Adobe Arabic" panose="02040503050201020203" pitchFamily="18" charset="-78"/>
+              </a:rPr>
+              <a:t>دامین </a:t>
+            </a:r>
+            <a:r>
+              <a:rPr lang="fa-IR" sz="2800" dirty="0" smtClean="0">
+                <a:latin typeface="Adobe Arabic" panose="02040503050201020203" pitchFamily="18" charset="-78"/>
+                <a:cs typeface="Adobe Arabic" panose="02040503050201020203" pitchFamily="18" charset="-78"/>
+              </a:rPr>
+              <a:t>خود </a:t>
+            </a:r>
+            <a:r>
+              <a:rPr lang="fa-IR" sz="2800" dirty="0">
+                <a:latin typeface="Adobe Arabic" panose="02040503050201020203" pitchFamily="18" charset="-78"/>
+                <a:cs typeface="Adobe Arabic" panose="02040503050201020203" pitchFamily="18" charset="-78"/>
+              </a:rPr>
+              <a:t>رو </a:t>
+            </a:r>
+            <a:r>
+              <a:rPr lang="fa-IR" sz="2800" dirty="0" smtClean="0">
+                <a:latin typeface="Adobe Arabic" panose="02040503050201020203" pitchFamily="18" charset="-78"/>
+                <a:cs typeface="Adobe Arabic" panose="02040503050201020203" pitchFamily="18" charset="-78"/>
+              </a:rPr>
+              <a:t>بشناسید.</a:t>
+            </a:r>
+          </a:p>
+          <a:p>
+            <a:pPr marL="457200" indent="-457200" algn="r" rtl="1">
+              <a:buFont typeface="Arial" panose="020B0604020202020204" pitchFamily="34" charset="0"/>
+              <a:buChar char="•"/>
+            </a:pPr>
+            <a:r>
+              <a:rPr lang="fa-IR" sz="2800" dirty="0" smtClean="0">
+                <a:latin typeface="Adobe Arabic" panose="02040503050201020203" pitchFamily="18" charset="-78"/>
+                <a:cs typeface="Adobe Arabic" panose="02040503050201020203" pitchFamily="18" charset="-78"/>
+              </a:rPr>
+              <a:t>فروتن باشید. </a:t>
+            </a:r>
+            <a:endParaRPr lang="en-US" sz="2800" dirty="0">
+              <a:latin typeface="Adobe Arabic" panose="02040503050201020203" pitchFamily="18" charset="-78"/>
+              <a:cs typeface="Adobe Arabic" panose="02040503050201020203" pitchFamily="18" charset="-78"/>
+            </a:endParaRPr>
+          </a:p>
+        </p:txBody>
+      </p:sp>
+    </p:spTree>
+    <p:extLst>
+      <p:ext uri="{BB962C8B-B14F-4D97-AF65-F5344CB8AC3E}">
+        <p14:creationId xmlns:p14="http://schemas.microsoft.com/office/powerpoint/2010/main" val="2187083425"/>
+      </p:ext>
+    </p:extLst>
+  </p:cSld>
+  <p:clrMapOvr>
+    <a:masterClrMapping/>
+  </p:clrMapOvr>
+</p:sld>
+</file>
+
+<file path=ppt/slides/slide4.xml><?xml version="1.0" encoding="utf-8"?>
+<p:sld xmlns:a="http://schemas.openxmlformats.org/drawingml/2006/main" xmlns:r="http://schemas.openxmlformats.org/officeDocument/2006/relationships" xmlns:p="http://schemas.openxmlformats.org/presentationml/2006/main">
+  <p:cSld>
+    <p:spTree>
+      <p:nvGrpSpPr>
+        <p:cNvPr id="1" name=""/>
+        <p:cNvGrpSpPr/>
+        <p:nvPr/>
+      </p:nvGrpSpPr>
+      <p:grpSpPr>
+        <a:xfrm>
+          <a:off x="0" y="0"/>
+          <a:ext cx="0" cy="0"/>
+          <a:chOff x="0" y="0"/>
+          <a:chExt cx="0" cy="0"/>
+        </a:xfrm>
+      </p:grpSpPr>
+      <p:sp>
+        <p:nvSpPr>
+          <p:cNvPr id="2" name="Title 1"/>
+          <p:cNvSpPr>
+            <a:spLocks noGrp="1"/>
+          </p:cNvSpPr>
+          <p:nvPr>
+            <p:ph type="title"/>
+          </p:nvPr>
+        </p:nvSpPr>
+        <p:spPr/>
+        <p:txBody>
+          <a:bodyPr/>
+          <a:lstStyle/>
+          <a:p>
+            <a:pPr algn="r" rtl="1"/>
+            <a:r>
+              <a:rPr lang="fa-IR" sz="4800" dirty="0" smtClean="0">
+                <a:effectLst>
+                  <a:outerShdw blurRad="38100" dist="38100" dir="2700000" algn="tl">
+                    <a:srgbClr val="000000">
+                      <a:alpha val="43137"/>
+                    </a:srgbClr>
+                  </a:outerShdw>
+                </a:effectLst>
+                <a:latin typeface="Adobe Arabic" panose="02040503050201020203" pitchFamily="18" charset="-78"/>
+                <a:cs typeface="Adobe Arabic" panose="02040503050201020203" pitchFamily="18" charset="-78"/>
+              </a:rPr>
+              <a:t>ضرر نزنید </a:t>
+            </a:r>
+            <a:r>
+              <a:rPr lang="en-US" sz="4800" dirty="0" smtClean="0">
+                <a:effectLst>
+                  <a:outerShdw blurRad="38100" dist="38100" dir="2700000" algn="tl">
+                    <a:srgbClr val="000000">
+                      <a:alpha val="43137"/>
+                    </a:srgbClr>
+                  </a:outerShdw>
+                </a:effectLst>
+                <a:latin typeface="Adobe Arabic" panose="02040503050201020203" pitchFamily="18" charset="-78"/>
+                <a:cs typeface="Adobe Arabic" panose="02040503050201020203" pitchFamily="18" charset="-78"/>
+              </a:rPr>
+              <a:t>!!!</a:t>
+            </a:r>
+            <a:endParaRPr lang="en-US" sz="4800" dirty="0">
+              <a:effectLst>
+                <a:outerShdw blurRad="38100" dist="38100" dir="2700000" algn="tl">
+                  <a:srgbClr val="000000">
+                    <a:alpha val="43137"/>
+                  </a:srgbClr>
+                </a:outerShdw>
+              </a:effectLst>
+              <a:latin typeface="Adobe Arabic" panose="02040503050201020203" pitchFamily="18" charset="-78"/>
+              <a:cs typeface="Adobe Arabic" panose="02040503050201020203" pitchFamily="18" charset="-78"/>
+            </a:endParaRPr>
+          </a:p>
+        </p:txBody>
+      </p:sp>
+      <p:pic>
+        <p:nvPicPr>
+          <p:cNvPr id="5" name="Picture 4"/>
+          <p:cNvPicPr>
+            <a:picLocks noChangeAspect="1"/>
+          </p:cNvPicPr>
+          <p:nvPr/>
+        </p:nvPicPr>
+        <p:blipFill>
+          <a:blip r:embed="rId2">
+            <a:extLst>
+              <a:ext uri="{BEBA8EAE-BF5A-486C-A8C5-ECC9F3942E4B}">
+                <a14:imgProps xmlns:a14="http://schemas.microsoft.com/office/drawing/2010/main">
+                  <a14:imgLayer r:embed="rId3">
+                    <a14:imgEffect>
+                      <a14:sharpenSoften amount="50000"/>
+                    </a14:imgEffect>
+                  </a14:imgLayer>
+                </a14:imgProps>
+              </a:ext>
+              <a:ext uri="{28A0092B-C50C-407E-A947-70E740481C1C}">
+                <a14:useLocalDpi xmlns:a14="http://schemas.microsoft.com/office/drawing/2010/main" val="0"/>
+              </a:ext>
+            </a:extLst>
+          </a:blip>
+          <a:stretch>
+            <a:fillRect/>
+          </a:stretch>
+        </p:blipFill>
+        <p:spPr>
+          <a:xfrm>
+            <a:off x="190500" y="2505399"/>
+            <a:ext cx="4377123" cy="3282842"/>
+          </a:xfrm>
+          <a:prstGeom prst="ellipse">
+            <a:avLst/>
+          </a:prstGeom>
+          <a:ln>
+            <a:solidFill>
+              <a:schemeClr val="accent6">
+                <a:lumMod val="40000"/>
+                <a:lumOff val="60000"/>
+              </a:schemeClr>
+            </a:solidFill>
+          </a:ln>
+          <a:effectLst>
+            <a:softEdge rad="112500"/>
+          </a:effectLst>
+        </p:spPr>
+      </p:pic>
+      <p:sp>
+        <p:nvSpPr>
+          <p:cNvPr id="4" name="TextBox 3"/>
+          <p:cNvSpPr txBox="1"/>
+          <p:nvPr/>
+        </p:nvSpPr>
+        <p:spPr>
+          <a:xfrm>
+            <a:off x="2847598" y="2679698"/>
+            <a:ext cx="8534400" cy="3108543"/>
+          </a:xfrm>
+          <a:prstGeom prst="rect">
+            <a:avLst/>
+          </a:prstGeom>
+          <a:noFill/>
+        </p:spPr>
+        <p:txBody>
+          <a:bodyPr wrap="square" rtlCol="0">
+            <a:spAutoFit/>
+          </a:bodyPr>
+          <a:lstStyle/>
+          <a:p>
+            <a:pPr marL="457200" indent="-457200" algn="r" rtl="1">
+              <a:buFont typeface="Arial" panose="020B0604020202020204" pitchFamily="34" charset="0"/>
+              <a:buChar char="•"/>
+            </a:pPr>
+            <a:r>
+              <a:rPr lang="fa-IR" sz="2800" dirty="0">
+                <a:effectLst>
+                  <a:outerShdw blurRad="38100" dist="38100" dir="2700000" algn="tl">
+                    <a:srgbClr val="000000">
+                      <a:alpha val="43137"/>
+                    </a:srgbClr>
+                  </a:outerShdw>
+                </a:effectLst>
+                <a:latin typeface="Adobe Arabic" panose="02040503050201020203" pitchFamily="18" charset="-78"/>
+                <a:cs typeface="Adobe Arabic" panose="02040503050201020203" pitchFamily="18" charset="-78"/>
+              </a:rPr>
+              <a:t> باگ ایجاد </a:t>
+            </a:r>
+            <a:r>
+              <a:rPr lang="fa-IR" sz="2800" dirty="0" smtClean="0">
+                <a:effectLst>
+                  <a:outerShdw blurRad="38100" dist="38100" dir="2700000" algn="tl">
+                    <a:srgbClr val="000000">
+                      <a:alpha val="43137"/>
+                    </a:srgbClr>
+                  </a:outerShdw>
+                </a:effectLst>
+                <a:latin typeface="Adobe Arabic" panose="02040503050201020203" pitchFamily="18" charset="-78"/>
+                <a:cs typeface="Adobe Arabic" panose="02040503050201020203" pitchFamily="18" charset="-78"/>
+              </a:rPr>
+              <a:t>نکنید .</a:t>
+            </a:r>
+            <a:endParaRPr lang="fa-IR" sz="2800" dirty="0">
+              <a:effectLst>
+                <a:outerShdw blurRad="38100" dist="38100" dir="2700000" algn="tl">
+                  <a:srgbClr val="000000">
+                    <a:alpha val="43137"/>
+                  </a:srgbClr>
+                </a:outerShdw>
+              </a:effectLst>
+              <a:latin typeface="Adobe Arabic" panose="02040503050201020203" pitchFamily="18" charset="-78"/>
+              <a:cs typeface="Adobe Arabic" panose="02040503050201020203" pitchFamily="18" charset="-78"/>
+            </a:endParaRPr>
+          </a:p>
+          <a:p>
+            <a:pPr marL="457200" indent="-457200" algn="r" rtl="1">
+              <a:buFont typeface="Arial" panose="020B0604020202020204" pitchFamily="34" charset="0"/>
+              <a:buChar char="•"/>
+            </a:pPr>
+            <a:r>
+              <a:rPr lang="fa-IR" sz="2800" dirty="0">
+                <a:effectLst>
+                  <a:outerShdw blurRad="38100" dist="38100" dir="2700000" algn="tl">
+                    <a:srgbClr val="000000">
+                      <a:alpha val="43137"/>
+                    </a:srgbClr>
+                  </a:outerShdw>
+                </a:effectLst>
+                <a:latin typeface="Adobe Arabic" panose="02040503050201020203" pitchFamily="18" charset="-78"/>
+                <a:cs typeface="Adobe Arabic" panose="02040503050201020203" pitchFamily="18" charset="-78"/>
+              </a:rPr>
+              <a:t> معذرت خواهی </a:t>
+            </a:r>
+            <a:r>
+              <a:rPr lang="fa-IR" sz="2800" dirty="0" smtClean="0">
+                <a:effectLst>
+                  <a:outerShdw blurRad="38100" dist="38100" dir="2700000" algn="tl">
+                    <a:srgbClr val="000000">
+                      <a:alpha val="43137"/>
+                    </a:srgbClr>
+                  </a:outerShdw>
+                </a:effectLst>
+                <a:latin typeface="Adobe Arabic" panose="02040503050201020203" pitchFamily="18" charset="-78"/>
+                <a:cs typeface="Adobe Arabic" panose="02040503050201020203" pitchFamily="18" charset="-78"/>
+              </a:rPr>
+              <a:t>کنید .</a:t>
+            </a:r>
+            <a:endParaRPr lang="fa-IR" sz="2800" dirty="0">
+              <a:effectLst>
+                <a:outerShdw blurRad="38100" dist="38100" dir="2700000" algn="tl">
+                  <a:srgbClr val="000000">
+                    <a:alpha val="43137"/>
+                  </a:srgbClr>
+                </a:outerShdw>
+              </a:effectLst>
+              <a:latin typeface="Adobe Arabic" panose="02040503050201020203" pitchFamily="18" charset="-78"/>
+              <a:cs typeface="Adobe Arabic" panose="02040503050201020203" pitchFamily="18" charset="-78"/>
+            </a:endParaRPr>
+          </a:p>
+          <a:p>
+            <a:pPr marL="457200" indent="-457200" algn="r" rtl="1">
+              <a:buFont typeface="Arial" panose="020B0604020202020204" pitchFamily="34" charset="0"/>
+              <a:buChar char="•"/>
+            </a:pPr>
+            <a:r>
+              <a:rPr lang="fa-IR" sz="2800" dirty="0">
+                <a:effectLst>
+                  <a:outerShdw blurRad="38100" dist="38100" dir="2700000" algn="tl">
+                    <a:srgbClr val="000000">
+                      <a:alpha val="43137"/>
+                    </a:srgbClr>
+                  </a:outerShdw>
+                </a:effectLst>
+                <a:latin typeface="Adobe Arabic" panose="02040503050201020203" pitchFamily="18" charset="-78"/>
+                <a:cs typeface="Adobe Arabic" panose="02040503050201020203" pitchFamily="18" charset="-78"/>
+              </a:rPr>
+              <a:t>تیم کنترل کیفیت نباید خطایی </a:t>
+            </a:r>
+            <a:r>
+              <a:rPr lang="fa-IR" sz="2800" dirty="0" smtClean="0">
+                <a:effectLst>
+                  <a:outerShdw blurRad="38100" dist="38100" dir="2700000" algn="tl">
+                    <a:srgbClr val="000000">
+                      <a:alpha val="43137"/>
+                    </a:srgbClr>
+                  </a:outerShdw>
+                </a:effectLst>
+                <a:latin typeface="Adobe Arabic" panose="02040503050201020203" pitchFamily="18" charset="-78"/>
+                <a:cs typeface="Adobe Arabic" panose="02040503050201020203" pitchFamily="18" charset="-78"/>
+              </a:rPr>
+              <a:t>بیابد. </a:t>
+            </a:r>
+            <a:endParaRPr lang="fa-IR" sz="2800" dirty="0">
+              <a:effectLst>
+                <a:outerShdw blurRad="38100" dist="38100" dir="2700000" algn="tl">
+                  <a:srgbClr val="000000">
+                    <a:alpha val="43137"/>
+                  </a:srgbClr>
+                </a:outerShdw>
+              </a:effectLst>
+              <a:latin typeface="Adobe Arabic" panose="02040503050201020203" pitchFamily="18" charset="-78"/>
+              <a:cs typeface="Adobe Arabic" panose="02040503050201020203" pitchFamily="18" charset="-78"/>
+            </a:endParaRPr>
+          </a:p>
+          <a:p>
+            <a:pPr marL="457200" indent="-457200" algn="r" rtl="1">
+              <a:buFont typeface="Arial" panose="020B0604020202020204" pitchFamily="34" charset="0"/>
+              <a:buChar char="•"/>
+            </a:pPr>
+            <a:r>
+              <a:rPr lang="fa-IR" sz="2800" dirty="0">
+                <a:effectLst>
+                  <a:outerShdw blurRad="38100" dist="38100" dir="2700000" algn="tl">
+                    <a:srgbClr val="000000">
+                      <a:alpha val="43137"/>
+                    </a:srgbClr>
+                  </a:outerShdw>
+                </a:effectLst>
+                <a:latin typeface="Adobe Arabic" panose="02040503050201020203" pitchFamily="18" charset="-78"/>
+                <a:cs typeface="Adobe Arabic" panose="02040503050201020203" pitchFamily="18" charset="-78"/>
+              </a:rPr>
+              <a:t> باید مطمئن باشید که کدتان کار می کند . </a:t>
+            </a:r>
+          </a:p>
+          <a:p>
+            <a:pPr marL="457200" indent="-457200" algn="r" rtl="1">
+              <a:buFont typeface="Arial" panose="020B0604020202020204" pitchFamily="34" charset="0"/>
+              <a:buChar char="•"/>
+            </a:pPr>
+            <a:r>
+              <a:rPr lang="fa-IR" sz="2800" dirty="0">
+                <a:effectLst>
+                  <a:outerShdw blurRad="38100" dist="38100" dir="2700000" algn="tl">
+                    <a:srgbClr val="000000">
+                      <a:alpha val="43137"/>
+                    </a:srgbClr>
+                  </a:outerShdw>
+                </a:effectLst>
+                <a:latin typeface="Adobe Arabic" panose="02040503050201020203" pitchFamily="18" charset="-78"/>
+                <a:cs typeface="Adobe Arabic" panose="02040503050201020203" pitchFamily="18" charset="-78"/>
+              </a:rPr>
+              <a:t>تست های خودکار داشته باشید .</a:t>
+            </a:r>
+          </a:p>
+          <a:p>
+            <a:pPr marL="457200" indent="-457200" algn="r" rtl="1">
+              <a:buFont typeface="Arial" panose="020B0604020202020204" pitchFamily="34" charset="0"/>
+              <a:buChar char="•"/>
+            </a:pPr>
+            <a:r>
+              <a:rPr lang="fa-IR" sz="2800" dirty="0">
+                <a:effectLst>
+                  <a:outerShdw blurRad="38100" dist="38100" dir="2700000" algn="tl">
+                    <a:srgbClr val="000000">
+                      <a:alpha val="43137"/>
+                    </a:srgbClr>
+                  </a:outerShdw>
+                </a:effectLst>
+                <a:latin typeface="Adobe Arabic" panose="02040503050201020203" pitchFamily="18" charset="-78"/>
+                <a:cs typeface="Adobe Arabic" panose="02040503050201020203" pitchFamily="18" charset="-78"/>
+              </a:rPr>
+              <a:t>به ساختار صدمه </a:t>
+            </a:r>
+            <a:r>
+              <a:rPr lang="fa-IR" sz="2800" dirty="0" smtClean="0">
+                <a:effectLst>
+                  <a:outerShdw blurRad="38100" dist="38100" dir="2700000" algn="tl">
+                    <a:srgbClr val="000000">
+                      <a:alpha val="43137"/>
+                    </a:srgbClr>
+                  </a:outerShdw>
+                </a:effectLst>
+                <a:latin typeface="Adobe Arabic" panose="02040503050201020203" pitchFamily="18" charset="-78"/>
+                <a:cs typeface="Adobe Arabic" panose="02040503050201020203" pitchFamily="18" charset="-78"/>
+              </a:rPr>
+              <a:t>نزنید. </a:t>
+            </a:r>
+            <a:endParaRPr lang="fa-IR" sz="2800" dirty="0">
+              <a:effectLst>
+                <a:outerShdw blurRad="38100" dist="38100" dir="2700000" algn="tl">
+                  <a:srgbClr val="000000">
+                    <a:alpha val="43137"/>
+                  </a:srgbClr>
+                </a:outerShdw>
+              </a:effectLst>
+              <a:latin typeface="Adobe Arabic" panose="02040503050201020203" pitchFamily="18" charset="-78"/>
+              <a:cs typeface="Adobe Arabic" panose="02040503050201020203" pitchFamily="18" charset="-78"/>
+            </a:endParaRPr>
+          </a:p>
+          <a:p>
+            <a:pPr marL="457200" indent="-457200" algn="r" rtl="1">
+              <a:buFont typeface="Arial" panose="020B0604020202020204" pitchFamily="34" charset="0"/>
+              <a:buChar char="•"/>
+            </a:pPr>
+            <a:r>
+              <a:rPr lang="fa-IR" sz="2800" dirty="0">
+                <a:effectLst>
+                  <a:outerShdw blurRad="38100" dist="38100" dir="2700000" algn="tl">
+                    <a:srgbClr val="000000">
+                      <a:alpha val="43137"/>
+                    </a:srgbClr>
+                  </a:outerShdw>
+                </a:effectLst>
+                <a:latin typeface="Adobe Arabic" panose="02040503050201020203" pitchFamily="18" charset="-78"/>
+                <a:cs typeface="Adobe Arabic" panose="02040503050201020203" pitchFamily="18" charset="-78"/>
+              </a:rPr>
+              <a:t>باید بتوانید هر لحظه که اراده می کنید ، کدتان را </a:t>
+            </a:r>
+            <a:r>
+              <a:rPr lang="en-US" sz="2800" dirty="0">
+                <a:effectLst>
+                  <a:outerShdw blurRad="38100" dist="38100" dir="2700000" algn="tl">
+                    <a:srgbClr val="000000">
+                      <a:alpha val="43137"/>
+                    </a:srgbClr>
+                  </a:outerShdw>
+                </a:effectLst>
+                <a:latin typeface="Adobe Arabic" panose="02040503050201020203" pitchFamily="18" charset="-78"/>
+                <a:cs typeface="Adobe Arabic" panose="02040503050201020203" pitchFamily="18" charset="-78"/>
+              </a:rPr>
+              <a:t>Refactor </a:t>
+            </a:r>
+            <a:r>
+              <a:rPr lang="fa-IR" sz="2800" dirty="0" smtClean="0">
+                <a:effectLst>
+                  <a:outerShdw blurRad="38100" dist="38100" dir="2700000" algn="tl">
+                    <a:srgbClr val="000000">
+                      <a:alpha val="43137"/>
+                    </a:srgbClr>
+                  </a:outerShdw>
+                </a:effectLst>
+                <a:latin typeface="Adobe Arabic" panose="02040503050201020203" pitchFamily="18" charset="-78"/>
+                <a:cs typeface="Adobe Arabic" panose="02040503050201020203" pitchFamily="18" charset="-78"/>
+              </a:rPr>
+              <a:t> کنید </a:t>
+            </a:r>
+            <a:r>
+              <a:rPr lang="fa-IR" sz="2800" dirty="0">
+                <a:effectLst>
+                  <a:outerShdw blurRad="38100" dist="38100" dir="2700000" algn="tl">
+                    <a:srgbClr val="000000">
+                      <a:alpha val="43137"/>
+                    </a:srgbClr>
+                  </a:outerShdw>
+                </a:effectLst>
+                <a:latin typeface="Adobe Arabic" panose="02040503050201020203" pitchFamily="18" charset="-78"/>
+                <a:cs typeface="Adobe Arabic" panose="02040503050201020203" pitchFamily="18" charset="-78"/>
+              </a:rPr>
+              <a:t>. </a:t>
+            </a:r>
+            <a:endParaRPr lang="en-US" sz="2800" dirty="0">
+              <a:effectLst>
+                <a:outerShdw blurRad="38100" dist="38100" dir="2700000" algn="tl">
+                  <a:srgbClr val="000000">
+                    <a:alpha val="43137"/>
+                  </a:srgbClr>
+                </a:outerShdw>
+              </a:effectLst>
+              <a:latin typeface="Adobe Arabic" panose="02040503050201020203" pitchFamily="18" charset="-78"/>
+              <a:cs typeface="Adobe Arabic" panose="02040503050201020203" pitchFamily="18" charset="-78"/>
+            </a:endParaRPr>
+          </a:p>
+        </p:txBody>
+      </p:sp>
+    </p:spTree>
+    <p:extLst>
+      <p:ext uri="{BB962C8B-B14F-4D97-AF65-F5344CB8AC3E}">
+        <p14:creationId xmlns:p14="http://schemas.microsoft.com/office/powerpoint/2010/main" val="703082084"/>
+      </p:ext>
+    </p:extLst>
+  </p:cSld>
+  <p:clrMapOvr>
+    <a:masterClrMapping/>
+  </p:clrMapOvr>
+</p:sld>
+</file>
+
 <file path=ppt/theme/theme1.xml><?xml version="1.0" encoding="utf-8"?>
 <a:theme xmlns:a="http://schemas.openxmlformats.org/drawingml/2006/main" name="Quotable">
   <a:themeElements>

</xml_diff>

<commit_message>
Add Work Ethic Page
</commit_message>
<xml_diff>
--- a/The Clean Coder.pptx
+++ b/The Clean Coder.pptx
@@ -9,6 +9,8 @@
     <p:sldId id="257" r:id="rId3"/>
     <p:sldId id="258" r:id="rId4"/>
     <p:sldId id="259" r:id="rId5"/>
+    <p:sldId id="260" r:id="rId6"/>
+    <p:sldId id="261" r:id="rId7"/>
   </p:sldIdLst>
   <p:sldSz cx="12192000" cy="6858000"/>
   <p:notesSz cx="6858000" cy="9144000"/>
@@ -210,7 +212,7 @@
           <a:effectLst/>
           <a:extLst>
             <a:ext uri="{91240B29-F687-4f45-9708-019B960494DF}">
-              <a14:hiddenLine xmlns="" xmlns:a14="http://schemas.microsoft.com/office/drawing/2010/main" w="9525">
+              <a14:hiddenLine xmlns:a14="http://schemas.microsoft.com/office/drawing/2010/main" xmlns="" w="9525">
                 <a:solidFill>
                   <a:srgbClr val="000000"/>
                 </a:solidFill>
@@ -403,7 +405,7 @@
             <a:fld id="{B61BEF0D-F0BB-DE4B-95CE-6DB70DBA9567}" type="datetimeFigureOut">
               <a:rPr lang="en-US" smtClean="0"/>
               <a:pPr/>
-              <a:t>7/8/2019</a:t>
+              <a:t>7/9/2019</a:t>
             </a:fld>
             <a:endParaRPr lang="en-US" dirty="0"/>
           </a:p>
@@ -723,7 +725,7 @@
             <a:fld id="{B61BEF0D-F0BB-DE4B-95CE-6DB70DBA9567}" type="datetimeFigureOut">
               <a:rPr lang="en-US" smtClean="0"/>
               <a:pPr/>
-              <a:t>7/8/2019</a:t>
+              <a:t>7/9/2019</a:t>
             </a:fld>
             <a:endParaRPr lang="en-US" dirty="0"/>
           </a:p>
@@ -1213,7 +1215,7 @@
             <a:fld id="{B61BEF0D-F0BB-DE4B-95CE-6DB70DBA9567}" type="datetimeFigureOut">
               <a:rPr lang="en-US" smtClean="0"/>
               <a:pPr/>
-              <a:t>7/8/2019</a:t>
+              <a:t>7/9/2019</a:t>
             </a:fld>
             <a:endParaRPr lang="en-US" dirty="0"/>
           </a:p>
@@ -1584,7 +1586,7 @@
             <a:fld id="{B61BEF0D-F0BB-DE4B-95CE-6DB70DBA9567}" type="datetimeFigureOut">
               <a:rPr lang="en-US" smtClean="0"/>
               <a:pPr/>
-              <a:t>7/8/2019</a:t>
+              <a:t>7/9/2019</a:t>
             </a:fld>
             <a:endParaRPr lang="en-US" dirty="0"/>
           </a:p>
@@ -1740,7 +1742,7 @@
           <a:ln/>
           <a:extLst>
             <a:ext uri="{91240B29-F687-4f45-9708-019B960494DF}">
-              <a14:hiddenLine xmlns="" xmlns:a14="http://schemas.microsoft.com/office/drawing/2010/main" w="9525">
+              <a14:hiddenLine xmlns:a14="http://schemas.microsoft.com/office/drawing/2010/main" xmlns="" w="9525">
                 <a:solidFill>
                   <a:srgbClr val="000000"/>
                 </a:solidFill>
@@ -1859,7 +1861,7 @@
             <a:fld id="{B61BEF0D-F0BB-DE4B-95CE-6DB70DBA9567}" type="datetimeFigureOut">
               <a:rPr lang="en-US" smtClean="0"/>
               <a:pPr/>
-              <a:t>7/8/2019</a:t>
+              <a:t>7/9/2019</a:t>
             </a:fld>
             <a:endParaRPr lang="en-US" dirty="0"/>
           </a:p>
@@ -2017,7 +2019,7 @@
           <a:ln/>
           <a:extLst>
             <a:ext uri="{91240B29-F687-4f45-9708-019B960494DF}">
-              <a14:hiddenLine xmlns="" xmlns:a14="http://schemas.microsoft.com/office/drawing/2010/main" w="9525">
+              <a14:hiddenLine xmlns:a14="http://schemas.microsoft.com/office/drawing/2010/main" xmlns="" w="9525">
                 <a:solidFill>
                   <a:srgbClr val="000000"/>
                 </a:solidFill>
@@ -2146,7 +2148,7 @@
             <a:fld id="{B61BEF0D-F0BB-DE4B-95CE-6DB70DBA9567}" type="datetimeFigureOut">
               <a:rPr lang="en-US" smtClean="0"/>
               <a:pPr/>
-              <a:t>7/8/2019</a:t>
+              <a:t>7/9/2019</a:t>
             </a:fld>
             <a:endParaRPr lang="en-US" dirty="0"/>
           </a:p>
@@ -2302,7 +2304,7 @@
           <a:ln/>
           <a:extLst>
             <a:ext uri="{91240B29-F687-4f45-9708-019B960494DF}">
-              <a14:hiddenLine xmlns="" xmlns:a14="http://schemas.microsoft.com/office/drawing/2010/main" w="9525">
+              <a14:hiddenLine xmlns:a14="http://schemas.microsoft.com/office/drawing/2010/main" xmlns="" w="9525">
                 <a:solidFill>
                   <a:srgbClr val="000000"/>
                 </a:solidFill>
@@ -2431,7 +2433,7 @@
             <a:fld id="{B61BEF0D-F0BB-DE4B-95CE-6DB70DBA9567}" type="datetimeFigureOut">
               <a:rPr lang="en-US" smtClean="0"/>
               <a:pPr/>
-              <a:t>7/8/2019</a:t>
+              <a:t>7/9/2019</a:t>
             </a:fld>
             <a:endParaRPr lang="en-US" dirty="0"/>
           </a:p>
@@ -2776,7 +2778,7 @@
             <a:fld id="{B61BEF0D-F0BB-DE4B-95CE-6DB70DBA9567}" type="datetimeFigureOut">
               <a:rPr lang="en-US" smtClean="0"/>
               <a:pPr/>
-              <a:t>7/8/2019</a:t>
+              <a:t>7/9/2019</a:t>
             </a:fld>
             <a:endParaRPr lang="en-US" dirty="0"/>
           </a:p>
@@ -2932,7 +2934,7 @@
           <a:ln/>
           <a:extLst>
             <a:ext uri="{91240B29-F687-4f45-9708-019B960494DF}">
-              <a14:hiddenLine xmlns="" xmlns:a14="http://schemas.microsoft.com/office/drawing/2010/main" w="9525">
+              <a14:hiddenLine xmlns:a14="http://schemas.microsoft.com/office/drawing/2010/main" xmlns="" w="9525">
                 <a:solidFill>
                   <a:srgbClr val="000000"/>
                 </a:solidFill>
@@ -3117,7 +3119,7 @@
             <a:fld id="{B61BEF0D-F0BB-DE4B-95CE-6DB70DBA9567}" type="datetimeFigureOut">
               <a:rPr lang="en-US" smtClean="0"/>
               <a:pPr/>
-              <a:t>7/8/2019</a:t>
+              <a:t>7/9/2019</a:t>
             </a:fld>
             <a:endParaRPr lang="en-US" dirty="0"/>
           </a:p>
@@ -3273,7 +3275,7 @@
           <a:ln/>
           <a:extLst>
             <a:ext uri="{91240B29-F687-4f45-9708-019B960494DF}">
-              <a14:hiddenLine xmlns="" xmlns:a14="http://schemas.microsoft.com/office/drawing/2010/main" w="9525">
+              <a14:hiddenLine xmlns:a14="http://schemas.microsoft.com/office/drawing/2010/main" xmlns="" w="9525">
                 <a:solidFill>
                   <a:srgbClr val="000000"/>
                 </a:solidFill>
@@ -3596,7 +3598,7 @@
             <a:fld id="{B61BEF0D-F0BB-DE4B-95CE-6DB70DBA9567}" type="datetimeFigureOut">
               <a:rPr lang="en-US" smtClean="0"/>
               <a:pPr/>
-              <a:t>7/8/2019</a:t>
+              <a:t>7/9/2019</a:t>
             </a:fld>
             <a:endParaRPr lang="en-US" dirty="0"/>
           </a:p>
@@ -3752,7 +3754,7 @@
           <a:ln/>
           <a:extLst>
             <a:ext uri="{91240B29-F687-4f45-9708-019B960494DF}">
-              <a14:hiddenLine xmlns="" xmlns:a14="http://schemas.microsoft.com/office/drawing/2010/main" w="9525">
+              <a14:hiddenLine xmlns:a14="http://schemas.microsoft.com/office/drawing/2010/main" xmlns="" w="9525">
                 <a:solidFill>
                   <a:srgbClr val="000000"/>
                 </a:solidFill>
@@ -3819,7 +3821,7 @@
             <a:fld id="{B61BEF0D-F0BB-DE4B-95CE-6DB70DBA9567}" type="datetimeFigureOut">
               <a:rPr lang="en-US" smtClean="0"/>
               <a:pPr/>
-              <a:t>7/8/2019</a:t>
+              <a:t>7/9/2019</a:t>
             </a:fld>
             <a:endParaRPr lang="en-US" dirty="0"/>
           </a:p>
@@ -3916,7 +3918,7 @@
             <a:fld id="{B61BEF0D-F0BB-DE4B-95CE-6DB70DBA9567}" type="datetimeFigureOut">
               <a:rPr lang="en-US" smtClean="0"/>
               <a:pPr/>
-              <a:t>7/8/2019</a:t>
+              <a:t>7/9/2019</a:t>
             </a:fld>
             <a:endParaRPr lang="en-US" dirty="0"/>
           </a:p>
@@ -4185,7 +4187,7 @@
           <a:ln/>
           <a:extLst>
             <a:ext uri="{91240B29-F687-4f45-9708-019B960494DF}">
-              <a14:hiddenLine xmlns="" xmlns:a14="http://schemas.microsoft.com/office/drawing/2010/main" w="9525">
+              <a14:hiddenLine xmlns:a14="http://schemas.microsoft.com/office/drawing/2010/main" xmlns="" w="9525">
                 <a:solidFill>
                   <a:srgbClr val="000000"/>
                 </a:solidFill>
@@ -4385,7 +4387,7 @@
             <a:fld id="{B61BEF0D-F0BB-DE4B-95CE-6DB70DBA9567}" type="datetimeFigureOut">
               <a:rPr lang="en-US" smtClean="0"/>
               <a:pPr/>
-              <a:t>7/8/2019</a:t>
+              <a:t>7/9/2019</a:t>
             </a:fld>
             <a:endParaRPr lang="en-US" dirty="0"/>
           </a:p>
@@ -4700,7 +4702,7 @@
             <a:fld id="{B61BEF0D-F0BB-DE4B-95CE-6DB70DBA9567}" type="datetimeFigureOut">
               <a:rPr lang="en-US" smtClean="0"/>
               <a:pPr/>
-              <a:t>7/8/2019</a:t>
+              <a:t>7/9/2019</a:t>
             </a:fld>
             <a:endParaRPr lang="en-US" dirty="0"/>
           </a:p>
@@ -4972,7 +4974,7 @@
             <a:fld id="{B61BEF0D-F0BB-DE4B-95CE-6DB70DBA9567}" type="datetimeFigureOut">
               <a:rPr lang="en-US" smtClean="0"/>
               <a:pPr/>
-              <a:t>7/8/2019</a:t>
+              <a:t>7/9/2019</a:t>
             </a:fld>
             <a:endParaRPr lang="en-US" dirty="0"/>
           </a:p>
@@ -5775,13 +5777,6 @@
                 <a:solidFill>
                   <a:schemeClr val="tx1"/>
                 </a:solidFill>
-                <a:effectLst>
-                  <a:outerShdw blurRad="12700" dist="38100" dir="2700000" algn="tl" rotWithShape="0">
-                    <a:schemeClr val="bg1">
-                      <a:lumMod val="50000"/>
-                    </a:schemeClr>
-                  </a:outerShdw>
-                </a:effectLst>
                 <a:latin typeface="Adobe Arabic" panose="02040503050201020203" pitchFamily="18" charset="-78"/>
                 <a:cs typeface="Adobe Arabic" panose="02040503050201020203" pitchFamily="18" charset="-78"/>
               </a:rPr>
@@ -5797,13 +5792,6 @@
               <a:solidFill>
                 <a:schemeClr val="tx1"/>
               </a:solidFill>
-              <a:effectLst>
-                <a:outerShdw blurRad="12700" dist="38100" dir="2700000" algn="tl" rotWithShape="0">
-                  <a:schemeClr val="bg1">
-                    <a:lumMod val="50000"/>
-                  </a:schemeClr>
-                </a:outerShdw>
-              </a:effectLst>
               <a:latin typeface="Adobe Arabic" panose="02040503050201020203" pitchFamily="18" charset="-78"/>
               <a:cs typeface="Adobe Arabic" panose="02040503050201020203" pitchFamily="18" charset="-78"/>
             </a:endParaRPr>
@@ -6204,7 +6192,10 @@
               <a:buNone/>
             </a:pPr>
             <a:r>
-              <a:rPr lang="fa-IR" sz="3200" dirty="0" smtClean="0">
+              <a:rPr lang="fa-IR" sz="3200" b="1" dirty="0" smtClean="0">
+                <a:solidFill>
+                  <a:srgbClr val="FFFF00"/>
+                </a:solidFill>
                 <a:effectLst>
                   <a:outerShdw blurRad="38100" dist="38100" dir="2700000" algn="tl">
                     <a:srgbClr val="000000">
@@ -6215,7 +6206,75 @@
                 <a:latin typeface="Adobe Arabic" panose="02040503050201020203" pitchFamily="18" charset="-78"/>
                 <a:cs typeface="Adobe Arabic" panose="02040503050201020203" pitchFamily="18" charset="-78"/>
               </a:rPr>
-              <a:t>حرفه ای گری در مورد مسئولیت پذیری است .</a:t>
+              <a:t>مهمترین اصل </a:t>
+            </a:r>
+            <a:r>
+              <a:rPr lang="fa-IR" sz="3200" b="1" dirty="0" smtClean="0">
+                <a:solidFill>
+                  <a:srgbClr val="FFFF00"/>
+                </a:solidFill>
+                <a:effectLst>
+                  <a:outerShdw blurRad="38100" dist="38100" dir="2700000" algn="tl">
+                    <a:srgbClr val="000000">
+                      <a:alpha val="43137"/>
+                    </a:srgbClr>
+                  </a:outerShdw>
+                </a:effectLst>
+                <a:latin typeface="Adobe Arabic" panose="02040503050201020203" pitchFamily="18" charset="-78"/>
+                <a:cs typeface="Adobe Arabic" panose="02040503050201020203" pitchFamily="18" charset="-78"/>
+              </a:rPr>
+              <a:t>حرفه </a:t>
+            </a:r>
+            <a:r>
+              <a:rPr lang="fa-IR" sz="3200" b="1" dirty="0" smtClean="0">
+                <a:solidFill>
+                  <a:srgbClr val="FFFF00"/>
+                </a:solidFill>
+                <a:effectLst>
+                  <a:outerShdw blurRad="38100" dist="38100" dir="2700000" algn="tl">
+                    <a:srgbClr val="000000">
+                      <a:alpha val="43137"/>
+                    </a:srgbClr>
+                  </a:outerShdw>
+                </a:effectLst>
+                <a:latin typeface="Adobe Arabic" panose="02040503050201020203" pitchFamily="18" charset="-78"/>
+                <a:cs typeface="Adobe Arabic" panose="02040503050201020203" pitchFamily="18" charset="-78"/>
+              </a:rPr>
+              <a:t>ای گری </a:t>
+            </a:r>
+            <a:r>
+              <a:rPr lang="fa-IR" sz="3200" b="1" dirty="0" smtClean="0">
+                <a:solidFill>
+                  <a:srgbClr val="FFFF00"/>
+                </a:solidFill>
+                <a:effectLst>
+                  <a:outerShdw blurRad="38100" dist="38100" dir="2700000" algn="tl">
+                    <a:srgbClr val="000000">
+                      <a:alpha val="43137"/>
+                    </a:srgbClr>
+                  </a:outerShdw>
+                </a:effectLst>
+                <a:latin typeface="Adobe Arabic" panose="02040503050201020203" pitchFamily="18" charset="-78"/>
+                <a:cs typeface="Adobe Arabic" panose="02040503050201020203" pitchFamily="18" charset="-78"/>
+              </a:rPr>
+              <a:t>، </a:t>
+            </a:r>
+            <a:r>
+              <a:rPr lang="fa-IR" sz="3200" b="1" dirty="0" smtClean="0">
+                <a:solidFill>
+                  <a:srgbClr val="FFFF00"/>
+                </a:solidFill>
+                <a:effectLst>
+                  <a:outerShdw blurRad="38100" dist="38100" dir="2700000" algn="tl">
+                    <a:srgbClr val="000000">
+                      <a:alpha val="43137"/>
+                    </a:srgbClr>
+                  </a:outerShdw>
+                </a:effectLst>
+                <a:latin typeface="Adobe Arabic" panose="02040503050201020203" pitchFamily="18" charset="-78"/>
+                <a:cs typeface="Adobe Arabic" panose="02040503050201020203" pitchFamily="18" charset="-78"/>
+              </a:rPr>
+              <a:t>مسئولیت پذیری است .</a:t>
             </a:r>
           </a:p>
         </p:txBody>
@@ -6228,8 +6287,8 @@
         </p:nvSpPr>
         <p:spPr>
           <a:xfrm>
-            <a:off x="4140200" y="2235200"/>
-            <a:ext cx="6616700" cy="3970318"/>
+            <a:off x="3911600" y="2235200"/>
+            <a:ext cx="6845300" cy="3970318"/>
           </a:xfrm>
           <a:prstGeom prst="rect">
             <a:avLst/>
@@ -6275,7 +6334,35 @@
                 <a:latin typeface="Adobe Arabic" panose="02040503050201020203" pitchFamily="18" charset="-78"/>
                 <a:cs typeface="Adobe Arabic" panose="02040503050201020203" pitchFamily="18" charset="-78"/>
               </a:rPr>
-              <a:t>وجدان کاری داشته </a:t>
+              <a:t>وجدان کاری </a:t>
+            </a:r>
+            <a:r>
+              <a:rPr lang="fa-IR" sz="2800" dirty="0" smtClean="0">
+                <a:latin typeface="Adobe Arabic" panose="02040503050201020203" pitchFamily="18" charset="-78"/>
+                <a:cs typeface="Adobe Arabic" panose="02040503050201020203" pitchFamily="18" charset="-78"/>
+              </a:rPr>
+              <a:t> </a:t>
+            </a:r>
+            <a:r>
+              <a:rPr lang="fa-IR" sz="2800" b="1" dirty="0" smtClean="0">
+                <a:latin typeface="Adobe Arabic" panose="02040503050201020203" pitchFamily="18" charset="-78"/>
+                <a:cs typeface="Adobe Arabic" panose="02040503050201020203" pitchFamily="18" charset="-78"/>
+              </a:rPr>
+              <a:t>( اخلاق حرفه‌ای )</a:t>
+            </a:r>
+            <a:r>
+              <a:rPr lang="fa-IR" sz="2800" dirty="0" smtClean="0">
+                <a:latin typeface="Adobe Arabic" panose="02040503050201020203" pitchFamily="18" charset="-78"/>
+                <a:cs typeface="Adobe Arabic" panose="02040503050201020203" pitchFamily="18" charset="-78"/>
+              </a:rPr>
+              <a:t> </a:t>
+            </a:r>
+            <a:r>
+              <a:rPr lang="fa-IR" sz="2800" dirty="0" smtClean="0">
+                <a:latin typeface="Adobe Arabic" panose="02040503050201020203" pitchFamily="18" charset="-78"/>
+                <a:cs typeface="Adobe Arabic" panose="02040503050201020203" pitchFamily="18" charset="-78"/>
+              </a:rPr>
+              <a:t>داشته </a:t>
             </a:r>
             <a:r>
               <a:rPr lang="fa-IR" sz="2800" dirty="0" smtClean="0">
@@ -6480,14 +6567,22 @@
             <p:ph type="title"/>
           </p:nvPr>
         </p:nvSpPr>
-        <p:spPr/>
+        <p:spPr>
+          <a:xfrm>
+            <a:off x="9575800" y="2177580"/>
+            <a:ext cx="2123698" cy="655638"/>
+          </a:xfrm>
+        </p:spPr>
         <p:txBody>
           <a:bodyPr/>
           <a:lstStyle/>
           <a:p>
             <a:pPr algn="r" rtl="1"/>
             <a:r>
-              <a:rPr lang="fa-IR" sz="4800" dirty="0" smtClean="0">
+              <a:rPr lang="fa-IR" sz="4400" dirty="0" smtClean="0">
+                <a:solidFill>
+                  <a:schemeClr val="tx1"/>
+                </a:solidFill>
                 <a:effectLst>
                   <a:outerShdw blurRad="38100" dist="38100" dir="2700000" algn="tl">
                     <a:srgbClr val="000000">
@@ -6501,7 +6596,10 @@
               <a:t>ضرر نزنید </a:t>
             </a:r>
             <a:r>
-              <a:rPr lang="en-US" sz="4800" dirty="0" smtClean="0">
+              <a:rPr lang="en-US" sz="4400" dirty="0" smtClean="0">
+                <a:solidFill>
+                  <a:schemeClr val="tx1"/>
+                </a:solidFill>
                 <a:effectLst>
                   <a:outerShdw blurRad="38100" dist="38100" dir="2700000" algn="tl">
                     <a:srgbClr val="000000">
@@ -6514,7 +6612,10 @@
               </a:rPr>
               <a:t>!!!</a:t>
             </a:r>
-            <a:endParaRPr lang="en-US" sz="4800" dirty="0">
+            <a:endParaRPr lang="en-US" sz="4400" dirty="0">
+              <a:solidFill>
+                <a:schemeClr val="tx1"/>
+              </a:solidFill>
               <a:effectLst>
                 <a:outerShdw blurRad="38100" dist="38100" dir="2700000" algn="tl">
                   <a:srgbClr val="000000">
@@ -6559,19 +6660,14 @@
         </p:blipFill>
         <p:spPr>
           <a:xfrm>
-            <a:off x="190500" y="2505399"/>
-            <a:ext cx="4377123" cy="3282842"/>
+            <a:off x="358398" y="4300122"/>
+            <a:ext cx="3111112" cy="1728788"/>
           </a:xfrm>
-          <a:prstGeom prst="ellipse">
+          <a:prstGeom prst="rect">
             <a:avLst/>
           </a:prstGeom>
           <a:ln>
-            <a:solidFill>
-              <a:schemeClr val="accent6">
-                <a:lumMod val="40000"/>
-                <a:lumOff val="60000"/>
-              </a:schemeClr>
-            </a:solidFill>
+            <a:noFill/>
           </a:ln>
           <a:effectLst>
             <a:softEdge rad="112500"/>
@@ -6586,8 +6682,8 @@
         </p:nvSpPr>
         <p:spPr>
           <a:xfrm>
-            <a:off x="2847598" y="2679698"/>
-            <a:ext cx="8534400" cy="3108543"/>
+            <a:off x="4254500" y="2920367"/>
+            <a:ext cx="6949698" cy="3108543"/>
           </a:xfrm>
           <a:prstGeom prst="rect">
             <a:avLst/>
@@ -6595,7 +6691,7 @@
           <a:noFill/>
         </p:spPr>
         <p:txBody>
-          <a:bodyPr wrap="square" rtlCol="0">
+          <a:bodyPr wrap="square" numCol="1" rtlCol="0">
             <a:spAutoFit/>
           </a:bodyPr>
           <a:lstStyle/>
@@ -6894,10 +6990,819 @@
           </a:p>
         </p:txBody>
       </p:sp>
+      <p:sp>
+        <p:nvSpPr>
+          <p:cNvPr id="6" name="Title 1"/>
+          <p:cNvSpPr txBox="1">
+            <a:spLocks/>
+          </p:cNvSpPr>
+          <p:nvPr/>
+        </p:nvSpPr>
+        <p:spPr>
+          <a:xfrm>
+            <a:off x="358398" y="546100"/>
+            <a:ext cx="11341100" cy="685800"/>
+          </a:xfrm>
+          <a:prstGeom prst="rect">
+            <a:avLst/>
+          </a:prstGeom>
+          <a:effectLst>
+            <a:outerShdw blurRad="50800" dir="14400000">
+              <a:srgbClr val="000000">
+                <a:alpha val="60000"/>
+              </a:srgbClr>
+            </a:outerShdw>
+          </a:effectLst>
+        </p:spPr>
+        <p:txBody>
+          <a:bodyPr vert="horz" lIns="91440" tIns="45720" rIns="91440" bIns="45720" rtlCol="0" anchor="b">
+            <a:noAutofit/>
+          </a:bodyPr>
+          <a:lstStyle>
+            <a:lvl1pPr algn="l" defTabSz="457200" rtl="0" eaLnBrk="1" latinLnBrk="0" hangingPunct="1">
+              <a:spcBef>
+                <a:spcPct val="0"/>
+              </a:spcBef>
+              <a:buNone/>
+              <a:defRPr sz="4000" b="1" kern="1200">
+                <a:solidFill>
+                  <a:srgbClr val="FEFEFE"/>
+                </a:solidFill>
+                <a:latin typeface="+mj-lt"/>
+                <a:ea typeface="+mj-ea"/>
+                <a:cs typeface="+mj-cs"/>
+              </a:defRPr>
+            </a:lvl1pPr>
+            <a:lvl2pPr eaLnBrk="1" hangingPunct="1">
+              <a:defRPr>
+                <a:solidFill>
+                  <a:schemeClr val="tx2"/>
+                </a:solidFill>
+              </a:defRPr>
+            </a:lvl2pPr>
+            <a:lvl3pPr eaLnBrk="1" hangingPunct="1">
+              <a:defRPr>
+                <a:solidFill>
+                  <a:schemeClr val="tx2"/>
+                </a:solidFill>
+              </a:defRPr>
+            </a:lvl3pPr>
+            <a:lvl4pPr eaLnBrk="1" hangingPunct="1">
+              <a:defRPr>
+                <a:solidFill>
+                  <a:schemeClr val="tx2"/>
+                </a:solidFill>
+              </a:defRPr>
+            </a:lvl4pPr>
+            <a:lvl5pPr eaLnBrk="1" hangingPunct="1">
+              <a:defRPr>
+                <a:solidFill>
+                  <a:schemeClr val="tx2"/>
+                </a:solidFill>
+              </a:defRPr>
+            </a:lvl5pPr>
+            <a:lvl6pPr eaLnBrk="1" hangingPunct="1">
+              <a:defRPr>
+                <a:solidFill>
+                  <a:schemeClr val="tx2"/>
+                </a:solidFill>
+              </a:defRPr>
+            </a:lvl6pPr>
+            <a:lvl7pPr eaLnBrk="1" hangingPunct="1">
+              <a:defRPr>
+                <a:solidFill>
+                  <a:schemeClr val="tx2"/>
+                </a:solidFill>
+              </a:defRPr>
+            </a:lvl7pPr>
+            <a:lvl8pPr eaLnBrk="1" hangingPunct="1">
+              <a:defRPr>
+                <a:solidFill>
+                  <a:schemeClr val="tx2"/>
+                </a:solidFill>
+              </a:defRPr>
+            </a:lvl8pPr>
+            <a:lvl9pPr eaLnBrk="1" hangingPunct="1">
+              <a:defRPr>
+                <a:solidFill>
+                  <a:schemeClr val="tx2"/>
+                </a:solidFill>
+              </a:defRPr>
+            </a:lvl9pPr>
+          </a:lstStyle>
+          <a:p>
+            <a:pPr algn="r" rtl="1"/>
+            <a:r>
+              <a:rPr lang="fa-IR" sz="4400" dirty="0" smtClean="0">
+                <a:effectLst>
+                  <a:outerShdw blurRad="38100" dist="38100" dir="2700000" algn="tl">
+                    <a:srgbClr val="000000">
+                      <a:alpha val="43137"/>
+                    </a:srgbClr>
+                  </a:outerShdw>
+                </a:effectLst>
+                <a:latin typeface="Adobe Arabic" panose="02040503050201020203" pitchFamily="18" charset="-78"/>
+                <a:cs typeface="Adobe Arabic" panose="02040503050201020203" pitchFamily="18" charset="-78"/>
+              </a:rPr>
+              <a:t>فصل اول : حرفه ای گری </a:t>
+            </a:r>
+            <a:endParaRPr lang="en-US" sz="4400" dirty="0">
+              <a:effectLst>
+                <a:outerShdw blurRad="38100" dist="38100" dir="2700000" algn="tl">
+                  <a:srgbClr val="000000">
+                    <a:alpha val="43137"/>
+                  </a:srgbClr>
+                </a:outerShdw>
+              </a:effectLst>
+              <a:latin typeface="Adobe Arabic" panose="02040503050201020203" pitchFamily="18" charset="-78"/>
+              <a:cs typeface="Adobe Arabic" panose="02040503050201020203" pitchFamily="18" charset="-78"/>
+            </a:endParaRPr>
+          </a:p>
+        </p:txBody>
+      </p:sp>
     </p:spTree>
     <p:extLst>
       <p:ext uri="{BB962C8B-B14F-4D97-AF65-F5344CB8AC3E}">
         <p14:creationId xmlns:p14="http://schemas.microsoft.com/office/powerpoint/2010/main" val="703082084"/>
+      </p:ext>
+    </p:extLst>
+  </p:cSld>
+  <p:clrMapOvr>
+    <a:masterClrMapping/>
+  </p:clrMapOvr>
+</p:sld>
+</file>
+
+<file path=ppt/slides/slide5.xml><?xml version="1.0" encoding="utf-8"?>
+<p:sld xmlns:a="http://schemas.openxmlformats.org/drawingml/2006/main" xmlns:r="http://schemas.openxmlformats.org/officeDocument/2006/relationships" xmlns:p="http://schemas.openxmlformats.org/presentationml/2006/main">
+  <p:cSld>
+    <p:spTree>
+      <p:nvGrpSpPr>
+        <p:cNvPr id="1" name=""/>
+        <p:cNvGrpSpPr/>
+        <p:nvPr/>
+      </p:nvGrpSpPr>
+      <p:grpSpPr>
+        <a:xfrm>
+          <a:off x="0" y="0"/>
+          <a:ext cx="0" cy="0"/>
+          <a:chOff x="0" y="0"/>
+          <a:chExt cx="0" cy="0"/>
+        </a:xfrm>
+      </p:grpSpPr>
+      <p:sp>
+        <p:nvSpPr>
+          <p:cNvPr id="2" name="Title 1"/>
+          <p:cNvSpPr>
+            <a:spLocks noGrp="1"/>
+          </p:cNvSpPr>
+          <p:nvPr>
+            <p:ph type="title"/>
+          </p:nvPr>
+        </p:nvSpPr>
+        <p:spPr>
+          <a:xfrm>
+            <a:off x="3492500" y="2034688"/>
+            <a:ext cx="7818249" cy="970450"/>
+          </a:xfrm>
+        </p:spPr>
+        <p:txBody>
+          <a:bodyPr/>
+          <a:lstStyle/>
+          <a:p>
+            <a:pPr algn="r" rtl="1"/>
+            <a:r>
+              <a:rPr lang="fa-IR" sz="4400" dirty="0">
+                <a:effectLst>
+                  <a:outerShdw blurRad="38100" dist="38100" dir="2700000" algn="tl">
+                    <a:srgbClr val="000000">
+                      <a:alpha val="43137"/>
+                    </a:srgbClr>
+                  </a:outerShdw>
+                </a:effectLst>
+                <a:latin typeface="Adobe Arabic" panose="02040503050201020203" pitchFamily="18" charset="-78"/>
+                <a:cs typeface="Adobe Arabic" panose="02040503050201020203" pitchFamily="18" charset="-78"/>
+              </a:rPr>
+              <a:t>وجدان کاری  ( اخلاق حرفه‌ای ) داشته باشید. </a:t>
+            </a:r>
+            <a:endParaRPr lang="fa-IR" sz="4400" dirty="0">
+              <a:effectLst>
+                <a:outerShdw blurRad="38100" dist="38100" dir="2700000" algn="tl">
+                  <a:srgbClr val="000000">
+                    <a:alpha val="43137"/>
+                  </a:srgbClr>
+                </a:outerShdw>
+              </a:effectLst>
+              <a:latin typeface="Adobe Arabic" panose="02040503050201020203" pitchFamily="18" charset="-78"/>
+              <a:cs typeface="Adobe Arabic" panose="02040503050201020203" pitchFamily="18" charset="-78"/>
+            </a:endParaRPr>
+          </a:p>
+        </p:txBody>
+      </p:sp>
+      <p:sp>
+        <p:nvSpPr>
+          <p:cNvPr id="4" name="TextBox 3"/>
+          <p:cNvSpPr txBox="1"/>
+          <p:nvPr/>
+        </p:nvSpPr>
+        <p:spPr>
+          <a:xfrm>
+            <a:off x="919351" y="3365498"/>
+            <a:ext cx="10391398" cy="2677656"/>
+          </a:xfrm>
+          <a:prstGeom prst="rect">
+            <a:avLst/>
+          </a:prstGeom>
+          <a:noFill/>
+        </p:spPr>
+        <p:txBody>
+          <a:bodyPr wrap="square" numCol="1" rtlCol="0">
+            <a:spAutoFit/>
+          </a:bodyPr>
+          <a:lstStyle/>
+          <a:p>
+            <a:pPr marL="457200" indent="-457200" algn="r" rtl="1">
+              <a:buFont typeface="Wingdings" panose="05000000000000000000" pitchFamily="2" charset="2"/>
+              <a:buChar char="ü"/>
+            </a:pPr>
+            <a:r>
+              <a:rPr lang="fa-IR" sz="2800" dirty="0" smtClean="0">
+                <a:effectLst>
+                  <a:outerShdw blurRad="38100" dist="38100" dir="2700000" algn="tl">
+                    <a:srgbClr val="000000">
+                      <a:alpha val="43137"/>
+                    </a:srgbClr>
+                  </a:outerShdw>
+                </a:effectLst>
+                <a:latin typeface="Adobe Arabic" panose="02040503050201020203" pitchFamily="18" charset="-78"/>
+                <a:cs typeface="Adobe Arabic" panose="02040503050201020203" pitchFamily="18" charset="-78"/>
+              </a:rPr>
+              <a:t>حرفه ی</a:t>
+            </a:r>
+            <a:r>
+              <a:rPr lang="fa-IR" sz="2800" dirty="0" smtClean="0">
+                <a:effectLst>
+                  <a:outerShdw blurRad="38100" dist="38100" dir="2700000" algn="tl">
+                    <a:srgbClr val="000000">
+                      <a:alpha val="43137"/>
+                    </a:srgbClr>
+                  </a:outerShdw>
+                </a:effectLst>
+                <a:latin typeface="Adobe Arabic" panose="02040503050201020203" pitchFamily="18" charset="-78"/>
+                <a:cs typeface="Adobe Arabic" panose="02040503050201020203" pitchFamily="18" charset="-78"/>
+              </a:rPr>
+              <a:t> شما ، مسئولیت شماست .</a:t>
+            </a:r>
+          </a:p>
+          <a:p>
+            <a:pPr marL="457200" indent="-457200" algn="r" rtl="1">
+              <a:buFont typeface="Wingdings" panose="05000000000000000000" pitchFamily="2" charset="2"/>
+              <a:buChar char="ü"/>
+            </a:pPr>
+            <a:r>
+              <a:rPr lang="fa-IR" sz="2800" dirty="0" smtClean="0">
+                <a:effectLst>
+                  <a:outerShdw blurRad="38100" dist="38100" dir="2700000" algn="tl">
+                    <a:srgbClr val="000000">
+                      <a:alpha val="43137"/>
+                    </a:srgbClr>
+                  </a:outerShdw>
+                </a:effectLst>
+                <a:latin typeface="Adobe Arabic" panose="02040503050201020203" pitchFamily="18" charset="-78"/>
+                <a:cs typeface="Adobe Arabic" panose="02040503050201020203" pitchFamily="18" charset="-78"/>
+              </a:rPr>
+              <a:t>استخدام کننده ی شما وظیفه ای برای افزایش سطح مهارت و دانش  شما ندارد .</a:t>
+            </a:r>
+            <a:endParaRPr lang="fa-IR" sz="2800" dirty="0">
+              <a:effectLst>
+                <a:outerShdw blurRad="38100" dist="38100" dir="2700000" algn="tl">
+                  <a:srgbClr val="000000">
+                    <a:alpha val="43137"/>
+                  </a:srgbClr>
+                </a:outerShdw>
+              </a:effectLst>
+              <a:latin typeface="Adobe Arabic" panose="02040503050201020203" pitchFamily="18" charset="-78"/>
+              <a:cs typeface="Adobe Arabic" panose="02040503050201020203" pitchFamily="18" charset="-78"/>
+            </a:endParaRPr>
+          </a:p>
+          <a:p>
+            <a:pPr marL="457200" indent="-457200" algn="r" rtl="1">
+              <a:buFont typeface="Wingdings" panose="05000000000000000000" pitchFamily="2" charset="2"/>
+              <a:buChar char="ü"/>
+            </a:pPr>
+            <a:r>
+              <a:rPr lang="fa-IR" sz="2800" dirty="0">
+                <a:effectLst>
+                  <a:outerShdw blurRad="38100" dist="38100" dir="2700000" algn="tl">
+                    <a:srgbClr val="000000">
+                      <a:alpha val="43137"/>
+                    </a:srgbClr>
+                  </a:outerShdw>
+                </a:effectLst>
+                <a:latin typeface="Adobe Arabic" panose="02040503050201020203" pitchFamily="18" charset="-78"/>
+                <a:cs typeface="Adobe Arabic" panose="02040503050201020203" pitchFamily="18" charset="-78"/>
+              </a:rPr>
+              <a:t> </a:t>
+            </a:r>
+            <a:r>
+              <a:rPr lang="fa-IR" sz="2800" dirty="0" smtClean="0">
+                <a:effectLst>
+                  <a:outerShdw blurRad="38100" dist="38100" dir="2700000" algn="tl">
+                    <a:srgbClr val="000000">
+                      <a:alpha val="43137"/>
+                    </a:srgbClr>
+                  </a:outerShdw>
+                </a:effectLst>
+                <a:latin typeface="Adobe Arabic" panose="02040503050201020203" pitchFamily="18" charset="-78"/>
+                <a:cs typeface="Adobe Arabic" panose="02040503050201020203" pitchFamily="18" charset="-78"/>
+              </a:rPr>
+              <a:t>وقت خود را تقسیم کنید : </a:t>
+            </a:r>
+          </a:p>
+          <a:p>
+            <a:pPr marL="1371600" lvl="2" indent="-457200" algn="r" rtl="1">
+              <a:buFont typeface="Wingdings" panose="05000000000000000000" pitchFamily="2" charset="2"/>
+              <a:buChar char="ü"/>
+            </a:pPr>
+            <a:r>
+              <a:rPr lang="fa-IR" sz="2800" dirty="0" smtClean="0">
+                <a:effectLst>
+                  <a:outerShdw blurRad="38100" dist="38100" dir="2700000" algn="tl">
+                    <a:srgbClr val="000000">
+                      <a:alpha val="43137"/>
+                    </a:srgbClr>
+                  </a:outerShdw>
+                </a:effectLst>
+                <a:latin typeface="Adobe Arabic" panose="02040503050201020203" pitchFamily="18" charset="-78"/>
+                <a:cs typeface="Adobe Arabic" panose="02040503050201020203" pitchFamily="18" charset="-78"/>
+              </a:rPr>
+              <a:t>40 ساعت کار</a:t>
+            </a:r>
+          </a:p>
+          <a:p>
+            <a:pPr marL="1371600" lvl="2" indent="-457200" algn="r" rtl="1">
+              <a:buFont typeface="Wingdings" panose="05000000000000000000" pitchFamily="2" charset="2"/>
+              <a:buChar char="ü"/>
+            </a:pPr>
+            <a:r>
+              <a:rPr lang="fa-IR" sz="2800" dirty="0" smtClean="0">
+                <a:effectLst>
+                  <a:outerShdw blurRad="38100" dist="38100" dir="2700000" algn="tl">
+                    <a:srgbClr val="000000">
+                      <a:alpha val="43137"/>
+                    </a:srgbClr>
+                  </a:outerShdw>
+                </a:effectLst>
+                <a:latin typeface="Adobe Arabic" panose="02040503050201020203" pitchFamily="18" charset="-78"/>
+                <a:cs typeface="Adobe Arabic" panose="02040503050201020203" pitchFamily="18" charset="-78"/>
+              </a:rPr>
+              <a:t>20 ساعت برای خودتان </a:t>
+            </a:r>
+          </a:p>
+          <a:p>
+            <a:pPr marL="914400" lvl="1" indent="-457200" algn="r" rtl="1">
+              <a:buFont typeface="Arial" panose="020B0604020202020204" pitchFamily="34" charset="0"/>
+              <a:buChar char="•"/>
+            </a:pPr>
+            <a:endParaRPr lang="en-US" sz="2800" dirty="0">
+              <a:effectLst>
+                <a:outerShdw blurRad="38100" dist="38100" dir="2700000" algn="tl">
+                  <a:srgbClr val="000000">
+                    <a:alpha val="43137"/>
+                  </a:srgbClr>
+                </a:outerShdw>
+              </a:effectLst>
+              <a:latin typeface="Adobe Arabic" panose="02040503050201020203" pitchFamily="18" charset="-78"/>
+              <a:cs typeface="Adobe Arabic" panose="02040503050201020203" pitchFamily="18" charset="-78"/>
+            </a:endParaRPr>
+          </a:p>
+        </p:txBody>
+      </p:sp>
+      <p:sp>
+        <p:nvSpPr>
+          <p:cNvPr id="6" name="Title 1"/>
+          <p:cNvSpPr txBox="1">
+            <a:spLocks/>
+          </p:cNvSpPr>
+          <p:nvPr/>
+        </p:nvSpPr>
+        <p:spPr>
+          <a:xfrm>
+            <a:off x="444500" y="596900"/>
+            <a:ext cx="11341100" cy="685800"/>
+          </a:xfrm>
+          <a:prstGeom prst="rect">
+            <a:avLst/>
+          </a:prstGeom>
+          <a:effectLst>
+            <a:outerShdw blurRad="50800" dir="14400000">
+              <a:srgbClr val="000000">
+                <a:alpha val="60000"/>
+              </a:srgbClr>
+            </a:outerShdw>
+          </a:effectLst>
+        </p:spPr>
+        <p:txBody>
+          <a:bodyPr vert="horz" lIns="91440" tIns="45720" rIns="91440" bIns="45720" rtlCol="0" anchor="b">
+            <a:noAutofit/>
+          </a:bodyPr>
+          <a:lstStyle>
+            <a:lvl1pPr algn="l" defTabSz="457200" rtl="0" eaLnBrk="1" latinLnBrk="0" hangingPunct="1">
+              <a:spcBef>
+                <a:spcPct val="0"/>
+              </a:spcBef>
+              <a:buNone/>
+              <a:defRPr sz="4000" b="1" kern="1200">
+                <a:solidFill>
+                  <a:srgbClr val="FEFEFE"/>
+                </a:solidFill>
+                <a:latin typeface="+mj-lt"/>
+                <a:ea typeface="+mj-ea"/>
+                <a:cs typeface="+mj-cs"/>
+              </a:defRPr>
+            </a:lvl1pPr>
+            <a:lvl2pPr eaLnBrk="1" hangingPunct="1">
+              <a:defRPr>
+                <a:solidFill>
+                  <a:schemeClr val="tx2"/>
+                </a:solidFill>
+              </a:defRPr>
+            </a:lvl2pPr>
+            <a:lvl3pPr eaLnBrk="1" hangingPunct="1">
+              <a:defRPr>
+                <a:solidFill>
+                  <a:schemeClr val="tx2"/>
+                </a:solidFill>
+              </a:defRPr>
+            </a:lvl3pPr>
+            <a:lvl4pPr eaLnBrk="1" hangingPunct="1">
+              <a:defRPr>
+                <a:solidFill>
+                  <a:schemeClr val="tx2"/>
+                </a:solidFill>
+              </a:defRPr>
+            </a:lvl4pPr>
+            <a:lvl5pPr eaLnBrk="1" hangingPunct="1">
+              <a:defRPr>
+                <a:solidFill>
+                  <a:schemeClr val="tx2"/>
+                </a:solidFill>
+              </a:defRPr>
+            </a:lvl5pPr>
+            <a:lvl6pPr eaLnBrk="1" hangingPunct="1">
+              <a:defRPr>
+                <a:solidFill>
+                  <a:schemeClr val="tx2"/>
+                </a:solidFill>
+              </a:defRPr>
+            </a:lvl6pPr>
+            <a:lvl7pPr eaLnBrk="1" hangingPunct="1">
+              <a:defRPr>
+                <a:solidFill>
+                  <a:schemeClr val="tx2"/>
+                </a:solidFill>
+              </a:defRPr>
+            </a:lvl7pPr>
+            <a:lvl8pPr eaLnBrk="1" hangingPunct="1">
+              <a:defRPr>
+                <a:solidFill>
+                  <a:schemeClr val="tx2"/>
+                </a:solidFill>
+              </a:defRPr>
+            </a:lvl8pPr>
+            <a:lvl9pPr eaLnBrk="1" hangingPunct="1">
+              <a:defRPr>
+                <a:solidFill>
+                  <a:schemeClr val="tx2"/>
+                </a:solidFill>
+              </a:defRPr>
+            </a:lvl9pPr>
+          </a:lstStyle>
+          <a:p>
+            <a:pPr algn="r" rtl="1"/>
+            <a:r>
+              <a:rPr lang="fa-IR" sz="4400" dirty="0" smtClean="0">
+                <a:effectLst>
+                  <a:outerShdw blurRad="38100" dist="38100" dir="2700000" algn="tl">
+                    <a:srgbClr val="000000">
+                      <a:alpha val="43137"/>
+                    </a:srgbClr>
+                  </a:outerShdw>
+                </a:effectLst>
+                <a:latin typeface="Adobe Arabic" panose="02040503050201020203" pitchFamily="18" charset="-78"/>
+                <a:cs typeface="Adobe Arabic" panose="02040503050201020203" pitchFamily="18" charset="-78"/>
+              </a:rPr>
+              <a:t>فصل اول : حرفه ای گری </a:t>
+            </a:r>
+            <a:endParaRPr lang="en-US" sz="4400" dirty="0">
+              <a:effectLst>
+                <a:outerShdw blurRad="38100" dist="38100" dir="2700000" algn="tl">
+                  <a:srgbClr val="000000">
+                    <a:alpha val="43137"/>
+                  </a:srgbClr>
+                </a:outerShdw>
+              </a:effectLst>
+              <a:latin typeface="Adobe Arabic" panose="02040503050201020203" pitchFamily="18" charset="-78"/>
+              <a:cs typeface="Adobe Arabic" panose="02040503050201020203" pitchFamily="18" charset="-78"/>
+            </a:endParaRPr>
+          </a:p>
+        </p:txBody>
+      </p:sp>
+      <p:pic>
+        <p:nvPicPr>
+          <p:cNvPr id="3" name="Picture 2"/>
+          <p:cNvPicPr>
+            <a:picLocks noChangeAspect="1"/>
+          </p:cNvPicPr>
+          <p:nvPr/>
+        </p:nvPicPr>
+        <p:blipFill>
+          <a:blip r:embed="rId2">
+            <a:extLst>
+              <a:ext uri="{28A0092B-C50C-407E-A947-70E740481C1C}">
+                <a14:useLocalDpi xmlns:a14="http://schemas.microsoft.com/office/drawing/2010/main" val="0"/>
+              </a:ext>
+            </a:extLst>
+          </a:blip>
+          <a:stretch>
+            <a:fillRect/>
+          </a:stretch>
+        </p:blipFill>
+        <p:spPr>
+          <a:xfrm>
+            <a:off x="330200" y="111614"/>
+            <a:ext cx="2952850" cy="1656371"/>
+          </a:xfrm>
+          <a:prstGeom prst="rect">
+            <a:avLst/>
+          </a:prstGeom>
+          <a:ln>
+            <a:noFill/>
+          </a:ln>
+          <a:effectLst>
+            <a:softEdge rad="112500"/>
+          </a:effectLst>
+        </p:spPr>
+      </p:pic>
+    </p:spTree>
+    <p:extLst>
+      <p:ext uri="{BB962C8B-B14F-4D97-AF65-F5344CB8AC3E}">
+        <p14:creationId xmlns:p14="http://schemas.microsoft.com/office/powerpoint/2010/main" val="902296240"/>
+      </p:ext>
+    </p:extLst>
+  </p:cSld>
+  <p:clrMapOvr>
+    <a:masterClrMapping/>
+  </p:clrMapOvr>
+</p:sld>
+</file>
+
+<file path=ppt/slides/slide6.xml><?xml version="1.0" encoding="utf-8"?>
+<p:sld xmlns:a="http://schemas.openxmlformats.org/drawingml/2006/main" xmlns:r="http://schemas.openxmlformats.org/officeDocument/2006/relationships" xmlns:p="http://schemas.openxmlformats.org/presentationml/2006/main">
+  <p:cSld>
+    <p:spTree>
+      <p:nvGrpSpPr>
+        <p:cNvPr id="1" name=""/>
+        <p:cNvGrpSpPr/>
+        <p:nvPr/>
+      </p:nvGrpSpPr>
+      <p:grpSpPr>
+        <a:xfrm>
+          <a:off x="0" y="0"/>
+          <a:ext cx="0" cy="0"/>
+          <a:chOff x="0" y="0"/>
+          <a:chExt cx="0" cy="0"/>
+        </a:xfrm>
+      </p:grpSpPr>
+      <p:sp>
+        <p:nvSpPr>
+          <p:cNvPr id="2" name="Title 1"/>
+          <p:cNvSpPr>
+            <a:spLocks noGrp="1"/>
+          </p:cNvSpPr>
+          <p:nvPr>
+            <p:ph type="title"/>
+          </p:nvPr>
+        </p:nvSpPr>
+        <p:spPr>
+          <a:xfrm>
+            <a:off x="1213602" y="1767985"/>
+            <a:ext cx="10571998" cy="970450"/>
+          </a:xfrm>
+        </p:spPr>
+        <p:txBody>
+          <a:bodyPr/>
+          <a:lstStyle/>
+          <a:p>
+            <a:pPr algn="r" rtl="1"/>
+            <a:r>
+              <a:rPr lang="fa-IR" sz="4400" dirty="0">
+                <a:latin typeface="Adobe Arabic" panose="02040503050201020203" pitchFamily="18" charset="-78"/>
+                <a:cs typeface="Adobe Arabic" panose="02040503050201020203" pitchFamily="18" charset="-78"/>
+              </a:rPr>
+              <a:t>در زمینه ی فنی ، اطلاعات کافی داشته باشید. </a:t>
+            </a:r>
+            <a:endParaRPr lang="fa-IR" sz="4400" dirty="0">
+              <a:latin typeface="Adobe Arabic" panose="02040503050201020203" pitchFamily="18" charset="-78"/>
+              <a:cs typeface="Adobe Arabic" panose="02040503050201020203" pitchFamily="18" charset="-78"/>
+            </a:endParaRPr>
+          </a:p>
+        </p:txBody>
+      </p:sp>
+      <p:sp>
+        <p:nvSpPr>
+          <p:cNvPr id="4" name="TextBox 3"/>
+          <p:cNvSpPr txBox="1"/>
+          <p:nvPr/>
+        </p:nvSpPr>
+        <p:spPr>
+          <a:xfrm>
+            <a:off x="919350" y="2738435"/>
+            <a:ext cx="10612249" cy="1815882"/>
+          </a:xfrm>
+          <a:prstGeom prst="rect">
+            <a:avLst/>
+          </a:prstGeom>
+          <a:noFill/>
+        </p:spPr>
+        <p:txBody>
+          <a:bodyPr wrap="square" numCol="1" rtlCol="0" anchor="t">
+            <a:spAutoFit/>
+          </a:bodyPr>
+          <a:lstStyle/>
+          <a:p>
+            <a:pPr lvl="1" algn="r" rtl="1"/>
+            <a:r>
+              <a:rPr lang="fa-IR" sz="2800" b="1" dirty="0" smtClean="0">
+                <a:latin typeface="Adobe Arabic" panose="02040503050201020203" pitchFamily="18" charset="-78"/>
+                <a:cs typeface="Adobe Arabic" panose="02040503050201020203" pitchFamily="18" charset="-78"/>
+              </a:rPr>
+              <a:t>باید در زمینه های زیر دانش فنی داشته باشید :</a:t>
+            </a:r>
+          </a:p>
+          <a:p>
+            <a:pPr marL="914400" lvl="1" indent="-457200" algn="r" rtl="1">
+              <a:buFont typeface="Wingdings" panose="05000000000000000000" pitchFamily="2" charset="2"/>
+              <a:buChar char="ü"/>
+            </a:pPr>
+            <a:endParaRPr lang="fa-IR" sz="2800" b="1" dirty="0" smtClean="0">
+              <a:latin typeface="Adobe Arabic" panose="02040503050201020203" pitchFamily="18" charset="-78"/>
+              <a:cs typeface="Adobe Arabic" panose="02040503050201020203" pitchFamily="18" charset="-78"/>
+            </a:endParaRPr>
+          </a:p>
+          <a:p>
+            <a:pPr marL="914400" lvl="1" indent="-457200" algn="r" rtl="1">
+              <a:buFont typeface="Wingdings" panose="05000000000000000000" pitchFamily="2" charset="2"/>
+              <a:buChar char="ü"/>
+            </a:pPr>
+            <a:endParaRPr lang="fa-IR" sz="2800" dirty="0" smtClean="0">
+              <a:latin typeface="Adobe Arabic" panose="02040503050201020203" pitchFamily="18" charset="-78"/>
+              <a:cs typeface="Adobe Arabic" panose="02040503050201020203" pitchFamily="18" charset="-78"/>
+            </a:endParaRPr>
+          </a:p>
+          <a:p>
+            <a:pPr lvl="1" algn="r" rtl="1"/>
+            <a:endParaRPr lang="en-US" sz="2800" dirty="0">
+              <a:latin typeface="Adobe Arabic" panose="02040503050201020203" pitchFamily="18" charset="-78"/>
+              <a:cs typeface="Adobe Arabic" panose="02040503050201020203" pitchFamily="18" charset="-78"/>
+            </a:endParaRPr>
+          </a:p>
+        </p:txBody>
+      </p:sp>
+      <p:sp>
+        <p:nvSpPr>
+          <p:cNvPr id="6" name="Title 1"/>
+          <p:cNvSpPr txBox="1">
+            <a:spLocks/>
+          </p:cNvSpPr>
+          <p:nvPr/>
+        </p:nvSpPr>
+        <p:spPr>
+          <a:xfrm>
+            <a:off x="444500" y="596900"/>
+            <a:ext cx="11341100" cy="685800"/>
+          </a:xfrm>
+          <a:prstGeom prst="rect">
+            <a:avLst/>
+          </a:prstGeom>
+          <a:effectLst>
+            <a:outerShdw blurRad="50800" dir="14400000">
+              <a:srgbClr val="000000">
+                <a:alpha val="60000"/>
+              </a:srgbClr>
+            </a:outerShdw>
+          </a:effectLst>
+        </p:spPr>
+        <p:txBody>
+          <a:bodyPr vert="horz" lIns="91440" tIns="45720" rIns="91440" bIns="45720" rtlCol="0" anchor="b">
+            <a:noAutofit/>
+          </a:bodyPr>
+          <a:lstStyle>
+            <a:lvl1pPr algn="l" defTabSz="457200" rtl="0" eaLnBrk="1" latinLnBrk="0" hangingPunct="1">
+              <a:spcBef>
+                <a:spcPct val="0"/>
+              </a:spcBef>
+              <a:buNone/>
+              <a:defRPr sz="4000" b="1" kern="1200">
+                <a:solidFill>
+                  <a:srgbClr val="FEFEFE"/>
+                </a:solidFill>
+                <a:latin typeface="+mj-lt"/>
+                <a:ea typeface="+mj-ea"/>
+                <a:cs typeface="+mj-cs"/>
+              </a:defRPr>
+            </a:lvl1pPr>
+            <a:lvl2pPr eaLnBrk="1" hangingPunct="1">
+              <a:defRPr>
+                <a:solidFill>
+                  <a:schemeClr val="tx2"/>
+                </a:solidFill>
+              </a:defRPr>
+            </a:lvl2pPr>
+            <a:lvl3pPr eaLnBrk="1" hangingPunct="1">
+              <a:defRPr>
+                <a:solidFill>
+                  <a:schemeClr val="tx2"/>
+                </a:solidFill>
+              </a:defRPr>
+            </a:lvl3pPr>
+            <a:lvl4pPr eaLnBrk="1" hangingPunct="1">
+              <a:defRPr>
+                <a:solidFill>
+                  <a:schemeClr val="tx2"/>
+                </a:solidFill>
+              </a:defRPr>
+            </a:lvl4pPr>
+            <a:lvl5pPr eaLnBrk="1" hangingPunct="1">
+              <a:defRPr>
+                <a:solidFill>
+                  <a:schemeClr val="tx2"/>
+                </a:solidFill>
+              </a:defRPr>
+            </a:lvl5pPr>
+            <a:lvl6pPr eaLnBrk="1" hangingPunct="1">
+              <a:defRPr>
+                <a:solidFill>
+                  <a:schemeClr val="tx2"/>
+                </a:solidFill>
+              </a:defRPr>
+            </a:lvl6pPr>
+            <a:lvl7pPr eaLnBrk="1" hangingPunct="1">
+              <a:defRPr>
+                <a:solidFill>
+                  <a:schemeClr val="tx2"/>
+                </a:solidFill>
+              </a:defRPr>
+            </a:lvl7pPr>
+            <a:lvl8pPr eaLnBrk="1" hangingPunct="1">
+              <a:defRPr>
+                <a:solidFill>
+                  <a:schemeClr val="tx2"/>
+                </a:solidFill>
+              </a:defRPr>
+            </a:lvl8pPr>
+            <a:lvl9pPr eaLnBrk="1" hangingPunct="1">
+              <a:defRPr>
+                <a:solidFill>
+                  <a:schemeClr val="tx2"/>
+                </a:solidFill>
+              </a:defRPr>
+            </a:lvl9pPr>
+          </a:lstStyle>
+          <a:p>
+            <a:pPr algn="r" rtl="1"/>
+            <a:r>
+              <a:rPr lang="fa-IR" sz="4400" dirty="0" smtClean="0">
+                <a:effectLst>
+                  <a:outerShdw blurRad="38100" dist="38100" dir="2700000" algn="tl">
+                    <a:srgbClr val="000000">
+                      <a:alpha val="43137"/>
+                    </a:srgbClr>
+                  </a:outerShdw>
+                </a:effectLst>
+                <a:latin typeface="Adobe Arabic" panose="02040503050201020203" pitchFamily="18" charset="-78"/>
+                <a:cs typeface="Adobe Arabic" panose="02040503050201020203" pitchFamily="18" charset="-78"/>
+              </a:rPr>
+              <a:t>فصل اول : حرفه ای گری </a:t>
+            </a:r>
+            <a:endParaRPr lang="en-US" sz="4400" dirty="0">
+              <a:effectLst>
+                <a:outerShdw blurRad="38100" dist="38100" dir="2700000" algn="tl">
+                  <a:srgbClr val="000000">
+                    <a:alpha val="43137"/>
+                  </a:srgbClr>
+                </a:outerShdw>
+              </a:effectLst>
+              <a:latin typeface="Adobe Arabic" panose="02040503050201020203" pitchFamily="18" charset="-78"/>
+              <a:cs typeface="Adobe Arabic" panose="02040503050201020203" pitchFamily="18" charset="-78"/>
+            </a:endParaRPr>
+          </a:p>
+        </p:txBody>
+      </p:sp>
+    </p:spTree>
+    <p:extLst>
+      <p:ext uri="{BB962C8B-B14F-4D97-AF65-F5344CB8AC3E}">
+        <p14:creationId xmlns:p14="http://schemas.microsoft.com/office/powerpoint/2010/main" val="37955342"/>
       </p:ext>
     </p:extLst>
   </p:cSld>

</xml_diff>

<commit_message>
season 5 is added
</commit_message>
<xml_diff>
--- a/The Clean Coder.pptx
+++ b/The Clean Coder.pptx
@@ -29,6 +29,13 @@
     <p:sldId id="279" r:id="rId23"/>
     <p:sldId id="280" r:id="rId24"/>
     <p:sldId id="281" r:id="rId25"/>
+    <p:sldId id="282" r:id="rId26"/>
+    <p:sldId id="283" r:id="rId27"/>
+    <p:sldId id="284" r:id="rId28"/>
+    <p:sldId id="285" r:id="rId29"/>
+    <p:sldId id="286" r:id="rId30"/>
+    <p:sldId id="287" r:id="rId31"/>
+    <p:sldId id="288" r:id="rId32"/>
   </p:sldIdLst>
   <p:sldSz cx="12192000" cy="6858000"/>
   <p:notesSz cx="6858000" cy="9144000"/>
@@ -230,7 +237,7 @@
           <a:effectLst/>
           <a:extLst>
             <a:ext uri="{91240B29-F687-4f45-9708-019B960494DF}">
-              <a14:hiddenLine xmlns:a14="http://schemas.microsoft.com/office/drawing/2010/main" xmlns="" w="9525">
+              <a14:hiddenLine xmlns="" xmlns:a14="http://schemas.microsoft.com/office/drawing/2010/main" w="9525">
                 <a:solidFill>
                   <a:srgbClr val="000000"/>
                 </a:solidFill>
@@ -423,7 +430,7 @@
             <a:fld id="{B61BEF0D-F0BB-DE4B-95CE-6DB70DBA9567}" type="datetimeFigureOut">
               <a:rPr lang="en-US" smtClean="0"/>
               <a:pPr/>
-              <a:t>2/13/2022</a:t>
+              <a:t>2/17/2022</a:t>
             </a:fld>
             <a:endParaRPr lang="en-US" dirty="0"/>
           </a:p>
@@ -743,7 +750,7 @@
             <a:fld id="{B61BEF0D-F0BB-DE4B-95CE-6DB70DBA9567}" type="datetimeFigureOut">
               <a:rPr lang="en-US" smtClean="0"/>
               <a:pPr/>
-              <a:t>2/13/2022</a:t>
+              <a:t>2/17/2022</a:t>
             </a:fld>
             <a:endParaRPr lang="en-US" dirty="0"/>
           </a:p>
@@ -1233,7 +1240,7 @@
             <a:fld id="{B61BEF0D-F0BB-DE4B-95CE-6DB70DBA9567}" type="datetimeFigureOut">
               <a:rPr lang="en-US" smtClean="0"/>
               <a:pPr/>
-              <a:t>2/13/2022</a:t>
+              <a:t>2/17/2022</a:t>
             </a:fld>
             <a:endParaRPr lang="en-US" dirty="0"/>
           </a:p>
@@ -1604,7 +1611,7 @@
             <a:fld id="{B61BEF0D-F0BB-DE4B-95CE-6DB70DBA9567}" type="datetimeFigureOut">
               <a:rPr lang="en-US" smtClean="0"/>
               <a:pPr/>
-              <a:t>2/13/2022</a:t>
+              <a:t>2/17/2022</a:t>
             </a:fld>
             <a:endParaRPr lang="en-US" dirty="0"/>
           </a:p>
@@ -1760,7 +1767,7 @@
           <a:ln/>
           <a:extLst>
             <a:ext uri="{91240B29-F687-4f45-9708-019B960494DF}">
-              <a14:hiddenLine xmlns:a14="http://schemas.microsoft.com/office/drawing/2010/main" xmlns="" w="9525">
+              <a14:hiddenLine xmlns="" xmlns:a14="http://schemas.microsoft.com/office/drawing/2010/main" w="9525">
                 <a:solidFill>
                   <a:srgbClr val="000000"/>
                 </a:solidFill>
@@ -1879,7 +1886,7 @@
             <a:fld id="{B61BEF0D-F0BB-DE4B-95CE-6DB70DBA9567}" type="datetimeFigureOut">
               <a:rPr lang="en-US" smtClean="0"/>
               <a:pPr/>
-              <a:t>2/13/2022</a:t>
+              <a:t>2/17/2022</a:t>
             </a:fld>
             <a:endParaRPr lang="en-US" dirty="0"/>
           </a:p>
@@ -2037,7 +2044,7 @@
           <a:ln/>
           <a:extLst>
             <a:ext uri="{91240B29-F687-4f45-9708-019B960494DF}">
-              <a14:hiddenLine xmlns:a14="http://schemas.microsoft.com/office/drawing/2010/main" xmlns="" w="9525">
+              <a14:hiddenLine xmlns="" xmlns:a14="http://schemas.microsoft.com/office/drawing/2010/main" w="9525">
                 <a:solidFill>
                   <a:srgbClr val="000000"/>
                 </a:solidFill>
@@ -2166,7 +2173,7 @@
             <a:fld id="{B61BEF0D-F0BB-DE4B-95CE-6DB70DBA9567}" type="datetimeFigureOut">
               <a:rPr lang="en-US" smtClean="0"/>
               <a:pPr/>
-              <a:t>2/13/2022</a:t>
+              <a:t>2/17/2022</a:t>
             </a:fld>
             <a:endParaRPr lang="en-US" dirty="0"/>
           </a:p>
@@ -2322,7 +2329,7 @@
           <a:ln/>
           <a:extLst>
             <a:ext uri="{91240B29-F687-4f45-9708-019B960494DF}">
-              <a14:hiddenLine xmlns:a14="http://schemas.microsoft.com/office/drawing/2010/main" xmlns="" w="9525">
+              <a14:hiddenLine xmlns="" xmlns:a14="http://schemas.microsoft.com/office/drawing/2010/main" w="9525">
                 <a:solidFill>
                   <a:srgbClr val="000000"/>
                 </a:solidFill>
@@ -2451,7 +2458,7 @@
             <a:fld id="{B61BEF0D-F0BB-DE4B-95CE-6DB70DBA9567}" type="datetimeFigureOut">
               <a:rPr lang="en-US" smtClean="0"/>
               <a:pPr/>
-              <a:t>2/13/2022</a:t>
+              <a:t>2/17/2022</a:t>
             </a:fld>
             <a:endParaRPr lang="en-US" dirty="0"/>
           </a:p>
@@ -2796,7 +2803,7 @@
             <a:fld id="{B61BEF0D-F0BB-DE4B-95CE-6DB70DBA9567}" type="datetimeFigureOut">
               <a:rPr lang="en-US" smtClean="0"/>
               <a:pPr/>
-              <a:t>2/13/2022</a:t>
+              <a:t>2/17/2022</a:t>
             </a:fld>
             <a:endParaRPr lang="en-US" dirty="0"/>
           </a:p>
@@ -2952,7 +2959,7 @@
           <a:ln/>
           <a:extLst>
             <a:ext uri="{91240B29-F687-4f45-9708-019B960494DF}">
-              <a14:hiddenLine xmlns:a14="http://schemas.microsoft.com/office/drawing/2010/main" xmlns="" w="9525">
+              <a14:hiddenLine xmlns="" xmlns:a14="http://schemas.microsoft.com/office/drawing/2010/main" w="9525">
                 <a:solidFill>
                   <a:srgbClr val="000000"/>
                 </a:solidFill>
@@ -3137,7 +3144,7 @@
             <a:fld id="{B61BEF0D-F0BB-DE4B-95CE-6DB70DBA9567}" type="datetimeFigureOut">
               <a:rPr lang="en-US" smtClean="0"/>
               <a:pPr/>
-              <a:t>2/13/2022</a:t>
+              <a:t>2/17/2022</a:t>
             </a:fld>
             <a:endParaRPr lang="en-US" dirty="0"/>
           </a:p>
@@ -3293,7 +3300,7 @@
           <a:ln/>
           <a:extLst>
             <a:ext uri="{91240B29-F687-4f45-9708-019B960494DF}">
-              <a14:hiddenLine xmlns:a14="http://schemas.microsoft.com/office/drawing/2010/main" xmlns="" w="9525">
+              <a14:hiddenLine xmlns="" xmlns:a14="http://schemas.microsoft.com/office/drawing/2010/main" w="9525">
                 <a:solidFill>
                   <a:srgbClr val="000000"/>
                 </a:solidFill>
@@ -3616,7 +3623,7 @@
             <a:fld id="{B61BEF0D-F0BB-DE4B-95CE-6DB70DBA9567}" type="datetimeFigureOut">
               <a:rPr lang="en-US" smtClean="0"/>
               <a:pPr/>
-              <a:t>2/13/2022</a:t>
+              <a:t>2/17/2022</a:t>
             </a:fld>
             <a:endParaRPr lang="en-US" dirty="0"/>
           </a:p>
@@ -3772,7 +3779,7 @@
           <a:ln/>
           <a:extLst>
             <a:ext uri="{91240B29-F687-4f45-9708-019B960494DF}">
-              <a14:hiddenLine xmlns:a14="http://schemas.microsoft.com/office/drawing/2010/main" xmlns="" w="9525">
+              <a14:hiddenLine xmlns="" xmlns:a14="http://schemas.microsoft.com/office/drawing/2010/main" w="9525">
                 <a:solidFill>
                   <a:srgbClr val="000000"/>
                 </a:solidFill>
@@ -3839,7 +3846,7 @@
             <a:fld id="{B61BEF0D-F0BB-DE4B-95CE-6DB70DBA9567}" type="datetimeFigureOut">
               <a:rPr lang="en-US" smtClean="0"/>
               <a:pPr/>
-              <a:t>2/13/2022</a:t>
+              <a:t>2/17/2022</a:t>
             </a:fld>
             <a:endParaRPr lang="en-US" dirty="0"/>
           </a:p>
@@ -3936,7 +3943,7 @@
             <a:fld id="{B61BEF0D-F0BB-DE4B-95CE-6DB70DBA9567}" type="datetimeFigureOut">
               <a:rPr lang="en-US" smtClean="0"/>
               <a:pPr/>
-              <a:t>2/13/2022</a:t>
+              <a:t>2/17/2022</a:t>
             </a:fld>
             <a:endParaRPr lang="en-US" dirty="0"/>
           </a:p>
@@ -4205,7 +4212,7 @@
           <a:ln/>
           <a:extLst>
             <a:ext uri="{91240B29-F687-4f45-9708-019B960494DF}">
-              <a14:hiddenLine xmlns:a14="http://schemas.microsoft.com/office/drawing/2010/main" xmlns="" w="9525">
+              <a14:hiddenLine xmlns="" xmlns:a14="http://schemas.microsoft.com/office/drawing/2010/main" w="9525">
                 <a:solidFill>
                   <a:srgbClr val="000000"/>
                 </a:solidFill>
@@ -4405,7 +4412,7 @@
             <a:fld id="{B61BEF0D-F0BB-DE4B-95CE-6DB70DBA9567}" type="datetimeFigureOut">
               <a:rPr lang="en-US" smtClean="0"/>
               <a:pPr/>
-              <a:t>2/13/2022</a:t>
+              <a:t>2/17/2022</a:t>
             </a:fld>
             <a:endParaRPr lang="en-US" dirty="0"/>
           </a:p>
@@ -4720,7 +4727,7 @@
             <a:fld id="{B61BEF0D-F0BB-DE4B-95CE-6DB70DBA9567}" type="datetimeFigureOut">
               <a:rPr lang="en-US" smtClean="0"/>
               <a:pPr/>
-              <a:t>2/13/2022</a:t>
+              <a:t>2/17/2022</a:t>
             </a:fld>
             <a:endParaRPr lang="en-US" dirty="0"/>
           </a:p>
@@ -4992,7 +4999,7 @@
             <a:fld id="{B61BEF0D-F0BB-DE4B-95CE-6DB70DBA9567}" type="datetimeFigureOut">
               <a:rPr lang="en-US" smtClean="0"/>
               <a:pPr/>
-              <a:t>2/13/2022</a:t>
+              <a:t>2/17/2022</a:t>
             </a:fld>
             <a:endParaRPr lang="en-US" dirty="0"/>
           </a:p>
@@ -6096,8 +6103,8 @@
                     </a:srgbClr>
                   </a:outerShdw>
                 </a:effectLst>
-                <a:latin typeface="Adobe Arabic" panose="02040503050201020203" pitchFamily="18" charset="-78"/>
-                <a:cs typeface="Adobe Arabic" panose="02040503050201020203" pitchFamily="18" charset="-78"/>
+                <a:latin typeface="Calibri" panose="020F0502020204030204" pitchFamily="34" charset="0"/>
+                <a:cs typeface="Calibri" panose="020F0502020204030204" pitchFamily="34" charset="0"/>
               </a:rPr>
               <a:t>فصل اول : حرفه ای گری </a:t>
             </a:r>
@@ -6109,8 +6116,8 @@
                   </a:srgbClr>
                 </a:outerShdw>
               </a:effectLst>
-              <a:latin typeface="Adobe Arabic" panose="02040503050201020203" pitchFamily="18" charset="-78"/>
-              <a:cs typeface="Adobe Arabic" panose="02040503050201020203" pitchFamily="18" charset="-78"/>
+              <a:latin typeface="Calibri" panose="020F0502020204030204" pitchFamily="34" charset="0"/>
+              <a:cs typeface="Calibri" panose="020F0502020204030204" pitchFamily="34" charset="0"/>
             </a:endParaRPr>
           </a:p>
         </p:txBody>
@@ -8410,232 +8417,6 @@
           </a:p>
         </p:txBody>
       </p:sp>
-      <p:sp>
-        <p:nvSpPr>
-          <p:cNvPr id="9" name="Title 1"/>
-          <p:cNvSpPr txBox="1">
-            <a:spLocks/>
-          </p:cNvSpPr>
-          <p:nvPr/>
-        </p:nvSpPr>
-        <p:spPr>
-          <a:xfrm>
-            <a:off x="3929250" y="3888592"/>
-            <a:ext cx="7818249" cy="970450"/>
-          </a:xfrm>
-          <a:prstGeom prst="rect">
-            <a:avLst/>
-          </a:prstGeom>
-          <a:effectLst>
-            <a:outerShdw blurRad="50800" dir="14400000">
-              <a:srgbClr val="000000">
-                <a:alpha val="60000"/>
-              </a:srgbClr>
-            </a:outerShdw>
-          </a:effectLst>
-        </p:spPr>
-        <p:txBody>
-          <a:bodyPr vert="horz" lIns="91440" tIns="45720" rIns="91440" bIns="45720" rtlCol="0" anchor="b">
-            <a:noAutofit/>
-          </a:bodyPr>
-          <a:lstStyle>
-            <a:lvl1pPr algn="l" defTabSz="457200" rtl="0" eaLnBrk="1" latinLnBrk="0" hangingPunct="1">
-              <a:spcBef>
-                <a:spcPct val="0"/>
-              </a:spcBef>
-              <a:buNone/>
-              <a:defRPr sz="4000" b="1" kern="1200">
-                <a:solidFill>
-                  <a:srgbClr val="FEFEFE"/>
-                </a:solidFill>
-                <a:latin typeface="+mj-lt"/>
-                <a:ea typeface="+mj-ea"/>
-                <a:cs typeface="+mj-cs"/>
-              </a:defRPr>
-            </a:lvl1pPr>
-            <a:lvl2pPr eaLnBrk="1" hangingPunct="1">
-              <a:defRPr>
-                <a:solidFill>
-                  <a:schemeClr val="tx2"/>
-                </a:solidFill>
-              </a:defRPr>
-            </a:lvl2pPr>
-            <a:lvl3pPr eaLnBrk="1" hangingPunct="1">
-              <a:defRPr>
-                <a:solidFill>
-                  <a:schemeClr val="tx2"/>
-                </a:solidFill>
-              </a:defRPr>
-            </a:lvl3pPr>
-            <a:lvl4pPr eaLnBrk="1" hangingPunct="1">
-              <a:defRPr>
-                <a:solidFill>
-                  <a:schemeClr val="tx2"/>
-                </a:solidFill>
-              </a:defRPr>
-            </a:lvl4pPr>
-            <a:lvl5pPr eaLnBrk="1" hangingPunct="1">
-              <a:defRPr>
-                <a:solidFill>
-                  <a:schemeClr val="tx2"/>
-                </a:solidFill>
-              </a:defRPr>
-            </a:lvl5pPr>
-            <a:lvl6pPr eaLnBrk="1" hangingPunct="1">
-              <a:defRPr>
-                <a:solidFill>
-                  <a:schemeClr val="tx2"/>
-                </a:solidFill>
-              </a:defRPr>
-            </a:lvl6pPr>
-            <a:lvl7pPr eaLnBrk="1" hangingPunct="1">
-              <a:defRPr>
-                <a:solidFill>
-                  <a:schemeClr val="tx2"/>
-                </a:solidFill>
-              </a:defRPr>
-            </a:lvl7pPr>
-            <a:lvl8pPr eaLnBrk="1" hangingPunct="1">
-              <a:defRPr>
-                <a:solidFill>
-                  <a:schemeClr val="tx2"/>
-                </a:solidFill>
-              </a:defRPr>
-            </a:lvl8pPr>
-            <a:lvl9pPr eaLnBrk="1" hangingPunct="1">
-              <a:defRPr>
-                <a:solidFill>
-                  <a:schemeClr val="tx2"/>
-                </a:solidFill>
-              </a:defRPr>
-            </a:lvl9pPr>
-          </a:lstStyle>
-          <a:p>
-            <a:pPr algn="r" rtl="1"/>
-            <a:r>
-              <a:rPr lang="fa-IR" sz="3600" dirty="0">
-                <a:latin typeface="Calibri" panose="020F0502020204030204" pitchFamily="34" charset="0"/>
-                <a:cs typeface="Calibri" panose="020F0502020204030204" pitchFamily="34" charset="0"/>
-              </a:rPr>
-              <a:t>چرا « دلیل » مهم نیست !  </a:t>
-            </a:r>
-            <a:endParaRPr lang="fa-IR" sz="3600" dirty="0">
-              <a:effectLst>
-                <a:outerShdw blurRad="38100" dist="38100" dir="2700000" algn="tl">
-                  <a:srgbClr val="000000">
-                    <a:alpha val="43137"/>
-                  </a:srgbClr>
-                </a:outerShdw>
-              </a:effectLst>
-              <a:latin typeface="Calibri" panose="020F0502020204030204" pitchFamily="34" charset="0"/>
-              <a:cs typeface="Calibri" panose="020F0502020204030204" pitchFamily="34" charset="0"/>
-            </a:endParaRPr>
-          </a:p>
-        </p:txBody>
-      </p:sp>
-      <p:sp>
-        <p:nvSpPr>
-          <p:cNvPr id="10" name="TextBox 9"/>
-          <p:cNvSpPr txBox="1"/>
-          <p:nvPr/>
-        </p:nvSpPr>
-        <p:spPr>
-          <a:xfrm>
-            <a:off x="596900" y="4905208"/>
-            <a:ext cx="10713850" cy="1384995"/>
-          </a:xfrm>
-          <a:prstGeom prst="rect">
-            <a:avLst/>
-          </a:prstGeom>
-          <a:noFill/>
-        </p:spPr>
-        <p:txBody>
-          <a:bodyPr wrap="square" numCol="1" rtlCol="0">
-            <a:spAutoFit/>
-          </a:bodyPr>
-          <a:lstStyle/>
-          <a:p>
-            <a:pPr algn="just" rtl="1"/>
-            <a:r>
-              <a:rPr lang="fa-IR" sz="2800" dirty="0">
-                <a:latin typeface="Calibri" panose="020F0502020204030204" pitchFamily="34" charset="0"/>
-                <a:cs typeface="Calibri" panose="020F0502020204030204" pitchFamily="34" charset="0"/>
-              </a:rPr>
-              <a:t>دلیل اینکه امکان انجام کاری وجود ندارد ، نسبت به « حقیقت عدم انجام کار » در اهمیت بسیار پائین تری وجود دارد . </a:t>
-            </a:r>
-            <a:r>
-              <a:rPr lang="fa-IR" sz="2800" dirty="0">
-                <a:effectLst>
-                  <a:outerShdw blurRad="38100" dist="38100" dir="2700000" algn="tl">
-                    <a:srgbClr val="000000">
-                      <a:alpha val="43137"/>
-                    </a:srgbClr>
-                  </a:outerShdw>
-                </a:effectLst>
-                <a:latin typeface="Calibri" panose="020F0502020204030204" pitchFamily="34" charset="0"/>
-                <a:cs typeface="Calibri" panose="020F0502020204030204" pitchFamily="34" charset="0"/>
-              </a:rPr>
-              <a:t>اگر جزئیات زیادی بگوئید ، ممکن است مدیر سعی کند</a:t>
-            </a:r>
-            <a:r>
-              <a:rPr lang="en-US" sz="2800" dirty="0">
-                <a:effectLst>
-                  <a:outerShdw blurRad="38100" dist="38100" dir="2700000" algn="tl">
-                    <a:srgbClr val="000000">
-                      <a:alpha val="43137"/>
-                    </a:srgbClr>
-                  </a:outerShdw>
-                </a:effectLst>
-                <a:latin typeface="Calibri" panose="020F0502020204030204" pitchFamily="34" charset="0"/>
-                <a:cs typeface="Calibri" panose="020F0502020204030204" pitchFamily="34" charset="0"/>
-              </a:rPr>
-              <a:t>  </a:t>
-            </a:r>
-            <a:r>
-              <a:rPr lang="fa-IR" sz="2800" dirty="0">
-                <a:effectLst>
-                  <a:outerShdw blurRad="38100" dist="38100" dir="2700000" algn="tl">
-                    <a:srgbClr val="000000">
-                      <a:alpha val="43137"/>
-                    </a:srgbClr>
-                  </a:outerShdw>
-                </a:effectLst>
-                <a:latin typeface="Calibri" panose="020F0502020204030204" pitchFamily="34" charset="0"/>
-                <a:cs typeface="Calibri" panose="020F0502020204030204" pitchFamily="34" charset="0"/>
-              </a:rPr>
-              <a:t> در کار شما دخالت کند یا اصطلاحا شما را « </a:t>
-            </a:r>
-            <a:r>
-              <a:rPr lang="en-US" sz="2800" dirty="0">
-                <a:effectLst>
-                  <a:outerShdw blurRad="38100" dist="38100" dir="2700000" algn="tl">
-                    <a:srgbClr val="000000">
-                      <a:alpha val="43137"/>
-                    </a:srgbClr>
-                  </a:outerShdw>
-                </a:effectLst>
-                <a:latin typeface="Calibri" panose="020F0502020204030204" pitchFamily="34" charset="0"/>
-                <a:cs typeface="Calibri" panose="020F0502020204030204" pitchFamily="34" charset="0"/>
-              </a:rPr>
-              <a:t>micro management</a:t>
-            </a:r>
-            <a:r>
-              <a:rPr lang="fa-IR" sz="2800" dirty="0">
-                <a:effectLst>
-                  <a:outerShdw blurRad="38100" dist="38100" dir="2700000" algn="tl">
-                    <a:srgbClr val="000000">
-                      <a:alpha val="43137"/>
-                    </a:srgbClr>
-                  </a:outerShdw>
-                </a:effectLst>
-                <a:latin typeface="Calibri" panose="020F0502020204030204" pitchFamily="34" charset="0"/>
-                <a:cs typeface="Calibri" panose="020F0502020204030204" pitchFamily="34" charset="0"/>
-              </a:rPr>
-              <a:t> » کند</a:t>
-            </a:r>
-          </a:p>
-        </p:txBody>
-      </p:sp>
     </p:spTree>
     <p:extLst>
       <p:ext uri="{BB962C8B-B14F-4D97-AF65-F5344CB8AC3E}">
@@ -10457,8 +10238,8 @@
                     </a:srgbClr>
                   </a:outerShdw>
                 </a:effectLst>
-                <a:latin typeface="Adobe Arabic" panose="02040503050201020203" pitchFamily="18" charset="-78"/>
-                <a:cs typeface="Adobe Arabic" panose="02040503050201020203" pitchFamily="18" charset="-78"/>
+                <a:latin typeface="Calibri" panose="020F0502020204030204" pitchFamily="34" charset="0"/>
+                <a:cs typeface="Calibri" panose="020F0502020204030204" pitchFamily="34" charset="0"/>
               </a:rPr>
               <a:t>فصل دوم : « نه » بگوئید </a:t>
             </a:r>
@@ -10470,8 +10251,8 @@
                   </a:srgbClr>
                 </a:outerShdw>
               </a:effectLst>
-              <a:latin typeface="Adobe Arabic" panose="02040503050201020203" pitchFamily="18" charset="-78"/>
-              <a:cs typeface="Adobe Arabic" panose="02040503050201020203" pitchFamily="18" charset="-78"/>
+              <a:latin typeface="Calibri" panose="020F0502020204030204" pitchFamily="34" charset="0"/>
+              <a:cs typeface="Calibri" panose="020F0502020204030204" pitchFamily="34" charset="0"/>
             </a:endParaRPr>
           </a:p>
         </p:txBody>
@@ -10580,8 +10361,8 @@
             <a:pPr algn="r" rtl="1"/>
             <a:r>
               <a:rPr lang="fa-IR" sz="3600" dirty="0">
-                <a:latin typeface="Adobe Arabic" panose="02040503050201020203" pitchFamily="18" charset="-78"/>
-                <a:cs typeface="Adobe Arabic" panose="02040503050201020203" pitchFamily="18" charset="-78"/>
+                <a:latin typeface="Calibri" panose="020F0502020204030204" pitchFamily="34" charset="0"/>
+                <a:cs typeface="Calibri" panose="020F0502020204030204" pitchFamily="34" charset="0"/>
               </a:rPr>
               <a:t>هزینه ی « بعله » گفتن </a:t>
             </a:r>
@@ -10593,8 +10374,8 @@
                   </a:srgbClr>
                 </a:outerShdw>
               </a:effectLst>
-              <a:latin typeface="Adobe Arabic" panose="02040503050201020203" pitchFamily="18" charset="-78"/>
-              <a:cs typeface="Adobe Arabic" panose="02040503050201020203" pitchFamily="18" charset="-78"/>
+              <a:latin typeface="Calibri" panose="020F0502020204030204" pitchFamily="34" charset="0"/>
+              <a:cs typeface="Calibri" panose="020F0502020204030204" pitchFamily="34" charset="0"/>
             </a:endParaRPr>
           </a:p>
         </p:txBody>
@@ -11166,6 +10947,1370 @@
 </p:sld>
 </file>
 
+<file path=ppt/slides/slide25.xml><?xml version="1.0" encoding="utf-8"?>
+<p:sld xmlns:a="http://schemas.openxmlformats.org/drawingml/2006/main" xmlns:r="http://schemas.openxmlformats.org/officeDocument/2006/relationships" xmlns:p="http://schemas.openxmlformats.org/presentationml/2006/main">
+  <p:cSld>
+    <p:spTree>
+      <p:nvGrpSpPr>
+        <p:cNvPr id="1" name=""/>
+        <p:cNvGrpSpPr/>
+        <p:nvPr/>
+      </p:nvGrpSpPr>
+      <p:grpSpPr>
+        <a:xfrm>
+          <a:off x="0" y="0"/>
+          <a:ext cx="0" cy="0"/>
+          <a:chOff x="0" y="0"/>
+          <a:chExt cx="0" cy="0"/>
+        </a:xfrm>
+      </p:grpSpPr>
+      <p:sp>
+        <p:nvSpPr>
+          <p:cNvPr id="2" name="Title 1"/>
+          <p:cNvSpPr>
+            <a:spLocks noGrp="1"/>
+          </p:cNvSpPr>
+          <p:nvPr>
+            <p:ph type="title"/>
+          </p:nvPr>
+        </p:nvSpPr>
+        <p:spPr>
+          <a:xfrm>
+            <a:off x="381000" y="571500"/>
+            <a:ext cx="11341100" cy="685800"/>
+          </a:xfrm>
+        </p:spPr>
+        <p:txBody>
+          <a:bodyPr/>
+          <a:lstStyle/>
+          <a:p>
+            <a:pPr algn="r" rtl="1"/>
+            <a:r>
+              <a:rPr lang="fa-IR" sz="4400" dirty="0">
+                <a:effectLst>
+                  <a:outerShdw blurRad="38100" dist="38100" dir="2700000" algn="tl">
+                    <a:srgbClr val="000000">
+                      <a:alpha val="43137"/>
+                    </a:srgbClr>
+                  </a:outerShdw>
+                </a:effectLst>
+                <a:latin typeface="Calibri" panose="020F0502020204030204" pitchFamily="34" charset="0"/>
+                <a:cs typeface="Calibri" panose="020F0502020204030204" pitchFamily="34" charset="0"/>
+              </a:rPr>
+              <a:t>فصل سوم : « بعله » بگوئید </a:t>
+            </a:r>
+            <a:endParaRPr lang="en-US" sz="4400" dirty="0">
+              <a:effectLst>
+                <a:outerShdw blurRad="38100" dist="38100" dir="2700000" algn="tl">
+                  <a:srgbClr val="000000">
+                    <a:alpha val="43137"/>
+                  </a:srgbClr>
+                </a:outerShdw>
+              </a:effectLst>
+              <a:latin typeface="Calibri" panose="020F0502020204030204" pitchFamily="34" charset="0"/>
+              <a:cs typeface="Calibri" panose="020F0502020204030204" pitchFamily="34" charset="0"/>
+            </a:endParaRPr>
+          </a:p>
+        </p:txBody>
+      </p:sp>
+      <p:sp>
+        <p:nvSpPr>
+          <p:cNvPr id="5" name="Title 1"/>
+          <p:cNvSpPr txBox="1">
+            <a:spLocks/>
+          </p:cNvSpPr>
+          <p:nvPr/>
+        </p:nvSpPr>
+        <p:spPr>
+          <a:xfrm>
+            <a:off x="3662551" y="1653277"/>
+            <a:ext cx="7818249" cy="970450"/>
+          </a:xfrm>
+          <a:prstGeom prst="rect">
+            <a:avLst/>
+          </a:prstGeom>
+          <a:effectLst>
+            <a:outerShdw blurRad="50800" dir="14400000">
+              <a:srgbClr val="000000">
+                <a:alpha val="60000"/>
+              </a:srgbClr>
+            </a:outerShdw>
+          </a:effectLst>
+        </p:spPr>
+        <p:txBody>
+          <a:bodyPr vert="horz" lIns="91440" tIns="45720" rIns="91440" bIns="45720" rtlCol="0" anchor="b">
+            <a:noAutofit/>
+          </a:bodyPr>
+          <a:lstStyle>
+            <a:lvl1pPr algn="l" defTabSz="457200" rtl="0" eaLnBrk="1" latinLnBrk="0" hangingPunct="1">
+              <a:spcBef>
+                <a:spcPct val="0"/>
+              </a:spcBef>
+              <a:buNone/>
+              <a:defRPr sz="4000" b="1" kern="1200">
+                <a:solidFill>
+                  <a:srgbClr val="FEFEFE"/>
+                </a:solidFill>
+                <a:latin typeface="+mj-lt"/>
+                <a:ea typeface="+mj-ea"/>
+                <a:cs typeface="+mj-cs"/>
+              </a:defRPr>
+            </a:lvl1pPr>
+            <a:lvl2pPr eaLnBrk="1" hangingPunct="1">
+              <a:defRPr>
+                <a:solidFill>
+                  <a:schemeClr val="tx2"/>
+                </a:solidFill>
+              </a:defRPr>
+            </a:lvl2pPr>
+            <a:lvl3pPr eaLnBrk="1" hangingPunct="1">
+              <a:defRPr>
+                <a:solidFill>
+                  <a:schemeClr val="tx2"/>
+                </a:solidFill>
+              </a:defRPr>
+            </a:lvl3pPr>
+            <a:lvl4pPr eaLnBrk="1" hangingPunct="1">
+              <a:defRPr>
+                <a:solidFill>
+                  <a:schemeClr val="tx2"/>
+                </a:solidFill>
+              </a:defRPr>
+            </a:lvl4pPr>
+            <a:lvl5pPr eaLnBrk="1" hangingPunct="1">
+              <a:defRPr>
+                <a:solidFill>
+                  <a:schemeClr val="tx2"/>
+                </a:solidFill>
+              </a:defRPr>
+            </a:lvl5pPr>
+            <a:lvl6pPr eaLnBrk="1" hangingPunct="1">
+              <a:defRPr>
+                <a:solidFill>
+                  <a:schemeClr val="tx2"/>
+                </a:solidFill>
+              </a:defRPr>
+            </a:lvl6pPr>
+            <a:lvl7pPr eaLnBrk="1" hangingPunct="1">
+              <a:defRPr>
+                <a:solidFill>
+                  <a:schemeClr val="tx2"/>
+                </a:solidFill>
+              </a:defRPr>
+            </a:lvl7pPr>
+            <a:lvl8pPr eaLnBrk="1" hangingPunct="1">
+              <a:defRPr>
+                <a:solidFill>
+                  <a:schemeClr val="tx2"/>
+                </a:solidFill>
+              </a:defRPr>
+            </a:lvl8pPr>
+            <a:lvl9pPr eaLnBrk="1" hangingPunct="1">
+              <a:defRPr>
+                <a:solidFill>
+                  <a:schemeClr val="tx2"/>
+                </a:solidFill>
+              </a:defRPr>
+            </a:lvl9pPr>
+          </a:lstStyle>
+          <a:p>
+            <a:pPr algn="r" rtl="1"/>
+            <a:r>
+              <a:rPr lang="fa-IR" sz="3600" dirty="0">
+                <a:latin typeface="Calibri" panose="020F0502020204030204" pitchFamily="34" charset="0"/>
+                <a:cs typeface="Calibri" panose="020F0502020204030204" pitchFamily="34" charset="0"/>
+              </a:rPr>
+              <a:t>تعهد چگونه است ؟ </a:t>
+            </a:r>
+          </a:p>
+        </p:txBody>
+      </p:sp>
+      <p:sp>
+        <p:nvSpPr>
+          <p:cNvPr id="4" name="TextBox 3"/>
+          <p:cNvSpPr txBox="1"/>
+          <p:nvPr/>
+        </p:nvSpPr>
+        <p:spPr>
+          <a:xfrm>
+            <a:off x="711200" y="2623727"/>
+            <a:ext cx="10569865" cy="3970318"/>
+          </a:xfrm>
+          <a:prstGeom prst="rect">
+            <a:avLst/>
+          </a:prstGeom>
+          <a:noFill/>
+        </p:spPr>
+        <p:txBody>
+          <a:bodyPr wrap="square" rtlCol="0">
+            <a:spAutoFit/>
+          </a:bodyPr>
+          <a:lstStyle/>
+          <a:p>
+            <a:pPr marL="457200" indent="-457200" algn="r" rtl="1">
+              <a:buFont typeface="Arial" panose="020B0604020202020204" pitchFamily="34" charset="0"/>
+              <a:buChar char="•"/>
+            </a:pPr>
+            <a:r>
+              <a:rPr lang="fa-IR" sz="2800" b="1" dirty="0">
+                <a:latin typeface="Calibri" panose="020F0502020204030204" pitchFamily="34" charset="0"/>
+                <a:cs typeface="Calibri" panose="020F0502020204030204" pitchFamily="34" charset="0"/>
+              </a:rPr>
+              <a:t>شما فقط می توانید در مورد چیزی تعهد بدهید که بر روی تمام جنبه های آن ، کنترل کامل دارید .</a:t>
+            </a:r>
+          </a:p>
+          <a:p>
+            <a:pPr marL="457200" indent="-457200" algn="r" rtl="1">
+              <a:buFont typeface="Arial" panose="020B0604020202020204" pitchFamily="34" charset="0"/>
+              <a:buChar char="•"/>
+            </a:pPr>
+            <a:r>
+              <a:rPr lang="fa-IR" sz="2800" b="1" dirty="0">
+                <a:latin typeface="Calibri" panose="020F0502020204030204" pitchFamily="34" charset="0"/>
+                <a:cs typeface="Calibri" panose="020F0502020204030204" pitchFamily="34" charset="0"/>
+              </a:rPr>
+              <a:t>به کارهایی که می توانید برای رسیدن به هدف انجام دهید ، تعهد کنید . </a:t>
+            </a:r>
+          </a:p>
+          <a:p>
+            <a:pPr marL="457200" indent="-457200" algn="r" rtl="1">
+              <a:buFont typeface="Arial" panose="020B0604020202020204" pitchFamily="34" charset="0"/>
+              <a:buChar char="•"/>
+            </a:pPr>
+            <a:r>
+              <a:rPr lang="fa-IR" sz="2800" b="1" dirty="0">
+                <a:latin typeface="Calibri" panose="020F0502020204030204" pitchFamily="34" charset="0"/>
+                <a:cs typeface="Calibri" panose="020F0502020204030204" pitchFamily="34" charset="0"/>
+              </a:rPr>
+              <a:t>تعهد یعنی از به انجام نرساندن کار احساس بدی دارید.</a:t>
+            </a:r>
+          </a:p>
+          <a:p>
+            <a:pPr marL="457200" indent="-457200" algn="r" rtl="1">
+              <a:buFont typeface="Arial" panose="020B0604020202020204" pitchFamily="34" charset="0"/>
+              <a:buChar char="•"/>
+            </a:pPr>
+            <a:r>
+              <a:rPr lang="fa-IR" sz="2800" b="1" dirty="0">
+                <a:latin typeface="Calibri" panose="020F0502020204030204" pitchFamily="34" charset="0"/>
+                <a:cs typeface="Calibri" panose="020F0502020204030204" pitchFamily="34" charset="0"/>
+              </a:rPr>
+              <a:t>اگر کار نمی رسد یا امکان ندارد ، هر چه سریعتر اطلاع رسانی کنید . </a:t>
+            </a:r>
+          </a:p>
+          <a:p>
+            <a:pPr marL="457200" indent="-457200" algn="r" rtl="1">
+              <a:buFont typeface="Arial" panose="020B0604020202020204" pitchFamily="34" charset="0"/>
+              <a:buChar char="•"/>
+            </a:pPr>
+            <a:r>
+              <a:rPr lang="fa-IR" sz="2800" b="1" dirty="0">
+                <a:latin typeface="Calibri" panose="020F0502020204030204" pitchFamily="34" charset="0"/>
+                <a:cs typeface="Calibri" panose="020F0502020204030204" pitchFamily="34" charset="0"/>
+              </a:rPr>
+              <a:t>تعهدتان باید با نظم کاریتان همراه باشد. </a:t>
+            </a:r>
+            <a:r>
+              <a:rPr lang="fa-IR" b="1" dirty="0">
+                <a:solidFill>
+                  <a:schemeClr val="accent2">
+                    <a:lumMod val="60000"/>
+                    <a:lumOff val="40000"/>
+                  </a:schemeClr>
+                </a:solidFill>
+                <a:latin typeface="Calibri" panose="020F0502020204030204" pitchFamily="34" charset="0"/>
+                <a:cs typeface="Calibri" panose="020F0502020204030204" pitchFamily="34" charset="0"/>
+              </a:rPr>
+              <a:t>( </a:t>
+            </a:r>
+            <a:r>
+              <a:rPr lang="fa-IR" b="1" i="1" dirty="0">
+                <a:solidFill>
+                  <a:schemeClr val="accent2">
+                    <a:lumMod val="60000"/>
+                    <a:lumOff val="40000"/>
+                  </a:schemeClr>
+                </a:solidFill>
+                <a:latin typeface="Calibri" panose="020F0502020204030204" pitchFamily="34" charset="0"/>
+                <a:cs typeface="Calibri" panose="020F0502020204030204" pitchFamily="34" charset="0"/>
+              </a:rPr>
+              <a:t>بدون تست و ریفکتور سریعتر نمی شوید</a:t>
+            </a:r>
+            <a:r>
+              <a:rPr lang="fa-IR" b="1" dirty="0">
+                <a:solidFill>
+                  <a:schemeClr val="accent2">
+                    <a:lumMod val="60000"/>
+                    <a:lumOff val="40000"/>
+                  </a:schemeClr>
+                </a:solidFill>
+                <a:latin typeface="Calibri" panose="020F0502020204030204" pitchFamily="34" charset="0"/>
+                <a:cs typeface="Calibri" panose="020F0502020204030204" pitchFamily="34" charset="0"/>
+              </a:rPr>
+              <a:t>)</a:t>
+            </a:r>
+          </a:p>
+          <a:p>
+            <a:pPr marL="457200" indent="-457200" algn="r" rtl="1">
+              <a:buFont typeface="Arial" panose="020B0604020202020204" pitchFamily="34" charset="0"/>
+              <a:buChar char="•"/>
+            </a:pPr>
+            <a:r>
+              <a:rPr lang="fa-IR" sz="2800" b="1" dirty="0">
+                <a:latin typeface="Calibri" panose="020F0502020204030204" pitchFamily="34" charset="0"/>
+                <a:cs typeface="Calibri" panose="020F0502020204030204" pitchFamily="34" charset="0"/>
+              </a:rPr>
+              <a:t>باید استانداردهای کاری خودتان را حفظ کنید . </a:t>
+            </a:r>
+          </a:p>
+          <a:p>
+            <a:pPr marL="457200" indent="-457200" algn="r" rtl="1">
+              <a:buFont typeface="Arial" panose="020B0604020202020204" pitchFamily="34" charset="0"/>
+              <a:buChar char="•"/>
+            </a:pPr>
+            <a:r>
+              <a:rPr lang="fa-IR" sz="2800" b="1" dirty="0">
+                <a:latin typeface="Calibri" panose="020F0502020204030204" pitchFamily="34" charset="0"/>
+                <a:cs typeface="Calibri" panose="020F0502020204030204" pitchFamily="34" charset="0"/>
+              </a:rPr>
+              <a:t>اضافه کاری کردن ، هزینه دارد . </a:t>
+            </a:r>
+          </a:p>
+          <a:p>
+            <a:pPr marL="457200" indent="-457200" algn="r" rtl="1">
+              <a:buFont typeface="Arial" panose="020B0604020202020204" pitchFamily="34" charset="0"/>
+              <a:buChar char="•"/>
+            </a:pPr>
+            <a:r>
+              <a:rPr lang="fa-IR" sz="2800" b="1" dirty="0">
+                <a:latin typeface="Calibri" panose="020F0502020204030204" pitchFamily="34" charset="0"/>
+                <a:cs typeface="Calibri" panose="020F0502020204030204" pitchFamily="34" charset="0"/>
+              </a:rPr>
+              <a:t>حرفه ای ها حد خودشان را می دانند.</a:t>
+            </a:r>
+            <a:endParaRPr lang="en-US" sz="2800" dirty="0">
+              <a:latin typeface="Calibri" panose="020F0502020204030204" pitchFamily="34" charset="0"/>
+              <a:cs typeface="Calibri" panose="020F0502020204030204" pitchFamily="34" charset="0"/>
+            </a:endParaRPr>
+          </a:p>
+        </p:txBody>
+      </p:sp>
+    </p:spTree>
+    <p:extLst>
+      <p:ext uri="{BB962C8B-B14F-4D97-AF65-F5344CB8AC3E}">
+        <p14:creationId xmlns:p14="http://schemas.microsoft.com/office/powerpoint/2010/main" val="2345979198"/>
+      </p:ext>
+    </p:extLst>
+  </p:cSld>
+  <p:clrMapOvr>
+    <a:masterClrMapping/>
+  </p:clrMapOvr>
+</p:sld>
+</file>
+
+<file path=ppt/slides/slide26.xml><?xml version="1.0" encoding="utf-8"?>
+<p:sld xmlns:a="http://schemas.openxmlformats.org/drawingml/2006/main" xmlns:r="http://schemas.openxmlformats.org/officeDocument/2006/relationships" xmlns:p="http://schemas.openxmlformats.org/presentationml/2006/main">
+  <p:cSld>
+    <p:spTree>
+      <p:nvGrpSpPr>
+        <p:cNvPr id="1" name=""/>
+        <p:cNvGrpSpPr/>
+        <p:nvPr/>
+      </p:nvGrpSpPr>
+      <p:grpSpPr>
+        <a:xfrm>
+          <a:off x="0" y="0"/>
+          <a:ext cx="0" cy="0"/>
+          <a:chOff x="0" y="0"/>
+          <a:chExt cx="0" cy="0"/>
+        </a:xfrm>
+      </p:grpSpPr>
+      <p:sp>
+        <p:nvSpPr>
+          <p:cNvPr id="2" name="Title 1"/>
+          <p:cNvSpPr>
+            <a:spLocks noGrp="1"/>
+          </p:cNvSpPr>
+          <p:nvPr>
+            <p:ph type="title"/>
+          </p:nvPr>
+        </p:nvSpPr>
+        <p:spPr>
+          <a:xfrm>
+            <a:off x="381000" y="571500"/>
+            <a:ext cx="11341100" cy="685800"/>
+          </a:xfrm>
+        </p:spPr>
+        <p:txBody>
+          <a:bodyPr/>
+          <a:lstStyle/>
+          <a:p>
+            <a:pPr algn="r" rtl="1"/>
+            <a:r>
+              <a:rPr lang="fa-IR" sz="4400" dirty="0">
+                <a:effectLst>
+                  <a:outerShdw blurRad="38100" dist="38100" dir="2700000" algn="tl">
+                    <a:srgbClr val="000000">
+                      <a:alpha val="43137"/>
+                    </a:srgbClr>
+                  </a:outerShdw>
+                </a:effectLst>
+                <a:latin typeface="Calibri" panose="020F0502020204030204" pitchFamily="34" charset="0"/>
+                <a:cs typeface="Calibri" panose="020F0502020204030204" pitchFamily="34" charset="0"/>
+              </a:rPr>
+              <a:t>فصل چهارم : کُد زنی</a:t>
+            </a:r>
+            <a:endParaRPr lang="en-US" sz="4400" dirty="0">
+              <a:effectLst>
+                <a:outerShdw blurRad="38100" dist="38100" dir="2700000" algn="tl">
+                  <a:srgbClr val="000000">
+                    <a:alpha val="43137"/>
+                  </a:srgbClr>
+                </a:outerShdw>
+              </a:effectLst>
+              <a:latin typeface="Calibri" panose="020F0502020204030204" pitchFamily="34" charset="0"/>
+              <a:cs typeface="Calibri" panose="020F0502020204030204" pitchFamily="34" charset="0"/>
+            </a:endParaRPr>
+          </a:p>
+        </p:txBody>
+      </p:sp>
+      <p:sp>
+        <p:nvSpPr>
+          <p:cNvPr id="4" name="TextBox 3"/>
+          <p:cNvSpPr txBox="1"/>
+          <p:nvPr/>
+        </p:nvSpPr>
+        <p:spPr>
+          <a:xfrm>
+            <a:off x="711200" y="2239263"/>
+            <a:ext cx="11010900" cy="1384995"/>
+          </a:xfrm>
+          <a:prstGeom prst="rect">
+            <a:avLst/>
+          </a:prstGeom>
+          <a:noFill/>
+        </p:spPr>
+        <p:txBody>
+          <a:bodyPr wrap="square" rtlCol="0">
+            <a:spAutoFit/>
+          </a:bodyPr>
+          <a:lstStyle/>
+          <a:p>
+            <a:pPr algn="r" rtl="1"/>
+            <a:r>
+              <a:rPr lang="fa-IR" sz="2800" b="1" dirty="0">
+                <a:latin typeface="Calibri" panose="020F0502020204030204" pitchFamily="34" charset="0"/>
+                <a:cs typeface="Calibri" panose="020F0502020204030204" pitchFamily="34" charset="0"/>
+              </a:rPr>
+              <a:t>کد زنی فرایندی ذهنی و چالش برانگیز و فرسوده کننده است که نیاز به سطحی از تمرکز دارد که کارهای کمی با آن برابری می کنند.</a:t>
+            </a:r>
+          </a:p>
+          <a:p>
+            <a:pPr algn="r" rtl="1"/>
+            <a:endParaRPr lang="en-US" sz="2800" dirty="0">
+              <a:latin typeface="Calibri" panose="020F0502020204030204" pitchFamily="34" charset="0"/>
+              <a:cs typeface="Calibri" panose="020F0502020204030204" pitchFamily="34" charset="0"/>
+            </a:endParaRPr>
+          </a:p>
+        </p:txBody>
+      </p:sp>
+      <p:sp>
+        <p:nvSpPr>
+          <p:cNvPr id="11" name="TextBox 10">
+            <a:extLst>
+              <a:ext uri="{FF2B5EF4-FFF2-40B4-BE49-F238E27FC236}">
+                <a16:creationId xmlns:a16="http://schemas.microsoft.com/office/drawing/2014/main" id="{ACA58C7E-C836-4E66-A88E-CB3EF184A613}"/>
+              </a:ext>
+            </a:extLst>
+          </p:cNvPr>
+          <p:cNvSpPr txBox="1"/>
+          <p:nvPr/>
+        </p:nvSpPr>
+        <p:spPr>
+          <a:xfrm>
+            <a:off x="155864" y="3429000"/>
+            <a:ext cx="11566236" cy="2805063"/>
+          </a:xfrm>
+          <a:prstGeom prst="rect">
+            <a:avLst/>
+          </a:prstGeom>
+          <a:noFill/>
+        </p:spPr>
+        <p:txBody>
+          <a:bodyPr wrap="square" rtlCol="0">
+            <a:spAutoFit/>
+          </a:bodyPr>
+          <a:lstStyle/>
+          <a:p>
+            <a:pPr algn="r" rtl="1">
+              <a:lnSpc>
+                <a:spcPct val="150000"/>
+              </a:lnSpc>
+            </a:pPr>
+            <a:r>
+              <a:rPr lang="fa-IR" sz="2400" b="1" i="1" dirty="0">
+                <a:latin typeface="Calibri" panose="020F0502020204030204" pitchFamily="34" charset="0"/>
+                <a:cs typeface="Calibri" panose="020F0502020204030204" pitchFamily="34" charset="0"/>
+              </a:rPr>
+              <a:t>کد شما باید :</a:t>
+            </a:r>
+          </a:p>
+          <a:p>
+            <a:pPr marL="914400" lvl="1" indent="-457200" algn="r" rtl="1">
+              <a:lnSpc>
+                <a:spcPct val="150000"/>
+              </a:lnSpc>
+              <a:buFont typeface="Wingdings" panose="05000000000000000000" pitchFamily="2" charset="2"/>
+              <a:buChar char="ü"/>
+            </a:pPr>
+            <a:r>
+              <a:rPr lang="fa-IR" sz="2400" b="1" dirty="0">
+                <a:latin typeface="Calibri" panose="020F0502020204030204" pitchFamily="34" charset="0"/>
+                <a:cs typeface="Calibri" panose="020F0502020204030204" pitchFamily="34" charset="0"/>
+              </a:rPr>
+              <a:t>باید کار کند. </a:t>
+            </a:r>
+          </a:p>
+          <a:p>
+            <a:pPr marL="914400" lvl="1" indent="-457200" algn="r" rtl="1">
+              <a:lnSpc>
+                <a:spcPct val="150000"/>
+              </a:lnSpc>
+              <a:buFont typeface="Wingdings" panose="05000000000000000000" pitchFamily="2" charset="2"/>
+              <a:buChar char="ü"/>
+            </a:pPr>
+            <a:r>
+              <a:rPr lang="fa-IR" sz="2400" b="1" dirty="0">
+                <a:latin typeface="Calibri" panose="020F0502020204030204" pitchFamily="34" charset="0"/>
+                <a:cs typeface="Calibri" panose="020F0502020204030204" pitchFamily="34" charset="0"/>
+              </a:rPr>
+              <a:t>باید مشکلات واقعی مشتری را حل کند نه آنچه او فکر می کند به آن نیاز دارد ( مذاکره کنیم ) </a:t>
+            </a:r>
+          </a:p>
+          <a:p>
+            <a:pPr marL="914400" lvl="1" indent="-457200" algn="r" rtl="1">
+              <a:lnSpc>
+                <a:spcPct val="150000"/>
+              </a:lnSpc>
+              <a:buFont typeface="Wingdings" panose="05000000000000000000" pitchFamily="2" charset="2"/>
+              <a:buChar char="ü"/>
+            </a:pPr>
+            <a:r>
+              <a:rPr lang="fa-IR" sz="2400" b="1" dirty="0">
+                <a:latin typeface="Calibri" panose="020F0502020204030204" pitchFamily="34" charset="0"/>
+                <a:cs typeface="Calibri" panose="020F0502020204030204" pitchFamily="34" charset="0"/>
+              </a:rPr>
+              <a:t>باید درون سیستم فعلی بنشیند با سیستم فعلی کار کند.</a:t>
+            </a:r>
+          </a:p>
+          <a:p>
+            <a:pPr marL="914400" lvl="1" indent="-457200" algn="r" rtl="1">
+              <a:lnSpc>
+                <a:spcPct val="150000"/>
+              </a:lnSpc>
+              <a:buFont typeface="Wingdings" panose="05000000000000000000" pitchFamily="2" charset="2"/>
+              <a:buChar char="ü"/>
+            </a:pPr>
+            <a:r>
+              <a:rPr lang="fa-IR" sz="2400" b="1" dirty="0">
+                <a:latin typeface="Calibri" panose="020F0502020204030204" pitchFamily="34" charset="0"/>
+                <a:cs typeface="Calibri" panose="020F0502020204030204" pitchFamily="34" charset="0"/>
+              </a:rPr>
+              <a:t>باید توسط سایر برنامه نویس ها قابل خواندن باشند.</a:t>
+            </a:r>
+            <a:endParaRPr lang="en-US" sz="2400" b="1" dirty="0">
+              <a:latin typeface="Calibri" panose="020F0502020204030204" pitchFamily="34" charset="0"/>
+              <a:cs typeface="Calibri" panose="020F0502020204030204" pitchFamily="34" charset="0"/>
+            </a:endParaRPr>
+          </a:p>
+        </p:txBody>
+      </p:sp>
+    </p:spTree>
+    <p:extLst>
+      <p:ext uri="{BB962C8B-B14F-4D97-AF65-F5344CB8AC3E}">
+        <p14:creationId xmlns:p14="http://schemas.microsoft.com/office/powerpoint/2010/main" val="1541418928"/>
+      </p:ext>
+    </p:extLst>
+  </p:cSld>
+  <p:clrMapOvr>
+    <a:masterClrMapping/>
+  </p:clrMapOvr>
+</p:sld>
+</file>
+
+<file path=ppt/slides/slide27.xml><?xml version="1.0" encoding="utf-8"?>
+<p:sld xmlns:a="http://schemas.openxmlformats.org/drawingml/2006/main" xmlns:r="http://schemas.openxmlformats.org/officeDocument/2006/relationships" xmlns:p="http://schemas.openxmlformats.org/presentationml/2006/main">
+  <p:cSld>
+    <p:spTree>
+      <p:nvGrpSpPr>
+        <p:cNvPr id="1" name=""/>
+        <p:cNvGrpSpPr/>
+        <p:nvPr/>
+      </p:nvGrpSpPr>
+      <p:grpSpPr>
+        <a:xfrm>
+          <a:off x="0" y="0"/>
+          <a:ext cx="0" cy="0"/>
+          <a:chOff x="0" y="0"/>
+          <a:chExt cx="0" cy="0"/>
+        </a:xfrm>
+      </p:grpSpPr>
+      <p:sp>
+        <p:nvSpPr>
+          <p:cNvPr id="2" name="Title 1"/>
+          <p:cNvSpPr>
+            <a:spLocks noGrp="1"/>
+          </p:cNvSpPr>
+          <p:nvPr>
+            <p:ph type="title"/>
+          </p:nvPr>
+        </p:nvSpPr>
+        <p:spPr>
+          <a:xfrm>
+            <a:off x="381000" y="571500"/>
+            <a:ext cx="11341100" cy="685800"/>
+          </a:xfrm>
+        </p:spPr>
+        <p:txBody>
+          <a:bodyPr/>
+          <a:lstStyle/>
+          <a:p>
+            <a:pPr algn="r" rtl="1"/>
+            <a:r>
+              <a:rPr lang="fa-IR" sz="4400" dirty="0">
+                <a:effectLst>
+                  <a:outerShdw blurRad="38100" dist="38100" dir="2700000" algn="tl">
+                    <a:srgbClr val="000000">
+                      <a:alpha val="43137"/>
+                    </a:srgbClr>
+                  </a:outerShdw>
+                </a:effectLst>
+                <a:latin typeface="Calibri" panose="020F0502020204030204" pitchFamily="34" charset="0"/>
+                <a:cs typeface="Calibri" panose="020F0502020204030204" pitchFamily="34" charset="0"/>
+              </a:rPr>
+              <a:t>فصل چهارم : کُد زنی</a:t>
+            </a:r>
+            <a:endParaRPr lang="en-US" sz="4400" dirty="0">
+              <a:effectLst>
+                <a:outerShdw blurRad="38100" dist="38100" dir="2700000" algn="tl">
+                  <a:srgbClr val="000000">
+                    <a:alpha val="43137"/>
+                  </a:srgbClr>
+                </a:outerShdw>
+              </a:effectLst>
+              <a:latin typeface="Calibri" panose="020F0502020204030204" pitchFamily="34" charset="0"/>
+              <a:cs typeface="Calibri" panose="020F0502020204030204" pitchFamily="34" charset="0"/>
+            </a:endParaRPr>
+          </a:p>
+        </p:txBody>
+      </p:sp>
+      <p:sp>
+        <p:nvSpPr>
+          <p:cNvPr id="11" name="TextBox 10">
+            <a:extLst>
+              <a:ext uri="{FF2B5EF4-FFF2-40B4-BE49-F238E27FC236}">
+                <a16:creationId xmlns:a16="http://schemas.microsoft.com/office/drawing/2014/main" id="{ACA58C7E-C836-4E66-A88E-CB3EF184A613}"/>
+              </a:ext>
+            </a:extLst>
+          </p:cNvPr>
+          <p:cNvSpPr txBox="1"/>
+          <p:nvPr/>
+        </p:nvSpPr>
+        <p:spPr>
+          <a:xfrm>
+            <a:off x="155864" y="2026468"/>
+            <a:ext cx="11566236" cy="4467057"/>
+          </a:xfrm>
+          <a:prstGeom prst="rect">
+            <a:avLst/>
+          </a:prstGeom>
+          <a:noFill/>
+        </p:spPr>
+        <p:txBody>
+          <a:bodyPr wrap="square" rtlCol="0">
+            <a:spAutoFit/>
+          </a:bodyPr>
+          <a:lstStyle/>
+          <a:p>
+            <a:pPr algn="r" rtl="1">
+              <a:lnSpc>
+                <a:spcPct val="150000"/>
+              </a:lnSpc>
+            </a:pPr>
+            <a:r>
+              <a:rPr lang="fa-IR" sz="2400" b="1" i="1" dirty="0">
+                <a:latin typeface="Calibri" panose="020F0502020204030204" pitchFamily="34" charset="0"/>
+                <a:cs typeface="Calibri" panose="020F0502020204030204" pitchFamily="34" charset="0"/>
+              </a:rPr>
+              <a:t>نکاتی که باید در نظر بگیرید:</a:t>
+            </a:r>
+          </a:p>
+          <a:p>
+            <a:pPr marL="914400" lvl="1" indent="-457200" algn="r" rtl="1">
+              <a:lnSpc>
+                <a:spcPct val="150000"/>
+              </a:lnSpc>
+              <a:buFont typeface="Wingdings" panose="05000000000000000000" pitchFamily="2" charset="2"/>
+              <a:buChar char="ü"/>
+            </a:pPr>
+            <a:r>
+              <a:rPr lang="fa-IR" sz="2400" b="1" dirty="0">
+                <a:latin typeface="Calibri" panose="020F0502020204030204" pitchFamily="34" charset="0"/>
+                <a:cs typeface="Calibri" panose="020F0502020204030204" pitchFamily="34" charset="0"/>
+              </a:rPr>
+              <a:t>اگر خسته اید یا تمرکز ندارید، کد نزنید ؛ چون مجبور می شوید با هزینه ی بیشتری آنها را اصلاح کنید.</a:t>
+            </a:r>
+          </a:p>
+          <a:p>
+            <a:pPr marL="914400" lvl="1" indent="-457200" algn="r" rtl="1">
+              <a:lnSpc>
+                <a:spcPct val="150000"/>
+              </a:lnSpc>
+              <a:buFont typeface="Wingdings" panose="05000000000000000000" pitchFamily="2" charset="2"/>
+              <a:buChar char="ü"/>
+            </a:pPr>
+            <a:r>
+              <a:rPr lang="fa-IR" sz="2400" b="1" dirty="0">
+                <a:latin typeface="Calibri" panose="020F0502020204030204" pitchFamily="34" charset="0"/>
+                <a:cs typeface="Calibri" panose="020F0502020204030204" pitchFamily="34" charset="0"/>
+              </a:rPr>
+              <a:t>کدهای نیمه شب ، باگ های پایدار می شوند.</a:t>
+            </a:r>
+          </a:p>
+          <a:p>
+            <a:pPr marL="914400" lvl="1" indent="-457200" algn="r" rtl="1">
+              <a:lnSpc>
+                <a:spcPct val="150000"/>
+              </a:lnSpc>
+              <a:buFont typeface="Wingdings" panose="05000000000000000000" pitchFamily="2" charset="2"/>
+              <a:buChar char="ü"/>
+            </a:pPr>
+            <a:r>
+              <a:rPr lang="fa-IR" sz="2400" b="1" dirty="0">
+                <a:latin typeface="Calibri" panose="020F0502020204030204" pitchFamily="34" charset="0"/>
+                <a:cs typeface="Calibri" panose="020F0502020204030204" pitchFamily="34" charset="0"/>
+              </a:rPr>
+              <a:t>مواظب کد زنی در زمان ناراحتی و نگرانی باشید. ( می توانید تقسیم زمانی کنید ، نگرانی – کار ) </a:t>
+            </a:r>
+          </a:p>
+          <a:p>
+            <a:pPr marL="914400" lvl="1" indent="-457200" algn="r" rtl="1">
+              <a:lnSpc>
+                <a:spcPct val="150000"/>
+              </a:lnSpc>
+              <a:buFont typeface="Wingdings" panose="05000000000000000000" pitchFamily="2" charset="2"/>
+              <a:buChar char="ü"/>
+            </a:pPr>
+            <a:r>
+              <a:rPr lang="en-US" sz="2400" b="1" dirty="0">
+                <a:latin typeface="Calibri" panose="020F0502020204030204" pitchFamily="34" charset="0"/>
+                <a:cs typeface="Calibri" panose="020F0502020204030204" pitchFamily="34" charset="0"/>
+              </a:rPr>
+              <a:t>The Flow Zone</a:t>
+            </a:r>
+            <a:r>
+              <a:rPr lang="fa-IR" sz="2400" b="1" dirty="0">
+                <a:latin typeface="Calibri" panose="020F0502020204030204" pitchFamily="34" charset="0"/>
+                <a:cs typeface="Calibri" panose="020F0502020204030204" pitchFamily="34" charset="0"/>
+              </a:rPr>
+              <a:t> : از این حالت دوری کنید ؛ هر چند کد بیشتری می زنید ولی تصویر بزرگتر را فراموش می کنید.</a:t>
+            </a:r>
+          </a:p>
+          <a:p>
+            <a:pPr marL="914400" lvl="1" indent="-457200" algn="r" rtl="1">
+              <a:lnSpc>
+                <a:spcPct val="150000"/>
+              </a:lnSpc>
+              <a:buFont typeface="Wingdings" panose="05000000000000000000" pitchFamily="2" charset="2"/>
+              <a:buChar char="ü"/>
+            </a:pPr>
+            <a:r>
+              <a:rPr lang="en-US" sz="2400" b="1" dirty="0">
+                <a:latin typeface="Calibri" panose="020F0502020204030204" pitchFamily="34" charset="0"/>
+                <a:cs typeface="Calibri" panose="020F0502020204030204" pitchFamily="34" charset="0"/>
+              </a:rPr>
+              <a:t>Pair Programing</a:t>
+            </a:r>
+            <a:r>
+              <a:rPr lang="fa-IR" sz="2400" b="1" dirty="0">
+                <a:latin typeface="Calibri" panose="020F0502020204030204" pitchFamily="34" charset="0"/>
+                <a:cs typeface="Calibri" panose="020F0502020204030204" pitchFamily="34" charset="0"/>
+              </a:rPr>
+              <a:t> کنید.</a:t>
+            </a:r>
+          </a:p>
+          <a:p>
+            <a:pPr marL="914400" lvl="1" indent="-457200" algn="r" rtl="1">
+              <a:lnSpc>
+                <a:spcPct val="150000"/>
+              </a:lnSpc>
+              <a:buFont typeface="Wingdings" panose="05000000000000000000" pitchFamily="2" charset="2"/>
+              <a:buChar char="ü"/>
+            </a:pPr>
+            <a:r>
+              <a:rPr lang="fa-IR" sz="2400" b="1" dirty="0">
+                <a:latin typeface="Calibri" panose="020F0502020204030204" pitchFamily="34" charset="0"/>
+                <a:cs typeface="Calibri" panose="020F0502020204030204" pitchFamily="34" charset="0"/>
+              </a:rPr>
+              <a:t>موسیقی ، </a:t>
+            </a:r>
+            <a:r>
+              <a:rPr lang="fa-IR" b="1" i="1" dirty="0">
+                <a:latin typeface="Calibri" panose="020F0502020204030204" pitchFamily="34" charset="0"/>
+                <a:cs typeface="Calibri" panose="020F0502020204030204" pitchFamily="34" charset="0"/>
+              </a:rPr>
+              <a:t>به رفتن به </a:t>
+            </a:r>
+            <a:r>
+              <a:rPr lang="en-US" b="1" i="1" dirty="0">
+                <a:latin typeface="Calibri" panose="020F0502020204030204" pitchFamily="34" charset="0"/>
+                <a:cs typeface="Calibri" panose="020F0502020204030204" pitchFamily="34" charset="0"/>
+              </a:rPr>
+              <a:t>The Flow Zone</a:t>
+            </a:r>
+            <a:r>
+              <a:rPr lang="fa-IR" b="1" i="1" dirty="0">
+                <a:latin typeface="Calibri" panose="020F0502020204030204" pitchFamily="34" charset="0"/>
+                <a:cs typeface="Calibri" panose="020F0502020204030204" pitchFamily="34" charset="0"/>
+              </a:rPr>
+              <a:t> کمک می کند.</a:t>
+            </a:r>
+            <a:endParaRPr lang="en-US" b="1" i="1" dirty="0">
+              <a:latin typeface="Calibri" panose="020F0502020204030204" pitchFamily="34" charset="0"/>
+              <a:cs typeface="Calibri" panose="020F0502020204030204" pitchFamily="34" charset="0"/>
+            </a:endParaRPr>
+          </a:p>
+        </p:txBody>
+      </p:sp>
+    </p:spTree>
+    <p:extLst>
+      <p:ext uri="{BB962C8B-B14F-4D97-AF65-F5344CB8AC3E}">
+        <p14:creationId xmlns:p14="http://schemas.microsoft.com/office/powerpoint/2010/main" val="3141049391"/>
+      </p:ext>
+    </p:extLst>
+  </p:cSld>
+  <p:clrMapOvr>
+    <a:masterClrMapping/>
+  </p:clrMapOvr>
+</p:sld>
+</file>
+
+<file path=ppt/slides/slide28.xml><?xml version="1.0" encoding="utf-8"?>
+<p:sld xmlns:a="http://schemas.openxmlformats.org/drawingml/2006/main" xmlns:r="http://schemas.openxmlformats.org/officeDocument/2006/relationships" xmlns:p="http://schemas.openxmlformats.org/presentationml/2006/main">
+  <p:cSld>
+    <p:spTree>
+      <p:nvGrpSpPr>
+        <p:cNvPr id="1" name=""/>
+        <p:cNvGrpSpPr/>
+        <p:nvPr/>
+      </p:nvGrpSpPr>
+      <p:grpSpPr>
+        <a:xfrm>
+          <a:off x="0" y="0"/>
+          <a:ext cx="0" cy="0"/>
+          <a:chOff x="0" y="0"/>
+          <a:chExt cx="0" cy="0"/>
+        </a:xfrm>
+      </p:grpSpPr>
+      <p:sp>
+        <p:nvSpPr>
+          <p:cNvPr id="2" name="Title 1"/>
+          <p:cNvSpPr>
+            <a:spLocks noGrp="1"/>
+          </p:cNvSpPr>
+          <p:nvPr>
+            <p:ph type="title"/>
+          </p:nvPr>
+        </p:nvSpPr>
+        <p:spPr>
+          <a:xfrm>
+            <a:off x="381000" y="571500"/>
+            <a:ext cx="11341100" cy="685800"/>
+          </a:xfrm>
+        </p:spPr>
+        <p:txBody>
+          <a:bodyPr/>
+          <a:lstStyle/>
+          <a:p>
+            <a:pPr algn="r" rtl="1"/>
+            <a:r>
+              <a:rPr lang="fa-IR" sz="4400" dirty="0">
+                <a:effectLst>
+                  <a:outerShdw blurRad="38100" dist="38100" dir="2700000" algn="tl">
+                    <a:srgbClr val="000000">
+                      <a:alpha val="43137"/>
+                    </a:srgbClr>
+                  </a:outerShdw>
+                </a:effectLst>
+                <a:latin typeface="Calibri" panose="020F0502020204030204" pitchFamily="34" charset="0"/>
+                <a:cs typeface="Calibri" panose="020F0502020204030204" pitchFamily="34" charset="0"/>
+              </a:rPr>
+              <a:t>فصل چهارم : کُد زنی</a:t>
+            </a:r>
+            <a:endParaRPr lang="en-US" sz="4400" dirty="0">
+              <a:effectLst>
+                <a:outerShdw blurRad="38100" dist="38100" dir="2700000" algn="tl">
+                  <a:srgbClr val="000000">
+                    <a:alpha val="43137"/>
+                  </a:srgbClr>
+                </a:outerShdw>
+              </a:effectLst>
+              <a:latin typeface="Calibri" panose="020F0502020204030204" pitchFamily="34" charset="0"/>
+              <a:cs typeface="Calibri" panose="020F0502020204030204" pitchFamily="34" charset="0"/>
+            </a:endParaRPr>
+          </a:p>
+        </p:txBody>
+      </p:sp>
+      <p:sp>
+        <p:nvSpPr>
+          <p:cNvPr id="11" name="TextBox 10">
+            <a:extLst>
+              <a:ext uri="{FF2B5EF4-FFF2-40B4-BE49-F238E27FC236}">
+                <a16:creationId xmlns:a16="http://schemas.microsoft.com/office/drawing/2014/main" id="{ACA58C7E-C836-4E66-A88E-CB3EF184A613}"/>
+              </a:ext>
+            </a:extLst>
+          </p:cNvPr>
+          <p:cNvSpPr txBox="1"/>
+          <p:nvPr/>
+        </p:nvSpPr>
+        <p:spPr>
+          <a:xfrm>
+            <a:off x="155864" y="2026468"/>
+            <a:ext cx="11566236" cy="4605556"/>
+          </a:xfrm>
+          <a:prstGeom prst="rect">
+            <a:avLst/>
+          </a:prstGeom>
+          <a:noFill/>
+        </p:spPr>
+        <p:txBody>
+          <a:bodyPr wrap="square" rtlCol="0">
+            <a:spAutoFit/>
+          </a:bodyPr>
+          <a:lstStyle/>
+          <a:p>
+            <a:pPr algn="r" rtl="1">
+              <a:lnSpc>
+                <a:spcPct val="150000"/>
+              </a:lnSpc>
+            </a:pPr>
+            <a:r>
+              <a:rPr lang="fa-IR" sz="2400" b="1" i="1" dirty="0">
+                <a:latin typeface="Calibri" panose="020F0502020204030204" pitchFamily="34" charset="0"/>
+                <a:cs typeface="Calibri" panose="020F0502020204030204" pitchFamily="34" charset="0"/>
+              </a:rPr>
+              <a:t>نکاتی که باید در نظر بگیرید:</a:t>
+            </a:r>
+          </a:p>
+          <a:p>
+            <a:pPr marL="914400" lvl="1" indent="-457200" algn="r" rtl="1">
+              <a:lnSpc>
+                <a:spcPct val="150000"/>
+              </a:lnSpc>
+              <a:buFont typeface="Wingdings" panose="05000000000000000000" pitchFamily="2" charset="2"/>
+              <a:buChar char="ü"/>
+            </a:pPr>
+            <a:r>
+              <a:rPr lang="fa-IR" sz="2400" b="1" dirty="0">
+                <a:latin typeface="Calibri" panose="020F0502020204030204" pitchFamily="34" charset="0"/>
+                <a:cs typeface="Calibri" panose="020F0502020204030204" pitchFamily="34" charset="0"/>
+              </a:rPr>
+              <a:t>وقفه ها :</a:t>
+            </a:r>
+          </a:p>
+          <a:p>
+            <a:pPr marL="1371600" lvl="2" indent="-457200" algn="r" rtl="1">
+              <a:lnSpc>
+                <a:spcPct val="150000"/>
+              </a:lnSpc>
+              <a:buFont typeface="Wingdings" panose="05000000000000000000" pitchFamily="2" charset="2"/>
+              <a:buChar char="ü"/>
+            </a:pPr>
+            <a:r>
+              <a:rPr lang="fa-IR" b="1" i="1" dirty="0">
+                <a:latin typeface="Calibri" panose="020F0502020204030204" pitchFamily="34" charset="0"/>
+                <a:cs typeface="Calibri" panose="020F0502020204030204" pitchFamily="34" charset="0"/>
+              </a:rPr>
+              <a:t>می توانید </a:t>
+            </a:r>
+            <a:r>
+              <a:rPr lang="en-US" b="1" i="1" dirty="0">
+                <a:latin typeface="Calibri" panose="020F0502020204030204" pitchFamily="34" charset="0"/>
+                <a:cs typeface="Calibri" panose="020F0502020204030204" pitchFamily="34" charset="0"/>
+              </a:rPr>
+              <a:t>Pair Programing</a:t>
+            </a:r>
+            <a:r>
+              <a:rPr lang="fa-IR" b="1" i="1" dirty="0">
+                <a:latin typeface="Calibri" panose="020F0502020204030204" pitchFamily="34" charset="0"/>
+                <a:cs typeface="Calibri" panose="020F0502020204030204" pitchFamily="34" charset="0"/>
+              </a:rPr>
+              <a:t> کنید.</a:t>
+            </a:r>
+          </a:p>
+          <a:p>
+            <a:pPr marL="1371600" lvl="2" indent="-457200" algn="r" rtl="1">
+              <a:lnSpc>
+                <a:spcPct val="150000"/>
+              </a:lnSpc>
+              <a:buFont typeface="Wingdings" panose="05000000000000000000" pitchFamily="2" charset="2"/>
+              <a:buChar char="ü"/>
+            </a:pPr>
+            <a:r>
+              <a:rPr lang="en-US" b="1" i="1" dirty="0">
+                <a:latin typeface="Calibri" panose="020F0502020204030204" pitchFamily="34" charset="0"/>
+                <a:cs typeface="Calibri" panose="020F0502020204030204" pitchFamily="34" charset="0"/>
+              </a:rPr>
+              <a:t>TDD</a:t>
+            </a:r>
+            <a:r>
+              <a:rPr lang="fa-IR" b="1" i="1" dirty="0">
+                <a:latin typeface="Calibri" panose="020F0502020204030204" pitchFamily="34" charset="0"/>
+                <a:cs typeface="Calibri" panose="020F0502020204030204" pitchFamily="34" charset="0"/>
+              </a:rPr>
+              <a:t> می تواند به شما کمک کند.</a:t>
+            </a:r>
+          </a:p>
+          <a:p>
+            <a:pPr marL="1371600" lvl="2" indent="-457200" algn="r" rtl="1">
+              <a:lnSpc>
+                <a:spcPct val="150000"/>
+              </a:lnSpc>
+              <a:buFont typeface="Wingdings" panose="05000000000000000000" pitchFamily="2" charset="2"/>
+              <a:buChar char="ü"/>
+            </a:pPr>
+            <a:r>
+              <a:rPr lang="fa-IR" b="1" i="1" dirty="0">
+                <a:latin typeface="Calibri" panose="020F0502020204030204" pitchFamily="34" charset="0"/>
+                <a:cs typeface="Calibri" panose="020F0502020204030204" pitchFamily="34" charset="0"/>
+              </a:rPr>
+              <a:t>به عنوان یک حرفه ای باید به صورت مودبانه حاضر باشید به دیگران کمک کنید.</a:t>
+            </a:r>
+          </a:p>
+          <a:p>
+            <a:pPr marL="914400" lvl="1" indent="-457200" algn="r" rtl="1">
+              <a:lnSpc>
+                <a:spcPct val="150000"/>
+              </a:lnSpc>
+              <a:buFont typeface="Wingdings" panose="05000000000000000000" pitchFamily="2" charset="2"/>
+              <a:buChar char="ü"/>
+            </a:pPr>
+            <a:r>
+              <a:rPr lang="fa-IR" sz="2400" b="1" dirty="0">
+                <a:latin typeface="Calibri" panose="020F0502020204030204" pitchFamily="34" charset="0"/>
+                <a:cs typeface="Calibri" panose="020F0502020204030204" pitchFamily="34" charset="0"/>
+              </a:rPr>
+              <a:t>خلاقیت خود را تقویت کنید. </a:t>
+            </a:r>
+          </a:p>
+          <a:p>
+            <a:pPr marL="914400" lvl="1" indent="-457200" algn="r" rtl="1">
+              <a:lnSpc>
+                <a:spcPct val="150000"/>
+              </a:lnSpc>
+              <a:buFont typeface="Wingdings" panose="05000000000000000000" pitchFamily="2" charset="2"/>
+              <a:buChar char="ü"/>
+            </a:pPr>
+            <a:r>
+              <a:rPr lang="fa-IR" sz="2400" b="1" dirty="0">
+                <a:latin typeface="Calibri" panose="020F0502020204030204" pitchFamily="34" charset="0"/>
+                <a:cs typeface="Calibri" panose="020F0502020204030204" pitchFamily="34" charset="0"/>
+              </a:rPr>
+              <a:t>زمان دیباگ کردن را هم جزء کدنویسی حساب کنید. ( </a:t>
+            </a:r>
+            <a:r>
+              <a:rPr lang="en-US" sz="2400" b="1" dirty="0">
+                <a:latin typeface="Calibri" panose="020F0502020204030204" pitchFamily="34" charset="0"/>
+                <a:cs typeface="Calibri" panose="020F0502020204030204" pitchFamily="34" charset="0"/>
+              </a:rPr>
+              <a:t>TDD</a:t>
+            </a:r>
+            <a:r>
+              <a:rPr lang="fa-IR" sz="2400" b="1" dirty="0">
+                <a:latin typeface="Calibri" panose="020F0502020204030204" pitchFamily="34" charset="0"/>
+                <a:cs typeface="Calibri" panose="020F0502020204030204" pitchFamily="34" charset="0"/>
+              </a:rPr>
+              <a:t> می تواند کمک زیادی کند ) </a:t>
+            </a:r>
+          </a:p>
+          <a:p>
+            <a:pPr marL="914400" lvl="1" indent="-457200" algn="r" rtl="1">
+              <a:lnSpc>
+                <a:spcPct val="150000"/>
+              </a:lnSpc>
+              <a:buFont typeface="Wingdings" panose="05000000000000000000" pitchFamily="2" charset="2"/>
+              <a:buChar char="ü"/>
+            </a:pPr>
+            <a:r>
+              <a:rPr lang="fa-IR" sz="2400" b="1" dirty="0">
+                <a:latin typeface="Calibri" panose="020F0502020204030204" pitchFamily="34" charset="0"/>
+                <a:cs typeface="Calibri" panose="020F0502020204030204" pitchFamily="34" charset="0"/>
+              </a:rPr>
+              <a:t>آهسته و پیوسته کد بزنید ( کد نویسی مثل دوی ماراتن هست ) </a:t>
+            </a:r>
+          </a:p>
+          <a:p>
+            <a:pPr marL="914400" lvl="1" indent="-457200" algn="r" rtl="1">
+              <a:lnSpc>
+                <a:spcPct val="150000"/>
+              </a:lnSpc>
+              <a:buFont typeface="Wingdings" panose="05000000000000000000" pitchFamily="2" charset="2"/>
+              <a:buChar char="ü"/>
+            </a:pPr>
+            <a:r>
+              <a:rPr lang="fa-IR" sz="2400" b="1" dirty="0">
+                <a:latin typeface="Calibri" panose="020F0502020204030204" pitchFamily="34" charset="0"/>
+                <a:cs typeface="Calibri" panose="020F0502020204030204" pitchFamily="34" charset="0"/>
+              </a:rPr>
+              <a:t>حد و حدود خودتان را بدانید.</a:t>
+            </a:r>
+          </a:p>
+        </p:txBody>
+      </p:sp>
+    </p:spTree>
+    <p:extLst>
+      <p:ext uri="{BB962C8B-B14F-4D97-AF65-F5344CB8AC3E}">
+        <p14:creationId xmlns:p14="http://schemas.microsoft.com/office/powerpoint/2010/main" val="2638554157"/>
+      </p:ext>
+    </p:extLst>
+  </p:cSld>
+  <p:clrMapOvr>
+    <a:masterClrMapping/>
+  </p:clrMapOvr>
+</p:sld>
+</file>
+
+<file path=ppt/slides/slide29.xml><?xml version="1.0" encoding="utf-8"?>
+<p:sld xmlns:a="http://schemas.openxmlformats.org/drawingml/2006/main" xmlns:r="http://schemas.openxmlformats.org/officeDocument/2006/relationships" xmlns:p="http://schemas.openxmlformats.org/presentationml/2006/main">
+  <p:cSld>
+    <p:spTree>
+      <p:nvGrpSpPr>
+        <p:cNvPr id="1" name=""/>
+        <p:cNvGrpSpPr/>
+        <p:nvPr/>
+      </p:nvGrpSpPr>
+      <p:grpSpPr>
+        <a:xfrm>
+          <a:off x="0" y="0"/>
+          <a:ext cx="0" cy="0"/>
+          <a:chOff x="0" y="0"/>
+          <a:chExt cx="0" cy="0"/>
+        </a:xfrm>
+      </p:grpSpPr>
+      <p:sp>
+        <p:nvSpPr>
+          <p:cNvPr id="2" name="Title 1"/>
+          <p:cNvSpPr>
+            <a:spLocks noGrp="1"/>
+          </p:cNvSpPr>
+          <p:nvPr>
+            <p:ph type="title"/>
+          </p:nvPr>
+        </p:nvSpPr>
+        <p:spPr>
+          <a:xfrm>
+            <a:off x="381000" y="571500"/>
+            <a:ext cx="11341100" cy="685800"/>
+          </a:xfrm>
+        </p:spPr>
+        <p:txBody>
+          <a:bodyPr/>
+          <a:lstStyle/>
+          <a:p>
+            <a:pPr algn="r" rtl="1"/>
+            <a:r>
+              <a:rPr lang="fa-IR" sz="4400" dirty="0">
+                <a:effectLst>
+                  <a:outerShdw blurRad="38100" dist="38100" dir="2700000" algn="tl">
+                    <a:srgbClr val="000000">
+                      <a:alpha val="43137"/>
+                    </a:srgbClr>
+                  </a:outerShdw>
+                </a:effectLst>
+                <a:latin typeface="Calibri" panose="020F0502020204030204" pitchFamily="34" charset="0"/>
+                <a:cs typeface="Calibri" panose="020F0502020204030204" pitchFamily="34" charset="0"/>
+              </a:rPr>
+              <a:t>فصل چهارم : کُد زنی</a:t>
+            </a:r>
+            <a:endParaRPr lang="en-US" sz="4400" dirty="0">
+              <a:effectLst>
+                <a:outerShdw blurRad="38100" dist="38100" dir="2700000" algn="tl">
+                  <a:srgbClr val="000000">
+                    <a:alpha val="43137"/>
+                  </a:srgbClr>
+                </a:outerShdw>
+              </a:effectLst>
+              <a:latin typeface="Calibri" panose="020F0502020204030204" pitchFamily="34" charset="0"/>
+              <a:cs typeface="Calibri" panose="020F0502020204030204" pitchFamily="34" charset="0"/>
+            </a:endParaRPr>
+          </a:p>
+        </p:txBody>
+      </p:sp>
+      <p:sp>
+        <p:nvSpPr>
+          <p:cNvPr id="11" name="TextBox 10">
+            <a:extLst>
+              <a:ext uri="{FF2B5EF4-FFF2-40B4-BE49-F238E27FC236}">
+                <a16:creationId xmlns:a16="http://schemas.microsoft.com/office/drawing/2014/main" id="{ACA58C7E-C836-4E66-A88E-CB3EF184A613}"/>
+              </a:ext>
+            </a:extLst>
+          </p:cNvPr>
+          <p:cNvSpPr txBox="1"/>
+          <p:nvPr/>
+        </p:nvSpPr>
+        <p:spPr>
+          <a:xfrm>
+            <a:off x="155864" y="2026468"/>
+            <a:ext cx="11566236" cy="4559390"/>
+          </a:xfrm>
+          <a:prstGeom prst="rect">
+            <a:avLst/>
+          </a:prstGeom>
+          <a:noFill/>
+        </p:spPr>
+        <p:txBody>
+          <a:bodyPr wrap="square" rtlCol="0">
+            <a:spAutoFit/>
+          </a:bodyPr>
+          <a:lstStyle/>
+          <a:p>
+            <a:pPr algn="r" rtl="1">
+              <a:lnSpc>
+                <a:spcPct val="150000"/>
+              </a:lnSpc>
+            </a:pPr>
+            <a:r>
+              <a:rPr lang="fa-IR" sz="2400" b="1" i="1" dirty="0">
+                <a:latin typeface="Calibri" panose="020F0502020204030204" pitchFamily="34" charset="0"/>
+                <a:cs typeface="Calibri" panose="020F0502020204030204" pitchFamily="34" charset="0"/>
+              </a:rPr>
+              <a:t>نکاتی که باید در نظر بگیرید:</a:t>
+            </a:r>
+          </a:p>
+          <a:p>
+            <a:pPr marL="914400" lvl="1" indent="-457200" algn="r" rtl="1">
+              <a:lnSpc>
+                <a:spcPct val="150000"/>
+              </a:lnSpc>
+              <a:buFont typeface="Wingdings" panose="05000000000000000000" pitchFamily="2" charset="2"/>
+              <a:buChar char="ü"/>
+            </a:pPr>
+            <a:r>
+              <a:rPr lang="fa-IR" sz="2400" b="1" dirty="0">
+                <a:latin typeface="Calibri" panose="020F0502020204030204" pitchFamily="34" charset="0"/>
+                <a:cs typeface="Calibri" panose="020F0502020204030204" pitchFamily="34" charset="0"/>
+              </a:rPr>
+              <a:t>امید :</a:t>
+            </a:r>
+          </a:p>
+          <a:p>
+            <a:pPr marL="1371600" lvl="2" indent="-457200" algn="r" rtl="1">
+              <a:lnSpc>
+                <a:spcPct val="150000"/>
+              </a:lnSpc>
+              <a:buFont typeface="Wingdings" panose="05000000000000000000" pitchFamily="2" charset="2"/>
+              <a:buChar char="ü"/>
+            </a:pPr>
+            <a:r>
+              <a:rPr lang="fa-IR" sz="2000" b="1" dirty="0">
+                <a:latin typeface="Calibri" panose="020F0502020204030204" pitchFamily="34" charset="0"/>
+                <a:cs typeface="Calibri" panose="020F0502020204030204" pitchFamily="34" charset="0"/>
+              </a:rPr>
+              <a:t>امید یکی از بزرگترین نابود کننده ی پروژه هاست.</a:t>
+            </a:r>
+          </a:p>
+          <a:p>
+            <a:pPr marL="1371600" lvl="2" indent="-457200" algn="r" rtl="1">
+              <a:lnSpc>
+                <a:spcPct val="150000"/>
+              </a:lnSpc>
+              <a:buFont typeface="Wingdings" panose="05000000000000000000" pitchFamily="2" charset="2"/>
+              <a:buChar char="ü"/>
+            </a:pPr>
+            <a:r>
+              <a:rPr lang="fa-IR" sz="2000" b="1" dirty="0">
+                <a:latin typeface="Calibri" panose="020F0502020204030204" pitchFamily="34" charset="0"/>
+                <a:cs typeface="Calibri" panose="020F0502020204030204" pitchFamily="34" charset="0"/>
+              </a:rPr>
+              <a:t>امید را وارد تخمین هایتان نکنید .</a:t>
+            </a:r>
+          </a:p>
+          <a:p>
+            <a:pPr marL="914400" lvl="1" indent="-457200" algn="r" rtl="1">
+              <a:lnSpc>
+                <a:spcPct val="150000"/>
+              </a:lnSpc>
+              <a:buFont typeface="Wingdings" panose="05000000000000000000" pitchFamily="2" charset="2"/>
+              <a:buChar char="ü"/>
+            </a:pPr>
+            <a:r>
+              <a:rPr lang="fa-IR" sz="2400" b="1" dirty="0">
+                <a:latin typeface="Calibri" panose="020F0502020204030204" pitchFamily="34" charset="0"/>
+                <a:cs typeface="Calibri" panose="020F0502020204030204" pitchFamily="34" charset="0"/>
+              </a:rPr>
+              <a:t>عجله کردن :</a:t>
+            </a:r>
+          </a:p>
+          <a:p>
+            <a:pPr marL="1371600" lvl="2" indent="-457200" algn="r" rtl="1">
+              <a:lnSpc>
+                <a:spcPct val="150000"/>
+              </a:lnSpc>
+              <a:buFont typeface="Wingdings" panose="05000000000000000000" pitchFamily="2" charset="2"/>
+              <a:buChar char="ü"/>
+            </a:pPr>
+            <a:r>
+              <a:rPr lang="fa-IR" sz="2000" b="1" dirty="0">
+                <a:latin typeface="Calibri" panose="020F0502020204030204" pitchFamily="34" charset="0"/>
+                <a:cs typeface="Calibri" panose="020F0502020204030204" pitchFamily="34" charset="0"/>
+              </a:rPr>
+              <a:t>در برابر مدیریت ، تخمین های خود را نگه دارید. تخمین های اولیه معمولا  دقیقتر هستند.</a:t>
+            </a:r>
+          </a:p>
+          <a:p>
+            <a:pPr marL="1371600" lvl="2" indent="-457200" algn="r" rtl="1">
+              <a:lnSpc>
+                <a:spcPct val="150000"/>
+              </a:lnSpc>
+              <a:buFont typeface="Wingdings" panose="05000000000000000000" pitchFamily="2" charset="2"/>
+              <a:buChar char="ü"/>
+            </a:pPr>
+            <a:r>
+              <a:rPr lang="fa-IR" sz="2000" b="1" dirty="0">
+                <a:latin typeface="Calibri" panose="020F0502020204030204" pitchFamily="34" charset="0"/>
+                <a:cs typeface="Calibri" panose="020F0502020204030204" pitchFamily="34" charset="0"/>
+              </a:rPr>
+              <a:t>هیچ راهی برای عجله کردن نیست ، نمی توانید کاری کنید که سریعتر کد بزنید ، سریعتر یک مشکل را حل کنید ؛ اگر سعی کنید ، فقط خودتان را کند تر می کنید.</a:t>
+            </a:r>
+          </a:p>
+          <a:p>
+            <a:pPr marL="1371600" lvl="2" indent="-457200" algn="r" rtl="1">
+              <a:lnSpc>
+                <a:spcPct val="150000"/>
+              </a:lnSpc>
+              <a:buFont typeface="Wingdings" panose="05000000000000000000" pitchFamily="2" charset="2"/>
+              <a:buChar char="ü"/>
+            </a:pPr>
+            <a:endParaRPr lang="fa-IR" sz="2400" b="1" dirty="0">
+              <a:latin typeface="Calibri" panose="020F0502020204030204" pitchFamily="34" charset="0"/>
+              <a:cs typeface="Calibri" panose="020F0502020204030204" pitchFamily="34" charset="0"/>
+            </a:endParaRPr>
+          </a:p>
+        </p:txBody>
+      </p:sp>
+    </p:spTree>
+    <p:extLst>
+      <p:ext uri="{BB962C8B-B14F-4D97-AF65-F5344CB8AC3E}">
+        <p14:creationId xmlns:p14="http://schemas.microsoft.com/office/powerpoint/2010/main" val="3682830617"/>
+      </p:ext>
+    </p:extLst>
+  </p:cSld>
+  <p:clrMapOvr>
+    <a:masterClrMapping/>
+  </p:clrMapOvr>
+</p:sld>
+</file>
+
 <file path=ppt/slides/slide3.xml><?xml version="1.0" encoding="utf-8"?>
 <p:sld xmlns:a="http://schemas.openxmlformats.org/drawingml/2006/main" xmlns:r="http://schemas.openxmlformats.org/officeDocument/2006/relationships" xmlns:p="http://schemas.openxmlformats.org/presentationml/2006/main">
   <p:cSld>
@@ -11439,6 +12584,463 @@
     <p:extLst>
       <p:ext uri="{BB962C8B-B14F-4D97-AF65-F5344CB8AC3E}">
         <p14:creationId xmlns:p14="http://schemas.microsoft.com/office/powerpoint/2010/main" val="2187083425"/>
+      </p:ext>
+    </p:extLst>
+  </p:cSld>
+  <p:clrMapOvr>
+    <a:masterClrMapping/>
+  </p:clrMapOvr>
+</p:sld>
+</file>
+
+<file path=ppt/slides/slide30.xml><?xml version="1.0" encoding="utf-8"?>
+<p:sld xmlns:a="http://schemas.openxmlformats.org/drawingml/2006/main" xmlns:r="http://schemas.openxmlformats.org/officeDocument/2006/relationships" xmlns:p="http://schemas.openxmlformats.org/presentationml/2006/main">
+  <p:cSld>
+    <p:spTree>
+      <p:nvGrpSpPr>
+        <p:cNvPr id="1" name=""/>
+        <p:cNvGrpSpPr/>
+        <p:nvPr/>
+      </p:nvGrpSpPr>
+      <p:grpSpPr>
+        <a:xfrm>
+          <a:off x="0" y="0"/>
+          <a:ext cx="0" cy="0"/>
+          <a:chOff x="0" y="0"/>
+          <a:chExt cx="0" cy="0"/>
+        </a:xfrm>
+      </p:grpSpPr>
+      <p:sp>
+        <p:nvSpPr>
+          <p:cNvPr id="2" name="Title 1"/>
+          <p:cNvSpPr>
+            <a:spLocks noGrp="1"/>
+          </p:cNvSpPr>
+          <p:nvPr>
+            <p:ph type="title"/>
+          </p:nvPr>
+        </p:nvSpPr>
+        <p:spPr>
+          <a:xfrm>
+            <a:off x="381000" y="571500"/>
+            <a:ext cx="11341100" cy="685800"/>
+          </a:xfrm>
+        </p:spPr>
+        <p:txBody>
+          <a:bodyPr/>
+          <a:lstStyle/>
+          <a:p>
+            <a:pPr algn="r" rtl="1"/>
+            <a:r>
+              <a:rPr lang="fa-IR" sz="4400" dirty="0">
+                <a:effectLst>
+                  <a:outerShdw blurRad="38100" dist="38100" dir="2700000" algn="tl">
+                    <a:srgbClr val="000000">
+                      <a:alpha val="43137"/>
+                    </a:srgbClr>
+                  </a:outerShdw>
+                </a:effectLst>
+                <a:latin typeface="Calibri" panose="020F0502020204030204" pitchFamily="34" charset="0"/>
+                <a:cs typeface="Calibri" panose="020F0502020204030204" pitchFamily="34" charset="0"/>
+              </a:rPr>
+              <a:t>فصل چهارم : کُد زنی</a:t>
+            </a:r>
+            <a:endParaRPr lang="en-US" sz="4400" dirty="0">
+              <a:effectLst>
+                <a:outerShdw blurRad="38100" dist="38100" dir="2700000" algn="tl">
+                  <a:srgbClr val="000000">
+                    <a:alpha val="43137"/>
+                  </a:srgbClr>
+                </a:outerShdw>
+              </a:effectLst>
+              <a:latin typeface="Calibri" panose="020F0502020204030204" pitchFamily="34" charset="0"/>
+              <a:cs typeface="Calibri" panose="020F0502020204030204" pitchFamily="34" charset="0"/>
+            </a:endParaRPr>
+          </a:p>
+        </p:txBody>
+      </p:sp>
+      <p:sp>
+        <p:nvSpPr>
+          <p:cNvPr id="11" name="TextBox 10">
+            <a:extLst>
+              <a:ext uri="{FF2B5EF4-FFF2-40B4-BE49-F238E27FC236}">
+                <a16:creationId xmlns:a16="http://schemas.microsoft.com/office/drawing/2014/main" id="{ACA58C7E-C836-4E66-A88E-CB3EF184A613}"/>
+              </a:ext>
+            </a:extLst>
+          </p:cNvPr>
+          <p:cNvSpPr txBox="1"/>
+          <p:nvPr/>
+        </p:nvSpPr>
+        <p:spPr>
+          <a:xfrm>
+            <a:off x="155864" y="1943341"/>
+            <a:ext cx="11566236" cy="4559390"/>
+          </a:xfrm>
+          <a:prstGeom prst="rect">
+            <a:avLst/>
+          </a:prstGeom>
+          <a:noFill/>
+        </p:spPr>
+        <p:txBody>
+          <a:bodyPr wrap="square" rtlCol="0">
+            <a:spAutoFit/>
+          </a:bodyPr>
+          <a:lstStyle/>
+          <a:p>
+            <a:pPr algn="r" rtl="1">
+              <a:lnSpc>
+                <a:spcPct val="150000"/>
+              </a:lnSpc>
+            </a:pPr>
+            <a:r>
+              <a:rPr lang="fa-IR" sz="2400" b="1" i="1" dirty="0">
+                <a:latin typeface="Calibri" panose="020F0502020204030204" pitchFamily="34" charset="0"/>
+                <a:cs typeface="Calibri" panose="020F0502020204030204" pitchFamily="34" charset="0"/>
+              </a:rPr>
+              <a:t>نکاتی که باید در نظر بگیرید:</a:t>
+            </a:r>
+          </a:p>
+          <a:p>
+            <a:pPr marL="914400" lvl="1" indent="-457200" algn="r" rtl="1">
+              <a:lnSpc>
+                <a:spcPct val="150000"/>
+              </a:lnSpc>
+              <a:buFont typeface="Wingdings" panose="05000000000000000000" pitchFamily="2" charset="2"/>
+              <a:buChar char="ü"/>
+            </a:pPr>
+            <a:r>
+              <a:rPr lang="fa-IR" sz="2400" b="1" dirty="0">
+                <a:latin typeface="Calibri" panose="020F0502020204030204" pitchFamily="34" charset="0"/>
+                <a:cs typeface="Calibri" panose="020F0502020204030204" pitchFamily="34" charset="0"/>
+              </a:rPr>
+              <a:t>اضافه کاری :</a:t>
+            </a:r>
+          </a:p>
+          <a:p>
+            <a:pPr marL="1371600" lvl="2" indent="-457200" algn="r" rtl="1">
+              <a:lnSpc>
+                <a:spcPct val="150000"/>
+              </a:lnSpc>
+              <a:buFont typeface="Wingdings" panose="05000000000000000000" pitchFamily="2" charset="2"/>
+              <a:buChar char="ü"/>
+            </a:pPr>
+            <a:r>
+              <a:rPr lang="fa-IR" sz="2000" b="1" dirty="0">
+                <a:latin typeface="Calibri" panose="020F0502020204030204" pitchFamily="34" charset="0"/>
+                <a:cs typeface="Calibri" panose="020F0502020204030204" pitchFamily="34" charset="0"/>
+              </a:rPr>
+              <a:t>بعضی اوقات لازم هستند ، ولی نباید با آن موافقت کنید مگر :</a:t>
+            </a:r>
+          </a:p>
+          <a:p>
+            <a:pPr marL="1828800" lvl="3" indent="-457200" algn="r" rtl="1">
+              <a:lnSpc>
+                <a:spcPct val="150000"/>
+              </a:lnSpc>
+              <a:buFont typeface="Wingdings" panose="05000000000000000000" pitchFamily="2" charset="2"/>
+              <a:buChar char="ü"/>
+            </a:pPr>
+            <a:r>
+              <a:rPr lang="fa-IR" sz="2000" b="1" dirty="0">
+                <a:latin typeface="Calibri" panose="020F0502020204030204" pitchFamily="34" charset="0"/>
+                <a:cs typeface="Calibri" panose="020F0502020204030204" pitchFamily="34" charset="0"/>
+              </a:rPr>
+              <a:t>به صورت شخصی بتوانید برای آن وقت بگذارید. </a:t>
+            </a:r>
+          </a:p>
+          <a:p>
+            <a:pPr marL="1828800" lvl="3" indent="-457200" algn="r" rtl="1">
+              <a:lnSpc>
+                <a:spcPct val="150000"/>
+              </a:lnSpc>
+              <a:buFont typeface="Wingdings" panose="05000000000000000000" pitchFamily="2" charset="2"/>
+              <a:buChar char="ü"/>
+            </a:pPr>
+            <a:r>
+              <a:rPr lang="fa-IR" sz="2000" b="1" dirty="0">
+                <a:latin typeface="Calibri" panose="020F0502020204030204" pitchFamily="34" charset="0"/>
+                <a:cs typeface="Calibri" panose="020F0502020204030204" pitchFamily="34" charset="0"/>
+              </a:rPr>
+              <a:t>کوتاه مدت باشد . </a:t>
+            </a:r>
+          </a:p>
+          <a:p>
+            <a:pPr marL="1828800" lvl="3" indent="-457200" algn="r" rtl="1">
+              <a:lnSpc>
+                <a:spcPct val="150000"/>
+              </a:lnSpc>
+              <a:buFont typeface="Wingdings" panose="05000000000000000000" pitchFamily="2" charset="2"/>
+              <a:buChar char="ü"/>
+            </a:pPr>
+            <a:r>
+              <a:rPr lang="fa-IR" sz="2000" b="1" dirty="0">
+                <a:latin typeface="Calibri" panose="020F0502020204030204" pitchFamily="34" charset="0"/>
+                <a:cs typeface="Calibri" panose="020F0502020204030204" pitchFamily="34" charset="0"/>
+              </a:rPr>
+              <a:t>مدیریتان یک نقشه برای زمان شکست خوردن اضافه کاری داشته باشد . </a:t>
+            </a:r>
+          </a:p>
+          <a:p>
+            <a:pPr marL="1828800" lvl="3" indent="-457200" algn="r" rtl="1">
+              <a:lnSpc>
+                <a:spcPct val="150000"/>
+              </a:lnSpc>
+              <a:buFont typeface="Wingdings" panose="05000000000000000000" pitchFamily="2" charset="2"/>
+              <a:buChar char="ü"/>
+            </a:pPr>
+            <a:r>
+              <a:rPr lang="fa-IR" sz="2000" b="1" dirty="0">
+                <a:latin typeface="Calibri" panose="020F0502020204030204" pitchFamily="34" charset="0"/>
+                <a:cs typeface="Calibri" panose="020F0502020204030204" pitchFamily="34" charset="0"/>
+              </a:rPr>
+              <a:t>پس از پایان اضافه کاری ، به همان مدت استراحت کنید .</a:t>
+            </a:r>
+          </a:p>
+          <a:p>
+            <a:pPr marL="914400" lvl="1" indent="-457200" algn="r" rtl="1">
+              <a:lnSpc>
+                <a:spcPct val="150000"/>
+              </a:lnSpc>
+              <a:buFont typeface="Wingdings" panose="05000000000000000000" pitchFamily="2" charset="2"/>
+              <a:buChar char="ü"/>
+            </a:pPr>
+            <a:r>
+              <a:rPr lang="en-US" sz="2400" b="1" dirty="0">
+                <a:latin typeface="Calibri" panose="020F0502020204030204" pitchFamily="34" charset="0"/>
+                <a:cs typeface="Calibri" panose="020F0502020204030204" pitchFamily="34" charset="0"/>
+              </a:rPr>
+              <a:t>False Delivery</a:t>
+            </a:r>
+            <a:r>
+              <a:rPr lang="fa-IR" sz="2400" b="1" dirty="0">
+                <a:latin typeface="Calibri" panose="020F0502020204030204" pitchFamily="34" charset="0"/>
+                <a:cs typeface="Calibri" panose="020F0502020204030204" pitchFamily="34" charset="0"/>
+              </a:rPr>
+              <a:t> : تحویل دادن چیزی که کار نمی کند .</a:t>
+            </a:r>
+          </a:p>
+          <a:p>
+            <a:pPr marL="1371600" lvl="2" indent="-457200" algn="r" rtl="1">
+              <a:lnSpc>
+                <a:spcPct val="150000"/>
+              </a:lnSpc>
+              <a:buFont typeface="Wingdings" panose="05000000000000000000" pitchFamily="2" charset="2"/>
+              <a:buChar char="ü"/>
+            </a:pPr>
+            <a:r>
+              <a:rPr lang="fa-IR" sz="2400" b="1" dirty="0">
+                <a:latin typeface="Calibri" panose="020F0502020204030204" pitchFamily="34" charset="0"/>
+                <a:cs typeface="Calibri" panose="020F0502020204030204" pitchFamily="34" charset="0"/>
+              </a:rPr>
+              <a:t>بدترین کار ممکن است . </a:t>
+            </a:r>
+          </a:p>
+        </p:txBody>
+      </p:sp>
+    </p:spTree>
+    <p:extLst>
+      <p:ext uri="{BB962C8B-B14F-4D97-AF65-F5344CB8AC3E}">
+        <p14:creationId xmlns:p14="http://schemas.microsoft.com/office/powerpoint/2010/main" val="885155948"/>
+      </p:ext>
+    </p:extLst>
+  </p:cSld>
+  <p:clrMapOvr>
+    <a:masterClrMapping/>
+  </p:clrMapOvr>
+</p:sld>
+</file>
+
+<file path=ppt/slides/slide31.xml><?xml version="1.0" encoding="utf-8"?>
+<p:sld xmlns:a="http://schemas.openxmlformats.org/drawingml/2006/main" xmlns:r="http://schemas.openxmlformats.org/officeDocument/2006/relationships" xmlns:p="http://schemas.openxmlformats.org/presentationml/2006/main">
+  <p:cSld>
+    <p:spTree>
+      <p:nvGrpSpPr>
+        <p:cNvPr id="1" name=""/>
+        <p:cNvGrpSpPr/>
+        <p:nvPr/>
+      </p:nvGrpSpPr>
+      <p:grpSpPr>
+        <a:xfrm>
+          <a:off x="0" y="0"/>
+          <a:ext cx="0" cy="0"/>
+          <a:chOff x="0" y="0"/>
+          <a:chExt cx="0" cy="0"/>
+        </a:xfrm>
+      </p:grpSpPr>
+      <p:sp>
+        <p:nvSpPr>
+          <p:cNvPr id="2" name="Title 1"/>
+          <p:cNvSpPr>
+            <a:spLocks noGrp="1"/>
+          </p:cNvSpPr>
+          <p:nvPr>
+            <p:ph type="title"/>
+          </p:nvPr>
+        </p:nvSpPr>
+        <p:spPr>
+          <a:xfrm>
+            <a:off x="381000" y="571500"/>
+            <a:ext cx="11341100" cy="685800"/>
+          </a:xfrm>
+        </p:spPr>
+        <p:txBody>
+          <a:bodyPr/>
+          <a:lstStyle/>
+          <a:p>
+            <a:pPr algn="r" rtl="1"/>
+            <a:r>
+              <a:rPr lang="fa-IR" sz="4400" dirty="0">
+                <a:effectLst>
+                  <a:outerShdw blurRad="38100" dist="38100" dir="2700000" algn="tl">
+                    <a:srgbClr val="000000">
+                      <a:alpha val="43137"/>
+                    </a:srgbClr>
+                  </a:outerShdw>
+                </a:effectLst>
+                <a:latin typeface="Calibri" panose="020F0502020204030204" pitchFamily="34" charset="0"/>
+                <a:cs typeface="Calibri" panose="020F0502020204030204" pitchFamily="34" charset="0"/>
+              </a:rPr>
+              <a:t>فصل چهارم : کُد زنی</a:t>
+            </a:r>
+            <a:endParaRPr lang="en-US" sz="4400" dirty="0">
+              <a:effectLst>
+                <a:outerShdw blurRad="38100" dist="38100" dir="2700000" algn="tl">
+                  <a:srgbClr val="000000">
+                    <a:alpha val="43137"/>
+                  </a:srgbClr>
+                </a:outerShdw>
+              </a:effectLst>
+              <a:latin typeface="Calibri" panose="020F0502020204030204" pitchFamily="34" charset="0"/>
+              <a:cs typeface="Calibri" panose="020F0502020204030204" pitchFamily="34" charset="0"/>
+            </a:endParaRPr>
+          </a:p>
+        </p:txBody>
+      </p:sp>
+      <p:sp>
+        <p:nvSpPr>
+          <p:cNvPr id="11" name="TextBox 10">
+            <a:extLst>
+              <a:ext uri="{FF2B5EF4-FFF2-40B4-BE49-F238E27FC236}">
+                <a16:creationId xmlns:a16="http://schemas.microsoft.com/office/drawing/2014/main" id="{ACA58C7E-C836-4E66-A88E-CB3EF184A613}"/>
+              </a:ext>
+            </a:extLst>
+          </p:cNvPr>
+          <p:cNvSpPr txBox="1"/>
+          <p:nvPr/>
+        </p:nvSpPr>
+        <p:spPr>
+          <a:xfrm>
+            <a:off x="155864" y="1943341"/>
+            <a:ext cx="11566236" cy="2805063"/>
+          </a:xfrm>
+          <a:prstGeom prst="rect">
+            <a:avLst/>
+          </a:prstGeom>
+          <a:noFill/>
+        </p:spPr>
+        <p:txBody>
+          <a:bodyPr wrap="square" rtlCol="0">
+            <a:spAutoFit/>
+          </a:bodyPr>
+          <a:lstStyle/>
+          <a:p>
+            <a:pPr algn="r" rtl="1">
+              <a:lnSpc>
+                <a:spcPct val="150000"/>
+              </a:lnSpc>
+            </a:pPr>
+            <a:r>
+              <a:rPr lang="fa-IR" sz="2400" b="1" i="1" dirty="0">
+                <a:latin typeface="Calibri" panose="020F0502020204030204" pitchFamily="34" charset="0"/>
+                <a:cs typeface="Calibri" panose="020F0502020204030204" pitchFamily="34" charset="0"/>
+              </a:rPr>
+              <a:t>نکاتی که باید در نظر بگیرید:</a:t>
+            </a:r>
+          </a:p>
+          <a:p>
+            <a:pPr marL="914400" lvl="1" indent="-457200" algn="r" rtl="1">
+              <a:lnSpc>
+                <a:spcPct val="150000"/>
+              </a:lnSpc>
+              <a:buFont typeface="Wingdings" panose="05000000000000000000" pitchFamily="2" charset="2"/>
+              <a:buChar char="ü"/>
+            </a:pPr>
+            <a:r>
+              <a:rPr lang="fa-IR" sz="2400" b="1" dirty="0">
+                <a:latin typeface="Calibri" panose="020F0502020204030204" pitchFamily="34" charset="0"/>
+                <a:cs typeface="Calibri" panose="020F0502020204030204" pitchFamily="34" charset="0"/>
+              </a:rPr>
+              <a:t>انجام شدن کار ( </a:t>
+            </a:r>
+            <a:r>
+              <a:rPr lang="en-US" sz="2400" b="1" dirty="0">
+                <a:latin typeface="Calibri" panose="020F0502020204030204" pitchFamily="34" charset="0"/>
+                <a:cs typeface="Calibri" panose="020F0502020204030204" pitchFamily="34" charset="0"/>
+              </a:rPr>
+              <a:t>Done</a:t>
+            </a:r>
+            <a:r>
+              <a:rPr lang="fa-IR" sz="2400" b="1" dirty="0">
+                <a:latin typeface="Calibri" panose="020F0502020204030204" pitchFamily="34" charset="0"/>
+                <a:cs typeface="Calibri" panose="020F0502020204030204" pitchFamily="34" charset="0"/>
+              </a:rPr>
+              <a:t> ) را تعریف کنید .</a:t>
+            </a:r>
+          </a:p>
+          <a:p>
+            <a:pPr marL="914400" lvl="1" indent="-457200" algn="r" rtl="1">
+              <a:lnSpc>
+                <a:spcPct val="150000"/>
+              </a:lnSpc>
+              <a:buFont typeface="Wingdings" panose="05000000000000000000" pitchFamily="2" charset="2"/>
+              <a:buChar char="ü"/>
+            </a:pPr>
+            <a:r>
+              <a:rPr lang="fa-IR" sz="2400" b="1" dirty="0">
+                <a:latin typeface="Calibri" panose="020F0502020204030204" pitchFamily="34" charset="0"/>
+                <a:cs typeface="Calibri" panose="020F0502020204030204" pitchFamily="34" charset="0"/>
+              </a:rPr>
+              <a:t>کمک کردن به دیگران </a:t>
+            </a:r>
+          </a:p>
+          <a:p>
+            <a:pPr marL="914400" lvl="1" indent="-457200" algn="r" rtl="1">
+              <a:lnSpc>
+                <a:spcPct val="150000"/>
+              </a:lnSpc>
+              <a:buFont typeface="Wingdings" panose="05000000000000000000" pitchFamily="2" charset="2"/>
+              <a:buChar char="ü"/>
+            </a:pPr>
+            <a:r>
+              <a:rPr lang="fa-IR" sz="2400" b="1" dirty="0">
+                <a:latin typeface="Calibri" panose="020F0502020204030204" pitchFamily="34" charset="0"/>
+                <a:cs typeface="Calibri" panose="020F0502020204030204" pitchFamily="34" charset="0"/>
+              </a:rPr>
+              <a:t>کمک گرفتن از دیگران </a:t>
+            </a:r>
+          </a:p>
+          <a:p>
+            <a:pPr marL="914400" lvl="1" indent="-457200" algn="r" rtl="1">
+              <a:lnSpc>
+                <a:spcPct val="150000"/>
+              </a:lnSpc>
+              <a:buFont typeface="Wingdings" panose="05000000000000000000" pitchFamily="2" charset="2"/>
+              <a:buChar char="ü"/>
+            </a:pPr>
+            <a:r>
+              <a:rPr lang="fa-IR" sz="2400" b="1" dirty="0">
+                <a:latin typeface="Calibri" panose="020F0502020204030204" pitchFamily="34" charset="0"/>
+                <a:cs typeface="Calibri" panose="020F0502020204030204" pitchFamily="34" charset="0"/>
+              </a:rPr>
+              <a:t>راهنمایی کردن دیگران </a:t>
+            </a:r>
+          </a:p>
+        </p:txBody>
+      </p:sp>
+    </p:spTree>
+    <p:extLst>
+      <p:ext uri="{BB962C8B-B14F-4D97-AF65-F5344CB8AC3E}">
+        <p14:creationId xmlns:p14="http://schemas.microsoft.com/office/powerpoint/2010/main" val="2119226195"/>
       </p:ext>
     </p:extLst>
   </p:cSld>
@@ -12219,8 +13821,8 @@
                     </a:srgbClr>
                   </a:outerShdw>
                 </a:effectLst>
-                <a:latin typeface="Adobe Arabic" panose="02040503050201020203" pitchFamily="18" charset="-78"/>
-                <a:cs typeface="Adobe Arabic" panose="02040503050201020203" pitchFamily="18" charset="-78"/>
+                <a:latin typeface="Calibri" panose="020F0502020204030204" pitchFamily="34" charset="0"/>
+                <a:cs typeface="Calibri" panose="020F0502020204030204" pitchFamily="34" charset="0"/>
               </a:rPr>
               <a:t>فصل اول : حرفه ای گری </a:t>
             </a:r>
@@ -12232,8 +13834,8 @@
                   </a:srgbClr>
                 </a:outerShdw>
               </a:effectLst>
-              <a:latin typeface="Adobe Arabic" panose="02040503050201020203" pitchFamily="18" charset="-78"/>
-              <a:cs typeface="Adobe Arabic" panose="02040503050201020203" pitchFamily="18" charset="-78"/>
+              <a:latin typeface="Calibri" panose="020F0502020204030204" pitchFamily="34" charset="0"/>
+              <a:cs typeface="Calibri" panose="020F0502020204030204" pitchFamily="34" charset="0"/>
             </a:endParaRPr>
           </a:p>
         </p:txBody>
@@ -13382,8 +14984,8 @@
             <a:pPr algn="r" rtl="1"/>
             <a:r>
               <a:rPr lang="fa-IR" sz="3600" dirty="0">
-                <a:latin typeface="Adobe Arabic" panose="02040503050201020203" pitchFamily="18" charset="-78"/>
-                <a:cs typeface="Adobe Arabic" panose="02040503050201020203" pitchFamily="18" charset="-78"/>
+                <a:latin typeface="Calibri" panose="020F0502020204030204" pitchFamily="34" charset="0"/>
+                <a:cs typeface="Calibri" panose="020F0502020204030204" pitchFamily="34" charset="0"/>
               </a:rPr>
               <a:t>در زمینه ی فنی ، اطلاعات کافی داشته باشید. </a:t>
             </a:r>
@@ -13679,8 +15281,8 @@
                     </a:srgbClr>
                   </a:outerShdw>
                 </a:effectLst>
-                <a:latin typeface="Adobe Arabic" panose="02040503050201020203" pitchFamily="18" charset="-78"/>
-                <a:cs typeface="Adobe Arabic" panose="02040503050201020203" pitchFamily="18" charset="-78"/>
+                <a:latin typeface="Calibri" panose="020F0502020204030204" pitchFamily="34" charset="0"/>
+                <a:cs typeface="Calibri" panose="020F0502020204030204" pitchFamily="34" charset="0"/>
               </a:rPr>
               <a:t>فصل اول : حرفه ای گری </a:t>
             </a:r>
@@ -13692,8 +15294,8 @@
                   </a:srgbClr>
                 </a:outerShdw>
               </a:effectLst>
-              <a:latin typeface="Adobe Arabic" panose="02040503050201020203" pitchFamily="18" charset="-78"/>
-              <a:cs typeface="Adobe Arabic" panose="02040503050201020203" pitchFamily="18" charset="-78"/>
+              <a:latin typeface="Calibri" panose="020F0502020204030204" pitchFamily="34" charset="0"/>
+              <a:cs typeface="Calibri" panose="020F0502020204030204" pitchFamily="34" charset="0"/>
             </a:endParaRPr>
           </a:p>
         </p:txBody>

</xml_diff>